<commit_message>
Updated presentation ppt and pdf
</commit_message>
<xml_diff>
--- a/ParimalAhire-PathCraft-AgenticAI.pptx
+++ b/ParimalAhire-PathCraft-AgenticAI.pptx
@@ -5,23 +5,27 @@
     <p:sldMasterId id="2147483712" r:id="rId4"/>
   </p:sldMasterIdLst>
   <p:notesMasterIdLst>
-    <p:notesMasterId r:id="rId19"/>
+    <p:notesMasterId r:id="rId23"/>
   </p:notesMasterIdLst>
   <p:sldIdLst>
     <p:sldId id="256" r:id="rId5"/>
     <p:sldId id="2146847054" r:id="rId6"/>
     <p:sldId id="262" r:id="rId7"/>
     <p:sldId id="263" r:id="rId8"/>
-    <p:sldId id="265" r:id="rId9"/>
-    <p:sldId id="266" r:id="rId10"/>
-    <p:sldId id="267" r:id="rId11"/>
-    <p:sldId id="268" r:id="rId12"/>
-    <p:sldId id="2146847055" r:id="rId13"/>
-    <p:sldId id="269" r:id="rId14"/>
-    <p:sldId id="2146847059" r:id="rId15"/>
-    <p:sldId id="2146847060" r:id="rId16"/>
-    <p:sldId id="2146847061" r:id="rId17"/>
-    <p:sldId id="259" r:id="rId18"/>
+    <p:sldId id="2146847058" r:id="rId9"/>
+    <p:sldId id="265" r:id="rId10"/>
+    <p:sldId id="2146847057" r:id="rId11"/>
+    <p:sldId id="2146847066" r:id="rId12"/>
+    <p:sldId id="2146847060" r:id="rId13"/>
+    <p:sldId id="2146847067" r:id="rId14"/>
+    <p:sldId id="2146847068" r:id="rId15"/>
+    <p:sldId id="2146847062" r:id="rId16"/>
+    <p:sldId id="2146847055" r:id="rId17"/>
+    <p:sldId id="2146847059" r:id="rId18"/>
+    <p:sldId id="2146847069" r:id="rId19"/>
+    <p:sldId id="2146847070" r:id="rId20"/>
+    <p:sldId id="2146847061" r:id="rId21"/>
+    <p:sldId id="259" r:id="rId22"/>
   </p:sldIdLst>
   <p:sldSz cx="12192000" cy="6858000"/>
   <p:notesSz cx="6858000" cy="9144000"/>
@@ -131,9 +135,9 @@
 <file path=ppt/revisionInfo.xml><?xml version="1.0" encoding="utf-8"?>
 <p1510:revInfo xmlns:a="http://schemas.openxmlformats.org/drawingml/2006/main" xmlns:r="http://schemas.openxmlformats.org/officeDocument/2006/relationships" xmlns:p1510="http://schemas.microsoft.com/office/powerpoint/2015/10/main">
   <p1510:revLst>
-    <p1510:client id="{0A2B98E8-7AC3-75BD-DBFE-38A4BBF4F439}" v="10" dt="2024-01-05T12:23:35.348"/>
-    <p1510:client id="{12466EFC-1F62-CA2C-07B1-96111B302B1B}" v="154" dt="2023-11-22T13:37:01.483"/>
-    <p1510:client id="{47C7BCB7-7546-3717-E035-B2126C89CD1A}" v="2" dt="2023-11-22T12:55:27.328"/>
+    <p1510:client id="{392522C5-0B34-8239-4EE4-793E8B6C05A9}" v="255" dt="2025-07-01T09:33:34.532"/>
+    <p1510:client id="{D7F1B23C-5E68-AC61-D210-0912C84FE76E}" v="44" dt="2025-07-01T09:37:32.263"/>
+    <p1510:client id="{D894958A-9A7A-283B-0ADF-D9632CD88E74}" v="14" dt="2025-07-01T10:57:40.261"/>
   </p1510:revLst>
 </p1510:revInfo>
 </file>
@@ -486,6 +490,90 @@
     </a:lvl9pPr>
   </p:notesStyle>
 </p:notesMaster>
+</file>
+
+<file path=ppt/notesSlides/notesSlide1.xml><?xml version="1.0" encoding="utf-8"?>
+<p:notes xmlns:a="http://schemas.openxmlformats.org/drawingml/2006/main" xmlns:r="http://schemas.openxmlformats.org/officeDocument/2006/relationships" xmlns:p="http://schemas.openxmlformats.org/presentationml/2006/main">
+  <p:cSld>
+    <p:spTree>
+      <p:nvGrpSpPr>
+        <p:cNvPr id="1" name=""/>
+        <p:cNvGrpSpPr/>
+        <p:nvPr/>
+      </p:nvGrpSpPr>
+      <p:grpSpPr>
+        <a:xfrm>
+          <a:off x="0" y="0"/>
+          <a:ext cx="0" cy="0"/>
+          <a:chOff x="0" y="0"/>
+          <a:chExt cx="0" cy="0"/>
+        </a:xfrm>
+      </p:grpSpPr>
+      <p:sp>
+        <p:nvSpPr>
+          <p:cNvPr id="2" name="Slide Image Placeholder 1"/>
+          <p:cNvSpPr>
+            <a:spLocks noGrp="1" noRot="1" noChangeAspect="1"/>
+          </p:cNvSpPr>
+          <p:nvPr>
+            <p:ph type="sldImg"/>
+          </p:nvPr>
+        </p:nvSpPr>
+        <p:spPr/>
+      </p:sp>
+      <p:sp>
+        <p:nvSpPr>
+          <p:cNvPr id="3" name="Notes Placeholder 2"/>
+          <p:cNvSpPr>
+            <a:spLocks noGrp="1"/>
+          </p:cNvSpPr>
+          <p:nvPr>
+            <p:ph type="body" idx="1"/>
+          </p:nvPr>
+        </p:nvSpPr>
+        <p:spPr/>
+        <p:txBody>
+          <a:bodyPr/>
+          <a:lstStyle/>
+          <a:p>
+            <a:endParaRPr lang="en-IN" dirty="0"/>
+          </a:p>
+        </p:txBody>
+      </p:sp>
+      <p:sp>
+        <p:nvSpPr>
+          <p:cNvPr id="4" name="Slide Number Placeholder 3"/>
+          <p:cNvSpPr>
+            <a:spLocks noGrp="1"/>
+          </p:cNvSpPr>
+          <p:nvPr>
+            <p:ph type="sldNum" sz="quarter" idx="5"/>
+          </p:nvPr>
+        </p:nvSpPr>
+        <p:spPr/>
+        <p:txBody>
+          <a:bodyPr/>
+          <a:lstStyle/>
+          <a:p>
+            <a:fld id="{17E254F1-4415-47BF-9E91-C5D4B9A33350}" type="slidenum">
+              <a:rPr lang="en-IN" smtClean="0"/>
+              <a:t>4</a:t>
+            </a:fld>
+            <a:endParaRPr lang="en-IN"/>
+          </a:p>
+        </p:txBody>
+      </p:sp>
+    </p:spTree>
+    <p:extLst>
+      <p:ext uri="{BB962C8B-B14F-4D97-AF65-F5344CB8AC3E}">
+        <p14:creationId xmlns:p14="http://schemas.microsoft.com/office/powerpoint/2010/main" val="3225276908"/>
+      </p:ext>
+    </p:extLst>
+  </p:cSld>
+  <p:clrMapOvr>
+    <a:masterClrMapping/>
+  </p:clrMapOvr>
+</p:notes>
 </file>
 
 <file path=ppt/slideLayouts/slideLayout1.xml><?xml version="1.0" encoding="utf-8"?>
@@ -4230,15 +4318,22 @@
           <a:p>
             <a:pPr algn="ctr"/>
             <a:r>
-              <a:rPr lang="en-US" b="1" dirty="0">
+              <a:rPr lang="en-US" b="1">
                 <a:solidFill>
                   <a:schemeClr val="accent1"/>
                 </a:solidFill>
-                <a:latin typeface="Arial" panose="020B0604020202020204" pitchFamily="34" charset="0"/>
-                <a:cs typeface="Arial" panose="020B0604020202020204" pitchFamily="34" charset="0"/>
+                <a:latin typeface="Arial"/>
+                <a:cs typeface="Arial"/>
               </a:rPr>
-              <a:t>PROJECT TITLE</a:t>
-            </a:r>
+              <a:t>Travel agent</a:t>
+            </a:r>
+            <a:endParaRPr lang="en-US" b="1" dirty="0">
+              <a:solidFill>
+                <a:schemeClr val="accent1"/>
+              </a:solidFill>
+              <a:latin typeface="Arial" panose="020B0604020202020204" pitchFamily="34" charset="0"/>
+              <a:cs typeface="Arial" panose="020B0604020202020204" pitchFamily="34" charset="0"/>
+            </a:endParaRPr>
           </a:p>
         </p:txBody>
       </p:sp>
@@ -4282,14 +4377,20 @@
       </p:sp>
       <p:sp>
         <p:nvSpPr>
-          <p:cNvPr id="4" name="TextBox 3"/>
+          <p:cNvPr id="6" name="TextBox 3">
+            <a:extLst>
+              <a:ext uri="{FF2B5EF4-FFF2-40B4-BE49-F238E27FC236}">
+                <a16:creationId xmlns:a16="http://schemas.microsoft.com/office/drawing/2014/main" id="{2FE76379-283E-E65B-0E8E-6E7AEAE18C98}"/>
+              </a:ext>
+            </a:extLst>
+          </p:cNvPr>
           <p:cNvSpPr txBox="1"/>
           <p:nvPr/>
         </p:nvSpPr>
         <p:spPr>
           <a:xfrm>
-            <a:off x="3117529" y="4586365"/>
-            <a:ext cx="7980183" cy="1323439"/>
+            <a:off x="3117530" y="4586368"/>
+            <a:ext cx="5593852" cy="1323439"/>
           </a:xfrm>
           <a:prstGeom prst="rect">
             <a:avLst/>
@@ -4300,7 +4401,101 @@
           <a:bodyPr wrap="square" lIns="91440" tIns="45720" rIns="91440" bIns="45720" rtlCol="0" anchor="t">
             <a:spAutoFit/>
           </a:bodyPr>
-          <a:lstStyle/>
+          <a:lstStyle>
+            <a:defPPr>
+              <a:defRPr lang="en-US"/>
+            </a:defPPr>
+            <a:lvl1pPr marL="0" algn="l" defTabSz="914400" rtl="0" eaLnBrk="1" latinLnBrk="0" hangingPunct="1">
+              <a:defRPr sz="1800" kern="1200">
+                <a:solidFill>
+                  <a:schemeClr val="tx1"/>
+                </a:solidFill>
+                <a:latin typeface="+mn-lt"/>
+                <a:ea typeface="+mn-ea"/>
+                <a:cs typeface="+mn-cs"/>
+              </a:defRPr>
+            </a:lvl1pPr>
+            <a:lvl2pPr marL="457200" algn="l" defTabSz="914400" rtl="0" eaLnBrk="1" latinLnBrk="0" hangingPunct="1">
+              <a:defRPr sz="1800" kern="1200">
+                <a:solidFill>
+                  <a:schemeClr val="tx1"/>
+                </a:solidFill>
+                <a:latin typeface="+mn-lt"/>
+                <a:ea typeface="+mn-ea"/>
+                <a:cs typeface="+mn-cs"/>
+              </a:defRPr>
+            </a:lvl2pPr>
+            <a:lvl3pPr marL="914400" algn="l" defTabSz="914400" rtl="0" eaLnBrk="1" latinLnBrk="0" hangingPunct="1">
+              <a:defRPr sz="1800" kern="1200">
+                <a:solidFill>
+                  <a:schemeClr val="tx1"/>
+                </a:solidFill>
+                <a:latin typeface="+mn-lt"/>
+                <a:ea typeface="+mn-ea"/>
+                <a:cs typeface="+mn-cs"/>
+              </a:defRPr>
+            </a:lvl3pPr>
+            <a:lvl4pPr marL="1371600" algn="l" defTabSz="914400" rtl="0" eaLnBrk="1" latinLnBrk="0" hangingPunct="1">
+              <a:defRPr sz="1800" kern="1200">
+                <a:solidFill>
+                  <a:schemeClr val="tx1"/>
+                </a:solidFill>
+                <a:latin typeface="+mn-lt"/>
+                <a:ea typeface="+mn-ea"/>
+                <a:cs typeface="+mn-cs"/>
+              </a:defRPr>
+            </a:lvl4pPr>
+            <a:lvl5pPr marL="1828800" algn="l" defTabSz="914400" rtl="0" eaLnBrk="1" latinLnBrk="0" hangingPunct="1">
+              <a:defRPr sz="1800" kern="1200">
+                <a:solidFill>
+                  <a:schemeClr val="tx1"/>
+                </a:solidFill>
+                <a:latin typeface="+mn-lt"/>
+                <a:ea typeface="+mn-ea"/>
+                <a:cs typeface="+mn-cs"/>
+              </a:defRPr>
+            </a:lvl5pPr>
+            <a:lvl6pPr marL="2286000" algn="l" defTabSz="914400" rtl="0" eaLnBrk="1" latinLnBrk="0" hangingPunct="1">
+              <a:defRPr sz="1800" kern="1200">
+                <a:solidFill>
+                  <a:schemeClr val="tx1"/>
+                </a:solidFill>
+                <a:latin typeface="+mn-lt"/>
+                <a:ea typeface="+mn-ea"/>
+                <a:cs typeface="+mn-cs"/>
+              </a:defRPr>
+            </a:lvl6pPr>
+            <a:lvl7pPr marL="2743200" algn="l" defTabSz="914400" rtl="0" eaLnBrk="1" latinLnBrk="0" hangingPunct="1">
+              <a:defRPr sz="1800" kern="1200">
+                <a:solidFill>
+                  <a:schemeClr val="tx1"/>
+                </a:solidFill>
+                <a:latin typeface="+mn-lt"/>
+                <a:ea typeface="+mn-ea"/>
+                <a:cs typeface="+mn-cs"/>
+              </a:defRPr>
+            </a:lvl7pPr>
+            <a:lvl8pPr marL="3200400" algn="l" defTabSz="914400" rtl="0" eaLnBrk="1" latinLnBrk="0" hangingPunct="1">
+              <a:defRPr sz="1800" kern="1200">
+                <a:solidFill>
+                  <a:schemeClr val="tx1"/>
+                </a:solidFill>
+                <a:latin typeface="+mn-lt"/>
+                <a:ea typeface="+mn-ea"/>
+                <a:cs typeface="+mn-cs"/>
+              </a:defRPr>
+            </a:lvl8pPr>
+            <a:lvl9pPr marL="3657600" algn="l" defTabSz="914400" rtl="0" eaLnBrk="1" latinLnBrk="0" hangingPunct="1">
+              <a:defRPr sz="1800" kern="1200">
+                <a:solidFill>
+                  <a:schemeClr val="tx1"/>
+                </a:solidFill>
+                <a:latin typeface="+mn-lt"/>
+                <a:ea typeface="+mn-ea"/>
+                <a:cs typeface="+mn-cs"/>
+              </a:defRPr>
+            </a:lvl9pPr>
+          </a:lstStyle>
           <a:p>
             <a:r>
               <a:rPr lang="en-US" sz="2000" b="1" dirty="0">
@@ -4386,7 +4581,13 @@
   <p:cSld>
     <p:spTree>
       <p:nvGrpSpPr>
-        <p:cNvPr id="1" name=""/>
+        <p:cNvPr id="1" name="">
+          <a:extLst>
+            <a:ext uri="{FF2B5EF4-FFF2-40B4-BE49-F238E27FC236}">
+              <a16:creationId xmlns:a16="http://schemas.microsoft.com/office/drawing/2014/main" id="{B3715A6D-4F49-C4EA-7213-41FFE69BE140}"/>
+            </a:ext>
+          </a:extLst>
+        </p:cNvPr>
         <p:cNvGrpSpPr/>
         <p:nvPr/>
       </p:nvGrpSpPr>
@@ -4400,10 +4601,10 @@
       </p:grpSpPr>
       <p:sp>
         <p:nvSpPr>
-          <p:cNvPr id="5" name="Title 4">
+          <p:cNvPr id="2" name="Title 1">
             <a:extLst>
               <a:ext uri="{FF2B5EF4-FFF2-40B4-BE49-F238E27FC236}">
-                <a16:creationId xmlns:a16="http://schemas.microsoft.com/office/drawing/2014/main" id="{8FBA75B4-2DD5-42EB-9397-F36BFB8BA723}"/>
+                <a16:creationId xmlns:a16="http://schemas.microsoft.com/office/drawing/2014/main" id="{146CC324-0A49-C60C-9095-B341C383FE0B}"/>
               </a:ext>
             </a:extLst>
           </p:cNvPr>
@@ -4414,178 +4615,56 @@
             <p:ph type="title"/>
           </p:nvPr>
         </p:nvSpPr>
-        <p:spPr>
-          <a:xfrm>
-            <a:off x="685364" y="725306"/>
-            <a:ext cx="11029616" cy="530296"/>
-          </a:xfrm>
-        </p:spPr>
-        <p:txBody>
-          <a:bodyPr>
-            <a:normAutofit fontScale="90000"/>
-          </a:bodyPr>
+        <p:spPr/>
+        <p:txBody>
+          <a:bodyPr/>
           <a:lstStyle/>
           <a:p>
             <a:r>
-              <a:rPr lang="en-US" sz="4400" b="1" dirty="0">
+              <a:rPr lang="en-IN" dirty="0">
                 <a:solidFill>
                   <a:schemeClr val="accent1"/>
                 </a:solidFill>
-                <a:latin typeface="Arial"/>
-                <a:ea typeface="+mj-lt"/>
-                <a:cs typeface="Arial"/>
               </a:rPr>
-              <a:t>References</a:t>
-            </a:r>
-            <a:endParaRPr lang="en-US" dirty="0"/>
-          </a:p>
-        </p:txBody>
-      </p:sp>
-      <p:sp>
-        <p:nvSpPr>
-          <p:cNvPr id="2" name="Content Placeholder 1">
+              <a:t>Results</a:t>
+            </a:r>
+          </a:p>
+        </p:txBody>
+      </p:sp>
+      <p:pic>
+        <p:nvPicPr>
+          <p:cNvPr id="5" name="Picture 4">
             <a:extLst>
               <a:ext uri="{FF2B5EF4-FFF2-40B4-BE49-F238E27FC236}">
-                <a16:creationId xmlns:a16="http://schemas.microsoft.com/office/drawing/2014/main" id="{357C38BC-22B3-37B2-E0C3-812020A76077}"/>
+                <a16:creationId xmlns:a16="http://schemas.microsoft.com/office/drawing/2014/main" id="{452B5629-FE8C-E5C6-DA49-6034F454E59C}"/>
               </a:ext>
             </a:extLst>
           </p:cNvPr>
-          <p:cNvSpPr>
-            <a:spLocks noGrp="1"/>
-          </p:cNvSpPr>
-          <p:nvPr>
-            <p:ph idx="1"/>
-          </p:nvPr>
-        </p:nvSpPr>
-        <p:spPr>
-          <a:xfrm>
-            <a:off x="581193" y="1336625"/>
-            <a:ext cx="11029615" cy="4923392"/>
-          </a:xfrm>
-        </p:spPr>
-        <p:txBody>
-          <a:bodyPr>
-            <a:normAutofit/>
-          </a:bodyPr>
-          <a:lstStyle/>
-          <a:p>
-            <a:pPr marL="305435" indent="-305435"/>
-            <a:r>
-              <a:rPr lang="en-IN" sz="1600" dirty="0"/>
-              <a:t>IBM Watson Assistant Documentation  </a:t>
-            </a:r>
-          </a:p>
-          <a:p>
-            <a:pPr marL="324000" lvl="1" indent="0">
-              <a:buNone/>
-            </a:pPr>
-            <a:r>
-              <a:rPr lang="en-IN" sz="1600" dirty="0">
-                <a:hlinkClick r:id="rId2"/>
-              </a:rPr>
-              <a:t>https://cloud.ibm.com/docs/watson-assistant</a:t>
-            </a:r>
-            <a:endParaRPr lang="en-IN" sz="1600" dirty="0"/>
-          </a:p>
-          <a:p>
-            <a:pPr marL="305435" indent="-305435"/>
-            <a:r>
-              <a:rPr lang="en-IN" sz="1600" dirty="0"/>
-              <a:t>IBM Cloud Object Storage Guide           </a:t>
-            </a:r>
-          </a:p>
-          <a:p>
-            <a:pPr marL="324000" lvl="1" indent="0">
-              <a:buNone/>
-            </a:pPr>
-            <a:r>
-              <a:rPr lang="en-IN" sz="1600" dirty="0">
-                <a:hlinkClick r:id="rId3"/>
-              </a:rPr>
-              <a:t>https://cloud.ibm.com/docs/cloud-object-storage</a:t>
-            </a:r>
-            <a:endParaRPr lang="en-IN" sz="1600" dirty="0"/>
-          </a:p>
-          <a:p>
-            <a:pPr marL="305435" indent="-305435"/>
-            <a:r>
-              <a:rPr lang="en-IN" sz="1600" dirty="0"/>
-              <a:t>IBM Watsonx.ai Studio Overview   </a:t>
-            </a:r>
-          </a:p>
-          <a:p>
-            <a:pPr marL="324000" lvl="1" indent="0">
-              <a:buNone/>
-            </a:pPr>
-            <a:r>
-              <a:rPr lang="en-IN" sz="1600" dirty="0">
-                <a:hlinkClick r:id="rId4"/>
-              </a:rPr>
-              <a:t>https://cloud.ibm.com/docs/watsonx-ai</a:t>
-            </a:r>
-            <a:endParaRPr lang="en-IN" sz="1600" dirty="0"/>
-          </a:p>
-          <a:p>
-            <a:pPr marL="305435" indent="-305435"/>
-            <a:r>
-              <a:rPr lang="en-IN" sz="1600" dirty="0"/>
-              <a:t>IBM watsonx.ai Agentic AI Lab (Foundation Model Lab)</a:t>
-            </a:r>
-            <a:br>
-              <a:rPr lang="en-IN" sz="1600" dirty="0"/>
-            </a:br>
-            <a:r>
-              <a:rPr lang="en-IN" sz="1600" dirty="0">
-                <a:hlinkClick r:id="rId5"/>
-              </a:rPr>
-              <a:t>https://dataplatform.cloud.ibm.com/docs/content/wsj/analyze-data/fm-agent-lab.html?context=wx&amp;audience=wdp#model</a:t>
-            </a:r>
-            <a:endParaRPr lang="en-IN" sz="1600" dirty="0"/>
-          </a:p>
-          <a:p>
-            <a:pPr marL="305435" indent="-305435"/>
-            <a:r>
-              <a:rPr lang="en-US" sz="1600" dirty="0"/>
-              <a:t>International Journal of Computing and Engineering </a:t>
-            </a:r>
-          </a:p>
-          <a:p>
-            <a:pPr marL="324000" lvl="1" indent="0">
-              <a:buNone/>
-            </a:pPr>
-            <a:r>
-              <a:rPr lang="en-US" sz="1600" dirty="0"/>
-              <a:t>ISSN 2958-7425 (online) </a:t>
-            </a:r>
-          </a:p>
-          <a:p>
-            <a:pPr marL="324000" lvl="1" indent="0">
-              <a:buNone/>
-            </a:pPr>
-            <a:r>
-              <a:rPr lang="en-US" sz="1600" dirty="0"/>
-              <a:t>Vol. 7, Issue No. 12, pp. 1 - 10, 2025 </a:t>
-            </a:r>
-            <a:endParaRPr lang="en-IN" sz="1600" dirty="0"/>
-          </a:p>
-          <a:p>
-            <a:pPr marL="0" indent="0">
-              <a:buNone/>
-            </a:pPr>
-            <a:endParaRPr lang="en-IN" sz="1600" dirty="0"/>
-          </a:p>
-          <a:p>
-            <a:pPr marL="0" indent="0">
-              <a:buNone/>
-            </a:pPr>
-            <a:endParaRPr lang="en-IN" sz="1600" dirty="0"/>
-          </a:p>
-        </p:txBody>
-      </p:sp>
+          <p:cNvPicPr>
+            <a:picLocks noChangeAspect="1"/>
+          </p:cNvPicPr>
+          <p:nvPr/>
+        </p:nvPicPr>
+        <p:blipFill>
+          <a:blip r:embed="rId2"/>
+          <a:stretch>
+            <a:fillRect/>
+          </a:stretch>
+        </p:blipFill>
+        <p:spPr>
+          <a:xfrm>
+            <a:off x="2685043" y="884903"/>
+            <a:ext cx="6635937" cy="5701400"/>
+          </a:xfrm>
+          <a:prstGeom prst="rect">
+            <a:avLst/>
+          </a:prstGeom>
+        </p:spPr>
+      </p:pic>
     </p:spTree>
     <p:extLst>
       <p:ext uri="{BB962C8B-B14F-4D97-AF65-F5344CB8AC3E}">
-        <p14:creationId xmlns:p14="http://schemas.microsoft.com/office/powerpoint/2010/main" val="728950222"/>
+        <p14:creationId xmlns:p14="http://schemas.microsoft.com/office/powerpoint/2010/main" val="1189541472"/>
       </p:ext>
     </p:extLst>
   </p:cSld>
@@ -4600,7 +4679,13 @@
   <p:cSld>
     <p:spTree>
       <p:nvGrpSpPr>
-        <p:cNvPr id="1" name=""/>
+        <p:cNvPr id="1" name="">
+          <a:extLst>
+            <a:ext uri="{FF2B5EF4-FFF2-40B4-BE49-F238E27FC236}">
+              <a16:creationId xmlns:a16="http://schemas.microsoft.com/office/drawing/2014/main" id="{06B7C739-D0DA-9B09-3DAB-C16532FC6347}"/>
+            </a:ext>
+          </a:extLst>
+        </p:cNvPr>
         <p:cNvGrpSpPr/>
         <p:nvPr/>
       </p:nvGrpSpPr>
@@ -4617,7 +4702,7 @@
           <p:cNvPr id="2" name="Title 1">
             <a:extLst>
               <a:ext uri="{FF2B5EF4-FFF2-40B4-BE49-F238E27FC236}">
-                <a16:creationId xmlns:a16="http://schemas.microsoft.com/office/drawing/2014/main" id="{3A492E52-0C9E-7CCC-47E8-5C4711AD23FE}"/>
+                <a16:creationId xmlns:a16="http://schemas.microsoft.com/office/drawing/2014/main" id="{8537292C-C6FB-E951-D59F-66CDA53E9B18}"/>
               </a:ext>
             </a:extLst>
           </p:cNvPr>
@@ -4639,26 +4724,69 @@
                   <a:schemeClr val="accent1"/>
                 </a:solidFill>
               </a:rPr>
-              <a:t>IBM Certifications</a:t>
+              <a:t>Results</a:t>
+            </a:r>
+          </a:p>
+        </p:txBody>
+      </p:sp>
+      <p:sp>
+        <p:nvSpPr>
+          <p:cNvPr id="5" name="TextBox 4">
+            <a:extLst>
+              <a:ext uri="{FF2B5EF4-FFF2-40B4-BE49-F238E27FC236}">
+                <a16:creationId xmlns:a16="http://schemas.microsoft.com/office/drawing/2014/main" id="{16A49521-B5B7-63EE-905D-5E4ED1D0957F}"/>
+              </a:ext>
+            </a:extLst>
+          </p:cNvPr>
+          <p:cNvSpPr txBox="1"/>
+          <p:nvPr/>
+        </p:nvSpPr>
+        <p:spPr>
+          <a:xfrm>
+            <a:off x="2712275" y="1559382"/>
+            <a:ext cx="3937052" cy="523220"/>
+          </a:xfrm>
+          <a:prstGeom prst="rect">
+            <a:avLst/>
+          </a:prstGeom>
+          <a:noFill/>
+        </p:spPr>
+        <p:txBody>
+          <a:bodyPr rot="0" spcFirstLastPara="0" vertOverflow="overflow" horzOverflow="overflow" vert="horz" wrap="square" lIns="91440" tIns="45720" rIns="91440" bIns="45720" numCol="1" spcCol="0" rtlCol="0" fromWordArt="0" anchor="t" anchorCtr="0" forceAA="0" compatLnSpc="1">
+            <a:prstTxWarp prst="textNoShape">
+              <a:avLst/>
+            </a:prstTxWarp>
+            <a:spAutoFit/>
+          </a:bodyPr>
+          <a:lstStyle/>
+          <a:p>
+            <a:r>
+              <a:rPr lang="en-US" sz="2800" dirty="0">
+                <a:solidFill>
+                  <a:schemeClr val="accent2"/>
+                </a:solidFill>
+                <a:latin typeface="Calibri"/>
+                <a:ea typeface="Calibri"/>
+                <a:cs typeface="Calibri"/>
+              </a:rPr>
+              <a:t>Deployed AI Agent</a:t>
             </a:r>
           </a:p>
         </p:txBody>
       </p:sp>
       <p:pic>
         <p:nvPicPr>
-          <p:cNvPr id="7" name="Content Placeholder 6">
+          <p:cNvPr id="6" name="Picture 5">
             <a:extLst>
               <a:ext uri="{FF2B5EF4-FFF2-40B4-BE49-F238E27FC236}">
-                <a16:creationId xmlns:a16="http://schemas.microsoft.com/office/drawing/2014/main" id="{A1958E95-1F91-E3AE-F9C5-5CDE551D91EA}"/>
+                <a16:creationId xmlns:a16="http://schemas.microsoft.com/office/drawing/2014/main" id="{76FED3E6-D266-C27C-FFD6-64059AE8A405}"/>
               </a:ext>
             </a:extLst>
           </p:cNvPr>
           <p:cNvPicPr>
-            <a:picLocks noGrp="1" noChangeAspect="1"/>
+            <a:picLocks noChangeAspect="1"/>
           </p:cNvPicPr>
-          <p:nvPr>
-            <p:ph idx="1"/>
-          </p:nvPr>
+          <p:nvPr/>
         </p:nvPicPr>
         <p:blipFill>
           <a:blip r:embed="rId2"/>
@@ -4668,15 +4796,18 @@
         </p:blipFill>
         <p:spPr>
           <a:xfrm>
-            <a:off x="2514332" y="1232452"/>
-            <a:ext cx="7081081" cy="5291167"/>
-          </a:xfrm>
+            <a:off x="1592826" y="2187803"/>
+            <a:ext cx="8573729" cy="4056773"/>
+          </a:xfrm>
+          <a:prstGeom prst="rect">
+            <a:avLst/>
+          </a:prstGeom>
         </p:spPr>
       </p:pic>
     </p:spTree>
     <p:extLst>
       <p:ext uri="{BB962C8B-B14F-4D97-AF65-F5344CB8AC3E}">
-        <p14:creationId xmlns:p14="http://schemas.microsoft.com/office/powerpoint/2010/main" val="384733178"/>
+        <p14:creationId xmlns:p14="http://schemas.microsoft.com/office/powerpoint/2010/main" val="1126302864"/>
       </p:ext>
     </p:extLst>
   </p:cSld>
@@ -4708,7 +4839,7 @@
           <p:cNvPr id="2" name="Title 1">
             <a:extLst>
               <a:ext uri="{FF2B5EF4-FFF2-40B4-BE49-F238E27FC236}">
-                <a16:creationId xmlns:a16="http://schemas.microsoft.com/office/drawing/2014/main" id="{3A492E52-0C9E-7CCC-47E8-5C4711AD23FE}"/>
+                <a16:creationId xmlns:a16="http://schemas.microsoft.com/office/drawing/2014/main" id="{FA4C6B3D-1072-C2D2-EBFE-E33CABE394D1}"/>
               </a:ext>
             </a:extLst>
           </p:cNvPr>
@@ -4719,55 +4850,88 @@
             <p:ph type="title"/>
           </p:nvPr>
         </p:nvSpPr>
-        <p:spPr/>
-        <p:txBody>
-          <a:bodyPr/>
+        <p:spPr>
+          <a:xfrm>
+            <a:off x="650018" y="932135"/>
+            <a:ext cx="9998318" cy="530296"/>
+          </a:xfrm>
+        </p:spPr>
+        <p:txBody>
+          <a:bodyPr>
+            <a:noAutofit/>
+          </a:bodyPr>
           <a:lstStyle/>
           <a:p>
             <a:r>
-              <a:rPr lang="en-IN" dirty="0">
+              <a:rPr lang="en-IN" sz="3600" dirty="0">
                 <a:solidFill>
                   <a:schemeClr val="accent1"/>
                 </a:solidFill>
               </a:rPr>
-              <a:t>IBM Certifications</a:t>
-            </a:r>
-          </a:p>
-        </p:txBody>
-      </p:sp>
-      <p:pic>
-        <p:nvPicPr>
-          <p:cNvPr id="9" name="Content Placeholder 8">
+              <a:t>Conclusion</a:t>
+            </a:r>
+          </a:p>
+        </p:txBody>
+      </p:sp>
+      <p:sp>
+        <p:nvSpPr>
+          <p:cNvPr id="3" name="Content Placeholder 2">
             <a:extLst>
               <a:ext uri="{FF2B5EF4-FFF2-40B4-BE49-F238E27FC236}">
-                <a16:creationId xmlns:a16="http://schemas.microsoft.com/office/drawing/2014/main" id="{320A4F27-2AE2-8E37-81DD-07EEFC9D075E}"/>
+                <a16:creationId xmlns:a16="http://schemas.microsoft.com/office/drawing/2014/main" id="{D4974547-DF1B-77BB-E545-9344EDB9AD3F}"/>
               </a:ext>
             </a:extLst>
           </p:cNvPr>
-          <p:cNvPicPr>
-            <a:picLocks noGrp="1" noChangeAspect="1"/>
-          </p:cNvPicPr>
+          <p:cNvSpPr>
+            <a:spLocks noGrp="1"/>
+          </p:cNvSpPr>
           <p:nvPr>
             <p:ph idx="1"/>
           </p:nvPr>
-        </p:nvPicPr>
-        <p:blipFill>
-          <a:blip r:embed="rId2"/>
-          <a:stretch>
-            <a:fillRect/>
-          </a:stretch>
-        </p:blipFill>
-        <p:spPr>
-          <a:xfrm>
-            <a:off x="2450737" y="1232452"/>
-            <a:ext cx="7052078" cy="5274385"/>
-          </a:xfrm>
-        </p:spPr>
-      </p:pic>
+        </p:nvSpPr>
+        <p:spPr>
+          <a:xfrm>
+            <a:off x="581192" y="1641986"/>
+            <a:ext cx="11029615" cy="4018731"/>
+          </a:xfrm>
+        </p:spPr>
+        <p:txBody>
+          <a:bodyPr>
+            <a:normAutofit/>
+          </a:bodyPr>
+          <a:lstStyle/>
+          <a:p>
+            <a:pPr marL="305435" indent="-305435"/>
+            <a:r>
+              <a:rPr lang="en-US" sz="2400" dirty="0"/>
+              <a:t>The solution highlights how agentic AI can transform the way learners receive guidance by delivering personalized, adaptive, and conversational support. </a:t>
+            </a:r>
+          </a:p>
+          <a:p>
+            <a:pPr marL="305435" indent="-305435"/>
+            <a:r>
+              <a:rPr lang="en-US" sz="2400" dirty="0"/>
+              <a:t>Through natural interactions, the assistant understands user goals, recommends relevant learning paths, and continuously adapts to individual progress. </a:t>
+            </a:r>
+          </a:p>
+          <a:p>
+            <a:pPr marL="305435" indent="-305435"/>
+            <a:r>
+              <a:rPr lang="en-US" sz="2400" dirty="0"/>
+              <a:t>Built on IBM Cloud Lite services with Granite foundation models, it offers a low-code, scalable approach to empower users with clear, goal-driven learning experiences.</a:t>
+            </a:r>
+            <a:endParaRPr lang="en-US" sz="2400" dirty="0">
+              <a:latin typeface="Calibri"/>
+              <a:ea typeface="Calibri"/>
+              <a:cs typeface="Calibri"/>
+            </a:endParaRPr>
+          </a:p>
+        </p:txBody>
+      </p:sp>
     </p:spTree>
     <p:extLst>
       <p:ext uri="{BB962C8B-B14F-4D97-AF65-F5344CB8AC3E}">
-        <p14:creationId xmlns:p14="http://schemas.microsoft.com/office/powerpoint/2010/main" val="4128710330"/>
+        <p14:creationId xmlns:p14="http://schemas.microsoft.com/office/powerpoint/2010/main" val="4233882376"/>
       </p:ext>
     </p:extLst>
   </p:cSld>
@@ -4796,10 +4960,10 @@
       </p:grpSpPr>
       <p:sp>
         <p:nvSpPr>
-          <p:cNvPr id="2" name="Title 1">
+          <p:cNvPr id="3" name="Content Placeholder 2">
             <a:extLst>
               <a:ext uri="{FF2B5EF4-FFF2-40B4-BE49-F238E27FC236}">
-                <a16:creationId xmlns:a16="http://schemas.microsoft.com/office/drawing/2014/main" id="{3A492E52-0C9E-7CCC-47E8-5C4711AD23FE}"/>
+                <a16:creationId xmlns:a16="http://schemas.microsoft.com/office/drawing/2014/main" id="{A6638FD1-D00E-E75B-705C-564F06D93D7B}"/>
               </a:ext>
             </a:extLst>
           </p:cNvPr>
@@ -4807,58 +4971,216 @@
             <a:spLocks noGrp="1"/>
           </p:cNvSpPr>
           <p:nvPr>
-            <p:ph type="title"/>
-          </p:nvPr>
-        </p:nvSpPr>
-        <p:spPr/>
-        <p:txBody>
-          <a:bodyPr/>
+            <p:ph idx="1"/>
+          </p:nvPr>
+        </p:nvSpPr>
+        <p:spPr>
+          <a:xfrm>
+            <a:off x="535670" y="1374955"/>
+            <a:ext cx="11029615" cy="4673324"/>
+          </a:xfrm>
+        </p:spPr>
+        <p:txBody>
+          <a:bodyPr>
+            <a:normAutofit fontScale="92500" lnSpcReduction="10000"/>
+          </a:bodyPr>
           <a:lstStyle/>
           <a:p>
-            <a:r>
-              <a:rPr lang="en-IN" dirty="0">
-                <a:solidFill>
-                  <a:schemeClr val="accent1"/>
-                </a:solidFill>
-              </a:rPr>
-              <a:t>IBM Certifications</a:t>
-            </a:r>
-          </a:p>
-        </p:txBody>
-      </p:sp>
-      <p:pic>
-        <p:nvPicPr>
-          <p:cNvPr id="9" name="Content Placeholder 8">
+            <a:pPr marL="305435" lvl="0" indent="-305435" fontAlgn="base">
+              <a:lnSpc>
+                <a:spcPct val="130000"/>
+              </a:lnSpc>
+            </a:pPr>
+            <a:r>
+              <a:rPr lang="en-US" altLang="en-US" sz="2000" dirty="0"/>
+              <a:t>Persistent User Profiles:</a:t>
+            </a:r>
+            <a:br>
+              <a:rPr lang="en-US" altLang="en-US" sz="2000" dirty="0"/>
+            </a:br>
+            <a:r>
+              <a:rPr lang="en-US" altLang="en-US" sz="2000" dirty="0"/>
+              <a:t>Implement login and user account functionality to retain learning history, preferences, and past conversations, enabling long-term personalized support.</a:t>
+            </a:r>
+          </a:p>
+          <a:p>
+            <a:pPr marL="305435" lvl="0" indent="-305435" fontAlgn="base">
+              <a:lnSpc>
+                <a:spcPct val="130000"/>
+              </a:lnSpc>
+            </a:pPr>
+            <a:r>
+              <a:rPr lang="en-US" altLang="en-US" sz="2000" dirty="0"/>
+              <a:t>Academic Data Integration:</a:t>
+            </a:r>
+            <a:br>
+              <a:rPr lang="en-US" altLang="en-US" sz="2000" dirty="0"/>
+            </a:br>
+            <a:r>
+              <a:rPr lang="en-US" altLang="en-US" sz="2000" dirty="0"/>
+              <a:t>Include additional inputs like academic performance, certifications, and resume details to further enhance the relevance and accuracy of learning path recommendations.</a:t>
+            </a:r>
+          </a:p>
+          <a:p>
+            <a:pPr marL="305435" lvl="0" indent="-305435" fontAlgn="base">
+              <a:lnSpc>
+                <a:spcPct val="130000"/>
+              </a:lnSpc>
+            </a:pPr>
+            <a:r>
+              <a:rPr lang="en-US" altLang="en-US" sz="2000" dirty="0"/>
+              <a:t>Dynamic Learning Path Updates:</a:t>
+            </a:r>
+            <a:br>
+              <a:rPr lang="en-US" altLang="en-US" sz="2000" dirty="0"/>
+            </a:br>
+            <a:r>
+              <a:rPr lang="en-US" altLang="en-US" sz="2000" dirty="0"/>
+              <a:t>Integrate external APIs (e.g., Coursera, edX, job market data) to allow AIDA to adapt roadmaps based on trending skills, course availability, and market demand.</a:t>
+            </a:r>
+          </a:p>
+          <a:p>
+            <a:pPr marL="305435" lvl="0" indent="-305435" fontAlgn="base">
+              <a:lnSpc>
+                <a:spcPct val="130000"/>
+              </a:lnSpc>
+            </a:pPr>
+            <a:r>
+              <a:rPr lang="en-US" altLang="en-US" sz="2000" dirty="0"/>
+              <a:t>Scalable Deployment:</a:t>
+            </a:r>
+            <a:br>
+              <a:rPr lang="en-US" altLang="en-US" sz="2000" dirty="0"/>
+            </a:br>
+            <a:r>
+              <a:rPr lang="en-US" altLang="en-US" sz="2000" dirty="0"/>
+              <a:t>Move beyond web preview and integrate AIDA into learning platforms, institutional portals, or mobile apps for broader adoption.</a:t>
+            </a:r>
+          </a:p>
+        </p:txBody>
+      </p:sp>
+      <p:sp>
+        <p:nvSpPr>
+          <p:cNvPr id="5" name="Title 4">
             <a:extLst>
               <a:ext uri="{FF2B5EF4-FFF2-40B4-BE49-F238E27FC236}">
-                <a16:creationId xmlns:a16="http://schemas.microsoft.com/office/drawing/2014/main" id="{D189D041-C8AF-E711-BCDA-0115521CDA14}"/>
+                <a16:creationId xmlns:a16="http://schemas.microsoft.com/office/drawing/2014/main" id="{3F968F13-9AC4-7120-7ACD-9F752C767D5D}"/>
               </a:ext>
             </a:extLst>
           </p:cNvPr>
-          <p:cNvPicPr>
-            <a:picLocks noGrp="1" noChangeAspect="1"/>
-          </p:cNvPicPr>
-          <p:nvPr>
-            <p:ph idx="1"/>
-          </p:nvPr>
-        </p:nvPicPr>
-        <p:blipFill>
-          <a:blip r:embed="rId2"/>
-          <a:stretch>
-            <a:fillRect/>
-          </a:stretch>
-        </p:blipFill>
-        <p:spPr>
-          <a:xfrm>
-            <a:off x="1943782" y="1232452"/>
-            <a:ext cx="8304435" cy="5109447"/>
-          </a:xfrm>
-        </p:spPr>
-      </p:pic>
+          <p:cNvSpPr txBox="1">
+            <a:spLocks/>
+          </p:cNvSpPr>
+          <p:nvPr/>
+        </p:nvSpPr>
+        <p:spPr>
+          <a:xfrm>
+            <a:off x="535670" y="844659"/>
+            <a:ext cx="11029616" cy="530296"/>
+          </a:xfrm>
+          <a:prstGeom prst="rect">
+            <a:avLst/>
+          </a:prstGeom>
+        </p:spPr>
+        <p:txBody>
+          <a:bodyPr vert="horz" lIns="91440" tIns="45720" rIns="91440" bIns="45720" rtlCol="0" anchor="b">
+            <a:noAutofit/>
+          </a:bodyPr>
+          <a:lstStyle>
+            <a:lvl1pPr algn="l" defTabSz="457200" rtl="0" eaLnBrk="1" latinLnBrk="0" hangingPunct="1">
+              <a:lnSpc>
+                <a:spcPct val="100000"/>
+              </a:lnSpc>
+              <a:spcBef>
+                <a:spcPct val="0"/>
+              </a:spcBef>
+              <a:buNone/>
+              <a:defRPr sz="2800" b="0" kern="1200" cap="all">
+                <a:solidFill>
+                  <a:schemeClr val="tx1">
+                    <a:lumMod val="75000"/>
+                    <a:lumOff val="25000"/>
+                  </a:schemeClr>
+                </a:solidFill>
+                <a:latin typeface="+mj-lt"/>
+                <a:ea typeface="+mj-ea"/>
+                <a:cs typeface="+mj-cs"/>
+              </a:defRPr>
+            </a:lvl1pPr>
+            <a:lvl2pPr eaLnBrk="1" hangingPunct="1">
+              <a:defRPr>
+                <a:solidFill>
+                  <a:schemeClr val="tx2"/>
+                </a:solidFill>
+              </a:defRPr>
+            </a:lvl2pPr>
+            <a:lvl3pPr eaLnBrk="1" hangingPunct="1">
+              <a:defRPr>
+                <a:solidFill>
+                  <a:schemeClr val="tx2"/>
+                </a:solidFill>
+              </a:defRPr>
+            </a:lvl3pPr>
+            <a:lvl4pPr eaLnBrk="1" hangingPunct="1">
+              <a:defRPr>
+                <a:solidFill>
+                  <a:schemeClr val="tx2"/>
+                </a:solidFill>
+              </a:defRPr>
+            </a:lvl4pPr>
+            <a:lvl5pPr eaLnBrk="1" hangingPunct="1">
+              <a:defRPr>
+                <a:solidFill>
+                  <a:schemeClr val="tx2"/>
+                </a:solidFill>
+              </a:defRPr>
+            </a:lvl5pPr>
+            <a:lvl6pPr eaLnBrk="1" hangingPunct="1">
+              <a:defRPr>
+                <a:solidFill>
+                  <a:schemeClr val="tx2"/>
+                </a:solidFill>
+              </a:defRPr>
+            </a:lvl6pPr>
+            <a:lvl7pPr eaLnBrk="1" hangingPunct="1">
+              <a:defRPr>
+                <a:solidFill>
+                  <a:schemeClr val="tx2"/>
+                </a:solidFill>
+              </a:defRPr>
+            </a:lvl7pPr>
+            <a:lvl8pPr eaLnBrk="1" hangingPunct="1">
+              <a:defRPr>
+                <a:solidFill>
+                  <a:schemeClr val="tx2"/>
+                </a:solidFill>
+              </a:defRPr>
+            </a:lvl8pPr>
+            <a:lvl9pPr eaLnBrk="1" hangingPunct="1">
+              <a:defRPr>
+                <a:solidFill>
+                  <a:schemeClr val="tx2"/>
+                </a:solidFill>
+              </a:defRPr>
+            </a:lvl9pPr>
+          </a:lstStyle>
+          <a:p>
+            <a:r>
+              <a:rPr lang="en-US" sz="3600" dirty="0">
+                <a:solidFill>
+                  <a:schemeClr val="accent1"/>
+                </a:solidFill>
+                <a:cs typeface="Arial"/>
+              </a:rPr>
+              <a:t>Future scope</a:t>
+            </a:r>
+          </a:p>
+        </p:txBody>
+      </p:sp>
     </p:spTree>
     <p:extLst>
       <p:ext uri="{BB962C8B-B14F-4D97-AF65-F5344CB8AC3E}">
-        <p14:creationId xmlns:p14="http://schemas.microsoft.com/office/powerpoint/2010/main" val="2171852726"/>
+        <p14:creationId xmlns:p14="http://schemas.microsoft.com/office/powerpoint/2010/main" val="614882681"/>
       </p:ext>
     </p:extLst>
   </p:cSld>
@@ -4887,6 +5209,391 @@
       </p:grpSpPr>
       <p:sp>
         <p:nvSpPr>
+          <p:cNvPr id="2" name="Title 1">
+            <a:extLst>
+              <a:ext uri="{FF2B5EF4-FFF2-40B4-BE49-F238E27FC236}">
+                <a16:creationId xmlns:a16="http://schemas.microsoft.com/office/drawing/2014/main" id="{3A492E52-0C9E-7CCC-47E8-5C4711AD23FE}"/>
+              </a:ext>
+            </a:extLst>
+          </p:cNvPr>
+          <p:cNvSpPr>
+            <a:spLocks noGrp="1"/>
+          </p:cNvSpPr>
+          <p:nvPr>
+            <p:ph type="title"/>
+          </p:nvPr>
+        </p:nvSpPr>
+        <p:spPr/>
+        <p:txBody>
+          <a:bodyPr/>
+          <a:lstStyle/>
+          <a:p>
+            <a:r>
+              <a:rPr lang="en-IN" dirty="0">
+                <a:solidFill>
+                  <a:schemeClr val="accent1"/>
+                </a:solidFill>
+              </a:rPr>
+              <a:t>IBM Certifications</a:t>
+            </a:r>
+          </a:p>
+        </p:txBody>
+      </p:sp>
+      <p:pic>
+        <p:nvPicPr>
+          <p:cNvPr id="4" name="Content Placeholder 6">
+            <a:extLst>
+              <a:ext uri="{FF2B5EF4-FFF2-40B4-BE49-F238E27FC236}">
+                <a16:creationId xmlns:a16="http://schemas.microsoft.com/office/drawing/2014/main" id="{A1958E95-1F91-E3AE-F9C5-5CDE551D91EA}"/>
+              </a:ext>
+            </a:extLst>
+          </p:cNvPr>
+          <p:cNvPicPr>
+            <a:picLocks noGrp="1" noChangeAspect="1"/>
+          </p:cNvPicPr>
+          <p:nvPr>
+            <p:ph idx="1"/>
+          </p:nvPr>
+        </p:nvPicPr>
+        <p:blipFill>
+          <a:blip r:embed="rId2"/>
+          <a:stretch>
+            <a:fillRect/>
+          </a:stretch>
+        </p:blipFill>
+        <p:spPr>
+          <a:xfrm>
+            <a:off x="2968699" y="1301750"/>
+            <a:ext cx="6254602" cy="4673600"/>
+          </a:xfrm>
+          <a:prstGeom prst="rect">
+            <a:avLst/>
+          </a:prstGeom>
+        </p:spPr>
+      </p:pic>
+    </p:spTree>
+    <p:extLst>
+      <p:ext uri="{BB962C8B-B14F-4D97-AF65-F5344CB8AC3E}">
+        <p14:creationId xmlns:p14="http://schemas.microsoft.com/office/powerpoint/2010/main" val="384733178"/>
+      </p:ext>
+    </p:extLst>
+  </p:cSld>
+  <p:clrMapOvr>
+    <a:masterClrMapping/>
+  </p:clrMapOvr>
+</p:sld>
+</file>
+
+<file path=ppt/slides/slide15.xml><?xml version="1.0" encoding="utf-8"?>
+<p:sld xmlns:a="http://schemas.openxmlformats.org/drawingml/2006/main" xmlns:r="http://schemas.openxmlformats.org/officeDocument/2006/relationships" xmlns:p="http://schemas.openxmlformats.org/presentationml/2006/main">
+  <p:cSld>
+    <p:spTree>
+      <p:nvGrpSpPr>
+        <p:cNvPr id="1" name=""/>
+        <p:cNvGrpSpPr/>
+        <p:nvPr/>
+      </p:nvGrpSpPr>
+      <p:grpSpPr>
+        <a:xfrm>
+          <a:off x="0" y="0"/>
+          <a:ext cx="0" cy="0"/>
+          <a:chOff x="0" y="0"/>
+          <a:chExt cx="0" cy="0"/>
+        </a:xfrm>
+      </p:grpSpPr>
+      <p:pic>
+        <p:nvPicPr>
+          <p:cNvPr id="2" name="Content Placeholder 8">
+            <a:extLst>
+              <a:ext uri="{FF2B5EF4-FFF2-40B4-BE49-F238E27FC236}">
+                <a16:creationId xmlns:a16="http://schemas.microsoft.com/office/drawing/2014/main" id="{320A4F27-2AE2-8E37-81DD-07EEFC9D075E}"/>
+              </a:ext>
+            </a:extLst>
+          </p:cNvPr>
+          <p:cNvPicPr>
+            <a:picLocks noGrp="1" noChangeAspect="1"/>
+          </p:cNvPicPr>
+          <p:nvPr/>
+        </p:nvPicPr>
+        <p:blipFill>
+          <a:blip r:embed="rId2"/>
+          <a:stretch>
+            <a:fillRect/>
+          </a:stretch>
+        </p:blipFill>
+        <p:spPr>
+          <a:xfrm>
+            <a:off x="2569961" y="1332581"/>
+            <a:ext cx="7052078" cy="5274385"/>
+          </a:xfrm>
+          <a:prstGeom prst="rect">
+            <a:avLst/>
+          </a:prstGeom>
+        </p:spPr>
+      </p:pic>
+      <p:sp>
+        <p:nvSpPr>
+          <p:cNvPr id="3" name="Title 1">
+            <a:extLst>
+              <a:ext uri="{FF2B5EF4-FFF2-40B4-BE49-F238E27FC236}">
+                <a16:creationId xmlns:a16="http://schemas.microsoft.com/office/drawing/2014/main" id="{1C55CB8F-53AA-9653-C51E-C807A0A75C59}"/>
+              </a:ext>
+            </a:extLst>
+          </p:cNvPr>
+          <p:cNvSpPr>
+            <a:spLocks noGrp="1"/>
+          </p:cNvSpPr>
+          <p:nvPr>
+            <p:ph type="title"/>
+          </p:nvPr>
+        </p:nvSpPr>
+        <p:spPr>
+          <a:xfrm>
+            <a:off x="581192" y="702156"/>
+            <a:ext cx="11029616" cy="530296"/>
+          </a:xfrm>
+        </p:spPr>
+        <p:txBody>
+          <a:bodyPr/>
+          <a:lstStyle/>
+          <a:p>
+            <a:r>
+              <a:rPr lang="en-IN" dirty="0">
+                <a:solidFill>
+                  <a:schemeClr val="accent1"/>
+                </a:solidFill>
+              </a:rPr>
+              <a:t>IBM Certifications</a:t>
+            </a:r>
+          </a:p>
+        </p:txBody>
+      </p:sp>
+    </p:spTree>
+    <p:extLst>
+      <p:ext uri="{BB962C8B-B14F-4D97-AF65-F5344CB8AC3E}">
+        <p14:creationId xmlns:p14="http://schemas.microsoft.com/office/powerpoint/2010/main" val="1406661210"/>
+      </p:ext>
+    </p:extLst>
+  </p:cSld>
+  <p:clrMapOvr>
+    <a:masterClrMapping/>
+  </p:clrMapOvr>
+</p:sld>
+</file>
+
+<file path=ppt/slides/slide16.xml><?xml version="1.0" encoding="utf-8"?>
+<p:sld xmlns:a="http://schemas.openxmlformats.org/drawingml/2006/main" xmlns:r="http://schemas.openxmlformats.org/officeDocument/2006/relationships" xmlns:p="http://schemas.openxmlformats.org/presentationml/2006/main">
+  <p:cSld>
+    <p:spTree>
+      <p:nvGrpSpPr>
+        <p:cNvPr id="1" name=""/>
+        <p:cNvGrpSpPr/>
+        <p:nvPr/>
+      </p:nvGrpSpPr>
+      <p:grpSpPr>
+        <a:xfrm>
+          <a:off x="0" y="0"/>
+          <a:ext cx="0" cy="0"/>
+          <a:chOff x="0" y="0"/>
+          <a:chExt cx="0" cy="0"/>
+        </a:xfrm>
+      </p:grpSpPr>
+      <p:pic>
+        <p:nvPicPr>
+          <p:cNvPr id="2" name="Content Placeholder 8">
+            <a:extLst>
+              <a:ext uri="{FF2B5EF4-FFF2-40B4-BE49-F238E27FC236}">
+                <a16:creationId xmlns:a16="http://schemas.microsoft.com/office/drawing/2014/main" id="{D189D041-C8AF-E711-BCDA-0115521CDA14}"/>
+              </a:ext>
+            </a:extLst>
+          </p:cNvPr>
+          <p:cNvPicPr>
+            <a:picLocks noGrp="1" noChangeAspect="1"/>
+          </p:cNvPicPr>
+          <p:nvPr/>
+        </p:nvPicPr>
+        <p:blipFill>
+          <a:blip r:embed="rId2"/>
+          <a:stretch>
+            <a:fillRect/>
+          </a:stretch>
+        </p:blipFill>
+        <p:spPr>
+          <a:xfrm>
+            <a:off x="1943782" y="1306897"/>
+            <a:ext cx="8304435" cy="5109447"/>
+          </a:xfrm>
+          <a:prstGeom prst="rect">
+            <a:avLst/>
+          </a:prstGeom>
+        </p:spPr>
+      </p:pic>
+      <p:sp>
+        <p:nvSpPr>
+          <p:cNvPr id="3" name="Title 1">
+            <a:extLst>
+              <a:ext uri="{FF2B5EF4-FFF2-40B4-BE49-F238E27FC236}">
+                <a16:creationId xmlns:a16="http://schemas.microsoft.com/office/drawing/2014/main" id="{2C571301-D7E8-C66D-77E9-B253DC04180D}"/>
+              </a:ext>
+            </a:extLst>
+          </p:cNvPr>
+          <p:cNvSpPr>
+            <a:spLocks noGrp="1"/>
+          </p:cNvSpPr>
+          <p:nvPr>
+            <p:ph type="title"/>
+          </p:nvPr>
+        </p:nvSpPr>
+        <p:spPr>
+          <a:xfrm>
+            <a:off x="581192" y="702156"/>
+            <a:ext cx="11029616" cy="530296"/>
+          </a:xfrm>
+        </p:spPr>
+        <p:txBody>
+          <a:bodyPr/>
+          <a:lstStyle/>
+          <a:p>
+            <a:r>
+              <a:rPr lang="en-IN" dirty="0">
+                <a:solidFill>
+                  <a:schemeClr val="accent1"/>
+                </a:solidFill>
+              </a:rPr>
+              <a:t>IBM Certifications</a:t>
+            </a:r>
+          </a:p>
+        </p:txBody>
+      </p:sp>
+    </p:spTree>
+    <p:extLst>
+      <p:ext uri="{BB962C8B-B14F-4D97-AF65-F5344CB8AC3E}">
+        <p14:creationId xmlns:p14="http://schemas.microsoft.com/office/powerpoint/2010/main" val="1098887119"/>
+      </p:ext>
+    </p:extLst>
+  </p:cSld>
+  <p:clrMapOvr>
+    <a:masterClrMapping/>
+  </p:clrMapOvr>
+</p:sld>
+</file>
+
+<file path=ppt/slides/slide17.xml><?xml version="1.0" encoding="utf-8"?>
+<p:sld xmlns:a="http://schemas.openxmlformats.org/drawingml/2006/main" xmlns:r="http://schemas.openxmlformats.org/officeDocument/2006/relationships" xmlns:p="http://schemas.openxmlformats.org/presentationml/2006/main">
+  <p:cSld>
+    <p:spTree>
+      <p:nvGrpSpPr>
+        <p:cNvPr id="1" name=""/>
+        <p:cNvGrpSpPr/>
+        <p:nvPr/>
+      </p:nvGrpSpPr>
+      <p:grpSpPr>
+        <a:xfrm>
+          <a:off x="0" y="0"/>
+          <a:ext cx="0" cy="0"/>
+          <a:chOff x="0" y="0"/>
+          <a:chExt cx="0" cy="0"/>
+        </a:xfrm>
+      </p:grpSpPr>
+      <p:sp>
+        <p:nvSpPr>
+          <p:cNvPr id="2" name="Title 1">
+            <a:extLst>
+              <a:ext uri="{FF2B5EF4-FFF2-40B4-BE49-F238E27FC236}">
+                <a16:creationId xmlns:a16="http://schemas.microsoft.com/office/drawing/2014/main" id="{48E9F08C-D61F-627D-C4E5-397E3E84FC45}"/>
+              </a:ext>
+            </a:extLst>
+          </p:cNvPr>
+          <p:cNvSpPr>
+            <a:spLocks noGrp="1"/>
+          </p:cNvSpPr>
+          <p:nvPr>
+            <p:ph type="title"/>
+          </p:nvPr>
+        </p:nvSpPr>
+        <p:spPr/>
+        <p:txBody>
+          <a:bodyPr/>
+          <a:lstStyle/>
+          <a:p>
+            <a:r>
+              <a:rPr lang="en-IN" dirty="0">
+                <a:solidFill>
+                  <a:schemeClr val="accent1"/>
+                </a:solidFill>
+              </a:rPr>
+              <a:t>GitHub Link</a:t>
+            </a:r>
+          </a:p>
+        </p:txBody>
+      </p:sp>
+      <p:sp>
+        <p:nvSpPr>
+          <p:cNvPr id="4" name="Rectangle 3"/>
+          <p:cNvSpPr/>
+          <p:nvPr/>
+        </p:nvSpPr>
+        <p:spPr>
+          <a:xfrm>
+            <a:off x="2147443" y="2530452"/>
+            <a:ext cx="6642595" cy="369332"/>
+          </a:xfrm>
+          <a:prstGeom prst="rect">
+            <a:avLst/>
+          </a:prstGeom>
+        </p:spPr>
+        <p:txBody>
+          <a:bodyPr wrap="square">
+            <a:spAutoFit/>
+          </a:bodyPr>
+          <a:lstStyle/>
+          <a:p>
+            <a:r>
+              <a:rPr lang="en-IN" dirty="0"/>
+              <a:t>GitHub link : </a:t>
+            </a:r>
+            <a:r>
+              <a:rPr lang="en-IN" dirty="0">
+                <a:hlinkClick r:id="rId2"/>
+              </a:rPr>
+              <a:t>https://github.com/ParimalAhire/PathCraft-AIDA</a:t>
+            </a:r>
+            <a:endParaRPr lang="en-IN" dirty="0"/>
+          </a:p>
+        </p:txBody>
+      </p:sp>
+    </p:spTree>
+    <p:extLst>
+      <p:ext uri="{BB962C8B-B14F-4D97-AF65-F5344CB8AC3E}">
+        <p14:creationId xmlns:p14="http://schemas.microsoft.com/office/powerpoint/2010/main" val="2230664768"/>
+      </p:ext>
+    </p:extLst>
+  </p:cSld>
+  <p:clrMapOvr>
+    <a:masterClrMapping/>
+  </p:clrMapOvr>
+</p:sld>
+</file>
+
+<file path=ppt/slides/slide18.xml><?xml version="1.0" encoding="utf-8"?>
+<p:sld xmlns:a="http://schemas.openxmlformats.org/drawingml/2006/main" xmlns:r="http://schemas.openxmlformats.org/officeDocument/2006/relationships" xmlns:p="http://schemas.openxmlformats.org/presentationml/2006/main">
+  <p:cSld>
+    <p:spTree>
+      <p:nvGrpSpPr>
+        <p:cNvPr id="1" name=""/>
+        <p:cNvGrpSpPr/>
+        <p:nvPr/>
+      </p:nvGrpSpPr>
+      <p:grpSpPr>
+        <a:xfrm>
+          <a:off x="0" y="0"/>
+          <a:ext cx="0" cy="0"/>
+          <a:chOff x="0" y="0"/>
+          <a:chExt cx="0" cy="0"/>
+        </a:xfrm>
+      </p:grpSpPr>
+      <p:sp>
+        <p:nvSpPr>
           <p:cNvPr id="5" name="Title 4">
             <a:extLst>
               <a:ext uri="{FF2B5EF4-FFF2-40B4-BE49-F238E27FC236}">
@@ -4908,16 +5615,18 @@
           </a:xfrm>
         </p:spPr>
         <p:txBody>
-          <a:bodyPr/>
+          <a:bodyPr>
+            <a:normAutofit/>
+          </a:bodyPr>
           <a:lstStyle/>
           <a:p>
             <a:pPr algn="ctr"/>
             <a:r>
-              <a:rPr lang="en-US" b="1">
+              <a:rPr lang="en-US" sz="4000" dirty="0">
                 <a:solidFill>
                   <a:srgbClr val="002060"/>
                 </a:solidFill>
-                <a:latin typeface="Arial" panose="020B0604020202020204" pitchFamily="34" charset="0"/>
+                <a:latin typeface="+mn-lt"/>
                 <a:cs typeface="Arial" panose="020B0604020202020204" pitchFamily="34" charset="0"/>
               </a:rPr>
               <a:t>THANK YOU</a:t>
@@ -4973,8 +5682,8 @@
         </p:nvSpPr>
         <p:spPr>
           <a:xfrm>
-            <a:off x="849573" y="707923"/>
-            <a:ext cx="10515600" cy="589936"/>
+            <a:off x="849573" y="558468"/>
+            <a:ext cx="10515600" cy="1325563"/>
           </a:xfrm>
         </p:spPr>
         <p:txBody>
@@ -4982,7 +5691,7 @@
           <a:lstStyle/>
           <a:p>
             <a:r>
-              <a:rPr lang="en-US" b="1" dirty="0">
+              <a:rPr lang="en-US" b="1">
                 <a:solidFill>
                   <a:srgbClr val="002060"/>
                 </a:solidFill>
@@ -5012,7 +5721,7 @@
         </p:nvSpPr>
         <p:spPr>
           <a:xfrm>
-            <a:off x="671052" y="1297859"/>
+            <a:off x="849573" y="1461920"/>
             <a:ext cx="11019020" cy="5239062"/>
           </a:xfrm>
         </p:spPr>
@@ -5046,12 +5755,8 @@
                 <a:ea typeface="+mn-lt"/>
                 <a:cs typeface="Arial"/>
               </a:rPr>
-              <a:t>Problem Statement</a:t>
-            </a:r>
-            <a:endParaRPr lang="en-US" dirty="0">
-              <a:latin typeface="Arial"/>
-              <a:cs typeface="Arial"/>
-            </a:endParaRPr>
+              <a:t>Problem Statement </a:t>
+            </a:r>
           </a:p>
           <a:p>
             <a:pPr marL="305435" indent="-305435"/>
@@ -5061,7 +5766,7 @@
                 <a:ea typeface="+mn-lt"/>
                 <a:cs typeface="Arial"/>
               </a:rPr>
-              <a:t>Proposed System/Solution</a:t>
+              <a:t>Technology used</a:t>
             </a:r>
             <a:endParaRPr lang="en-US" dirty="0">
               <a:latin typeface="Arial"/>
@@ -5070,23 +5775,15 @@
           </a:p>
           <a:p>
             <a:pPr marL="305435" indent="-305435"/>
-            <a:r>
-              <a:rPr lang="en-US" sz="2000" b="1" dirty="0">
-                <a:latin typeface="Arial"/>
-                <a:ea typeface="+mn-lt"/>
-                <a:cs typeface="Calibri"/>
-              </a:rPr>
-              <a:t>System </a:t>
-            </a:r>
             <a:r>
               <a:rPr lang="en-US" sz="2000" b="1" dirty="0">
                 <a:latin typeface="Arial"/>
                 <a:ea typeface="+mn-lt"/>
                 <a:cs typeface="+mn-lt"/>
               </a:rPr>
-              <a:t>Development Approach</a:t>
-            </a:r>
-            <a:endParaRPr lang="en-US" dirty="0">
+              <a:t>Wow factor </a:t>
+            </a:r>
+            <a:endParaRPr lang="en-US" sz="2000" dirty="0">
               <a:latin typeface="Arial"/>
               <a:ea typeface="+mn-lt"/>
               <a:cs typeface="+mn-lt"/>
@@ -5100,12 +5797,8 @@
                 <a:ea typeface="+mn-lt"/>
                 <a:cs typeface="+mn-lt"/>
               </a:rPr>
-              <a:t>Algorithm &amp; Deployment  </a:t>
-            </a:r>
-            <a:endParaRPr lang="en-US" dirty="0">
-              <a:latin typeface="Arial"/>
-              <a:cs typeface="Calibri"/>
-            </a:endParaRPr>
+              <a:t>End users</a:t>
+            </a:r>
           </a:p>
           <a:p>
             <a:pPr marL="305435" indent="-305435"/>
@@ -5113,7 +5806,7 @@
               <a:rPr lang="en-US" sz="2000" b="1" dirty="0">
                 <a:latin typeface="Arial"/>
                 <a:ea typeface="+mn-lt"/>
-                <a:cs typeface="Arial"/>
+                <a:cs typeface="+mn-lt"/>
               </a:rPr>
               <a:t>Result</a:t>
             </a:r>
@@ -5124,14 +5817,10 @@
               <a:rPr lang="en-US" sz="2000" b="1" dirty="0">
                 <a:latin typeface="Arial"/>
                 <a:ea typeface="+mn-lt"/>
-                <a:cs typeface="Arial"/>
+                <a:cs typeface="+mn-lt"/>
               </a:rPr>
               <a:t>Conclusion</a:t>
             </a:r>
-            <a:endParaRPr lang="en-US" dirty="0">
-              <a:latin typeface="Arial"/>
-              <a:cs typeface="Arial"/>
-            </a:endParaRPr>
           </a:p>
           <a:p>
             <a:pPr marL="305435" indent="-305435"/>
@@ -5139,9 +5828,9 @@
               <a:rPr lang="en-US" sz="2000" b="1" dirty="0">
                 <a:latin typeface="Arial"/>
                 <a:ea typeface="+mn-lt"/>
-                <a:cs typeface="Arial"/>
+                <a:cs typeface="+mn-lt"/>
               </a:rPr>
-              <a:t>Future Scope</a:t>
+              <a:t>Git-hub Link</a:t>
             </a:r>
           </a:p>
           <a:p>
@@ -5150,13 +5839,28 @@
               <a:rPr lang="en-US" sz="2000" b="1" dirty="0">
                 <a:latin typeface="Arial"/>
                 <a:ea typeface="+mn-lt"/>
-                <a:cs typeface="Arial"/>
+                <a:cs typeface="+mn-lt"/>
               </a:rPr>
-              <a:t>References</a:t>
-            </a:r>
-            <a:endParaRPr lang="en-US" dirty="0">
+              <a:t>Future scope</a:t>
+            </a:r>
+          </a:p>
+          <a:p>
+            <a:pPr marL="305435" indent="-305435"/>
+            <a:r>
+              <a:rPr lang="en-US" sz="2000" b="1" dirty="0">
+                <a:latin typeface="Arial"/>
+                <a:ea typeface="+mn-lt"/>
+                <a:cs typeface="+mn-lt"/>
+              </a:rPr>
+              <a:t>IBM Certifications</a:t>
+            </a:r>
+          </a:p>
+          <a:p>
+            <a:pPr marL="305435" indent="-305435"/>
+            <a:endParaRPr lang="en-US" sz="2000" b="1" dirty="0">
               <a:latin typeface="Arial"/>
-              <a:cs typeface="Arial"/>
+              <a:ea typeface="+mn-lt"/>
+              <a:cs typeface="+mn-lt"/>
             </a:endParaRPr>
           </a:p>
           <a:p>
@@ -5214,12 +5918,7 @@
             <p:ph type="title"/>
           </p:nvPr>
         </p:nvSpPr>
-        <p:spPr>
-          <a:xfrm>
-            <a:off x="581191" y="875716"/>
-            <a:ext cx="11029616" cy="530296"/>
-          </a:xfrm>
-        </p:spPr>
+        <p:spPr/>
         <p:txBody>
           <a:bodyPr>
             <a:normAutofit fontScale="90000"/>
@@ -5227,11 +5926,10 @@
           <a:lstStyle/>
           <a:p>
             <a:r>
-              <a:rPr lang="en-US" sz="4400" b="1" dirty="0">
+              <a:rPr lang="en-US" sz="4400" dirty="0">
                 <a:solidFill>
                   <a:schemeClr val="accent1"/>
                 </a:solidFill>
-                <a:latin typeface="Arial" panose="020B0604020202020204" pitchFamily="34" charset="0"/>
                 <a:cs typeface="Arial" panose="020B0604020202020204" pitchFamily="34" charset="0"/>
               </a:rPr>
               <a:t>Problem Statement</a:t>
@@ -5258,8 +5956,8 @@
         </p:nvSpPr>
         <p:spPr>
           <a:xfrm>
-            <a:off x="581192" y="1548903"/>
-            <a:ext cx="11029615" cy="3760193"/>
+            <a:off x="581192" y="967304"/>
+            <a:ext cx="10900825" cy="4923392"/>
           </a:xfrm>
         </p:spPr>
         <p:txBody>
@@ -5272,9 +5970,50 @@
               <a:buNone/>
             </a:pPr>
             <a:r>
-              <a:rPr lang="en-US" sz="2000" dirty="0"/>
-              <a:t>Students today face an overwhelming number of online courses, platforms, and specializations, making it difficult to choose the right learning path. Many struggle to align their educational journey with personal interests, skill levels, and long-term career goals. This often leads to wasted time, confusion, and low motivation. Generic recommendation systems fail to offer the depth of personalization learners need. Without tailored guidance, students may follow the wrong path or abandon learning altogether. There is a pressing need for an intelligent, adaptable system that understands each learner’s context and provides dynamic, evolving support. Such a solution should actively guide users, respond to their progress, and help them make informed decisions throughout their journey.</a:t>
-            </a:r>
+              <a:rPr lang="en-US" sz="2000" dirty="0">
+                <a:ea typeface="Calibri" panose="020F0502020204030204" pitchFamily="34" charset="0"/>
+                <a:cs typeface="Calibri" panose="020F0502020204030204" pitchFamily="34" charset="0"/>
+              </a:rPr>
+              <a:t>Students and early-career professionals often face difficulty navigating the vast and unstructured landscape of online learning resources. With no personalized guidance or real-time support, they struggle to identify the right learning paths aligned with their goals, current skills, and interests, leading to confusion and inefficiency in skill development.</a:t>
+            </a:r>
+          </a:p>
+          <a:p>
+            <a:pPr marL="0" indent="0">
+              <a:buNone/>
+            </a:pPr>
+            <a:r>
+              <a:rPr lang="en-US" sz="2000" dirty="0">
+                <a:ea typeface="Calibri" panose="020F0502020204030204" pitchFamily="34" charset="0"/>
+                <a:cs typeface="Calibri" panose="020F0502020204030204" pitchFamily="34" charset="0"/>
+              </a:rPr>
+              <a:t>Proposed Solution:</a:t>
+            </a:r>
+            <a:br>
+              <a:rPr lang="en-US" sz="2000" dirty="0">
+                <a:ea typeface="Calibri" panose="020F0502020204030204" pitchFamily="34" charset="0"/>
+                <a:cs typeface="Calibri" panose="020F0502020204030204" pitchFamily="34" charset="0"/>
+              </a:rPr>
+            </a:br>
+            <a:r>
+              <a:rPr lang="en-US" sz="2000" dirty="0">
+                <a:ea typeface="Calibri" panose="020F0502020204030204" pitchFamily="34" charset="0"/>
+                <a:cs typeface="Calibri" panose="020F0502020204030204" pitchFamily="34" charset="0"/>
+              </a:rPr>
+              <a:t>An agentic AI learning assistant named AIDA, built using IBM watsonx.ai and powered by a Granite foundation model, interacts with users to understand their interests, goals, and current skill levels. It dynamically constructs and refines personalized learning paths by recommending relevant courses, resources, and skill-building strategies. Through ongoing dialogue, AIDA adapts its guidance in real time, offering tailored support and motivation to help learners progress effectively.</a:t>
+            </a:r>
+            <a:br>
+              <a:rPr lang="en-US" sz="2000" dirty="0">
+                <a:ea typeface="Calibri" panose="020F0502020204030204" pitchFamily="34" charset="0"/>
+                <a:cs typeface="Calibri" panose="020F0502020204030204" pitchFamily="34" charset="0"/>
+              </a:rPr>
+            </a:br>
+            <a:endParaRPr lang="en-US" sz="800" dirty="0">
+              <a:solidFill>
+                <a:srgbClr val="404040"/>
+              </a:solidFill>
+              <a:ea typeface="Calibri" panose="020F0502020204030204" pitchFamily="34" charset="0"/>
+              <a:cs typeface="Calibri" panose="020F0502020204030204" pitchFamily="34" charset="0"/>
+            </a:endParaRPr>
           </a:p>
         </p:txBody>
       </p:sp>
@@ -5324,7 +6063,12 @@
             <p:ph type="title"/>
           </p:nvPr>
         </p:nvSpPr>
-        <p:spPr/>
+        <p:spPr>
+          <a:xfrm>
+            <a:off x="856495" y="908633"/>
+            <a:ext cx="11029616" cy="530296"/>
+          </a:xfrm>
+        </p:spPr>
         <p:txBody>
           <a:bodyPr>
             <a:normAutofit fontScale="90000"/>
@@ -5332,196 +6076,75 @@
           <a:lstStyle/>
           <a:p>
             <a:r>
-              <a:rPr lang="en-US" sz="4400" b="1">
+              <a:rPr lang="en-US" sz="4400" dirty="0">
                 <a:solidFill>
                   <a:schemeClr val="accent1"/>
                 </a:solidFill>
-                <a:latin typeface="Arial" panose="020B0604020202020204" pitchFamily="34" charset="0"/>
                 <a:cs typeface="Arial" panose="020B0604020202020204" pitchFamily="34" charset="0"/>
               </a:rPr>
-              <a:t>Proposed Solution</a:t>
-            </a:r>
-            <a:endParaRPr lang="en-US" sz="4400"/>
-          </a:p>
-        </p:txBody>
-      </p:sp>
-      <p:sp>
-        <p:nvSpPr>
-          <p:cNvPr id="3" name="TextBox 2">
+              <a:t>Technology  used</a:t>
+            </a:r>
+            <a:endParaRPr lang="en-US" sz="4400" dirty="0"/>
+          </a:p>
+        </p:txBody>
+      </p:sp>
+      <p:sp>
+        <p:nvSpPr>
+          <p:cNvPr id="2" name="Content Placeholder 1">
             <a:extLst>
               <a:ext uri="{FF2B5EF4-FFF2-40B4-BE49-F238E27FC236}">
-                <a16:creationId xmlns:a16="http://schemas.microsoft.com/office/drawing/2014/main" id="{E8C5CC2C-57EC-4E9C-F532-A009AA66C00E}"/>
+                <a16:creationId xmlns:a16="http://schemas.microsoft.com/office/drawing/2014/main" id="{E041FD9D-DF07-9C37-1E61-1D920E0EF1D4}"/>
               </a:ext>
             </a:extLst>
           </p:cNvPr>
-          <p:cNvSpPr txBox="1"/>
-          <p:nvPr/>
-        </p:nvSpPr>
-        <p:spPr>
-          <a:xfrm>
-            <a:off x="510515" y="1414728"/>
-            <a:ext cx="11170970" cy="4758226"/>
-          </a:xfrm>
-          <a:prstGeom prst="rect">
-            <a:avLst/>
-          </a:prstGeom>
-          <a:noFill/>
-          <a:ln>
-            <a:noFill/>
-          </a:ln>
-        </p:spPr>
-        <p:txBody>
-          <a:bodyPr wrap="square" rtlCol="0">
-            <a:spAutoFit/>
+          <p:cNvSpPr>
+            <a:spLocks noGrp="1"/>
+          </p:cNvSpPr>
+          <p:nvPr>
+            <p:ph idx="1"/>
+          </p:nvPr>
+        </p:nvSpPr>
+        <p:spPr>
+          <a:xfrm>
+            <a:off x="856495" y="1514814"/>
+            <a:ext cx="9516537" cy="3028335"/>
+          </a:xfrm>
+        </p:spPr>
+        <p:txBody>
+          <a:bodyPr vert="horz" lIns="91440" tIns="45720" rIns="91440" bIns="45720" rtlCol="0" anchor="ctr">
+            <a:noAutofit/>
           </a:bodyPr>
           <a:lstStyle/>
           <a:p>
-            <a:pPr defTabSz="457200">
-              <a:lnSpc>
-                <a:spcPct val="110000"/>
-              </a:lnSpc>
-              <a:spcBef>
-                <a:spcPct val="20000"/>
-              </a:spcBef>
-              <a:spcAft>
-                <a:spcPts val="600"/>
-              </a:spcAft>
-              <a:buClr>
-                <a:schemeClr val="accent1"/>
-              </a:buClr>
-              <a:buSzPct val="92000"/>
-            </a:pPr>
-            <a:r>
-              <a:rPr lang="en-US" sz="1400" dirty="0">
-                <a:solidFill>
-                  <a:schemeClr val="tx1">
-                    <a:lumMod val="75000"/>
-                    <a:lumOff val="25000"/>
-                  </a:schemeClr>
-                </a:solidFill>
-              </a:rPr>
-              <a:t>The proposed system aims to address the challenge of helping students identify the most suitable learning path that aligns with their interests, current skill level, and long-term career goals. This is achieved through the use of an agentic AI coach that personalizes and continuously adapts the learner’s educational roadmap. The solution consists of the following components:</a:t>
-            </a:r>
-          </a:p>
-          <a:p>
-            <a:pPr marL="285750" indent="-285750">
-              <a:buFont typeface="Wingdings" panose="05000000000000000000" pitchFamily="2" charset="2"/>
-              <a:buChar char="Ø"/>
-            </a:pPr>
-            <a:r>
-              <a:rPr lang="en-US" sz="1400" dirty="0"/>
-              <a:t>Data Collection:</a:t>
-            </a:r>
-          </a:p>
-          <a:p>
-            <a:pPr lvl="1"/>
-            <a:r>
-              <a:rPr lang="en-US" sz="1400" dirty="0"/>
-              <a:t>AIDA collects user inputs during chat conversations, including interests (e.g., Cybersecurity, UI/UX), current skill level, learning preferences, and long-term goals. </a:t>
-            </a:r>
-          </a:p>
-          <a:p>
-            <a:pPr lvl="1"/>
-            <a:r>
-              <a:rPr lang="en-US" sz="1400" dirty="0"/>
-              <a:t>Future enhancements may include integration of academic performance data and learning history for deeper personalization.</a:t>
-            </a:r>
-          </a:p>
-          <a:p>
-            <a:pPr marL="285750" indent="-285750">
-              <a:buFont typeface="Wingdings" panose="05000000000000000000" pitchFamily="2" charset="2"/>
-              <a:buChar char="Ø"/>
-            </a:pPr>
-            <a:r>
-              <a:rPr lang="en-US" sz="1400" dirty="0"/>
-              <a:t>Agentic Behavior: </a:t>
-            </a:r>
-          </a:p>
-          <a:p>
-            <a:pPr lvl="1"/>
-            <a:r>
-              <a:rPr lang="en-US" sz="1400" dirty="0"/>
-              <a:t>AIDA follows explicit behavioral instructions — it proactively asks questions, clarifies vague responses, offers motivational feedback, and tailors its interaction style based on the user’s age, confidence, and clarity. </a:t>
-            </a:r>
-          </a:p>
-          <a:p>
-            <a:pPr lvl="1"/>
-            <a:r>
-              <a:rPr lang="en-US" sz="1400" dirty="0"/>
-              <a:t>It doesn't wait for commands but drives the conversation toward a clear, actionable learning plan.</a:t>
-            </a:r>
-          </a:p>
-          <a:p>
-            <a:pPr marL="285750" indent="-285750">
-              <a:buFont typeface="Wingdings" panose="05000000000000000000" pitchFamily="2" charset="2"/>
-              <a:buChar char="Ø"/>
-            </a:pPr>
-            <a:r>
-              <a:rPr lang="en-US" sz="1400" dirty="0"/>
-              <a:t>Learning Path Generation: </a:t>
-            </a:r>
-          </a:p>
-          <a:p>
-            <a:pPr lvl="1"/>
-            <a:r>
-              <a:rPr lang="en-US" sz="1400" dirty="0"/>
-              <a:t>Based on collected inputs, AIDA builds a dynamic and personalized roadmap that includes curated online courses, project ideas, certifications, and estimated durations. </a:t>
-            </a:r>
-          </a:p>
-          <a:p>
-            <a:pPr lvl="1"/>
-            <a:r>
-              <a:rPr lang="en-US" sz="1400" dirty="0"/>
-              <a:t>The path evolves over time as the user provides progress updates, changes preferences, or completes milestones.</a:t>
-            </a:r>
-          </a:p>
-          <a:p>
-            <a:pPr marL="285750" indent="-285750">
-              <a:buFont typeface="Wingdings" panose="05000000000000000000" pitchFamily="2" charset="2"/>
-              <a:buChar char="Ø"/>
-            </a:pPr>
-            <a:r>
-              <a:rPr lang="en-US" sz="1400" dirty="0"/>
-              <a:t>Adaptive Planning: </a:t>
-            </a:r>
-          </a:p>
-          <a:p>
-            <a:pPr lvl="1"/>
-            <a:r>
-              <a:rPr lang="en-US" sz="1400" dirty="0"/>
-              <a:t>AIDA continuously monitors the learner’s status through ongoing conversations and autonomously updates the course recommendations. </a:t>
-            </a:r>
-          </a:p>
-          <a:p>
-            <a:pPr lvl="1"/>
-            <a:r>
-              <a:rPr lang="en-US" sz="1400" dirty="0"/>
-              <a:t>It reorders steps, adds/removes suggestions, and reminds users to stay on track based on their pace and feedback.</a:t>
-            </a:r>
-          </a:p>
-          <a:p>
-            <a:pPr marL="285750" indent="-285750">
-              <a:buFont typeface="Wingdings" panose="05000000000000000000" pitchFamily="2" charset="2"/>
-              <a:buChar char="Ø"/>
-            </a:pPr>
-            <a:r>
-              <a:rPr lang="en-US" sz="1400" dirty="0"/>
-              <a:t>Deployment: </a:t>
-            </a:r>
-          </a:p>
-          <a:p>
-            <a:pPr lvl="1"/>
-            <a:r>
-              <a:rPr lang="en-US" sz="1400" dirty="0"/>
-              <a:t>The system is deployed using IBM watsonx.ai and IBM Granite models on IBM Cloud Lite. </a:t>
-            </a:r>
-          </a:p>
-          <a:p>
-            <a:pPr lvl="1"/>
-            <a:r>
-              <a:rPr lang="en-US" sz="1400" dirty="0"/>
-              <a:t>It is currently accessible through a web-based preview interface, with plans for full integration into a scalable learning platform.</a:t>
-            </a:r>
+            <a:pPr marL="305435" indent="-305435"/>
+            <a:r>
+              <a:rPr lang="en-US" sz="2000" dirty="0"/>
+              <a:t>IBM cloud lite services - Free-tier access for building and deploying AI agents</a:t>
+            </a:r>
+          </a:p>
+          <a:p>
+            <a:pPr marL="305435" lvl="0" indent="-305435" fontAlgn="base"/>
+            <a:r>
+              <a:rPr lang="en-US" altLang="en-US" sz="2000" dirty="0"/>
+              <a:t>IBM Granite Foundation Model - </a:t>
+            </a:r>
+            <a:r>
+              <a:rPr lang="en-IN" sz="2000" dirty="0"/>
+              <a:t>Large language model for generating intelligent responses</a:t>
+            </a:r>
+            <a:endParaRPr lang="en-US" altLang="en-US" sz="2000" dirty="0"/>
+          </a:p>
+          <a:p>
+            <a:pPr marL="305435" lvl="0" indent="-305435" fontAlgn="base"/>
+            <a:r>
+              <a:rPr lang="en-US" altLang="en-US" sz="2000" dirty="0"/>
+              <a:t>Natural Language Processing (NLP) - </a:t>
+            </a:r>
+            <a:r>
+              <a:rPr lang="en-US" sz="2000" dirty="0"/>
+              <a:t>Allows the agent to understand and respond in natural language</a:t>
+            </a:r>
+            <a:endParaRPr lang="en-US" altLang="en-US" sz="2000" dirty="0"/>
           </a:p>
         </p:txBody>
       </p:sp>
@@ -5557,10 +6180,10 @@
       </p:grpSpPr>
       <p:sp>
         <p:nvSpPr>
-          <p:cNvPr id="5" name="Title 4">
+          <p:cNvPr id="2" name="Title 1">
             <a:extLst>
               <a:ext uri="{FF2B5EF4-FFF2-40B4-BE49-F238E27FC236}">
-                <a16:creationId xmlns:a16="http://schemas.microsoft.com/office/drawing/2014/main" id="{8FBA75B4-2DD5-42EB-9397-F36BFB8BA723}"/>
+                <a16:creationId xmlns:a16="http://schemas.microsoft.com/office/drawing/2014/main" id="{FD880B2B-5B8A-2798-A127-FAFC2D527010}"/>
               </a:ext>
             </a:extLst>
           </p:cNvPr>
@@ -5573,43 +6196,33 @@
         </p:nvSpPr>
         <p:spPr>
           <a:xfrm>
-            <a:off x="581192" y="662572"/>
+            <a:off x="581192" y="938131"/>
             <a:ext cx="11029616" cy="530296"/>
           </a:xfrm>
         </p:spPr>
         <p:txBody>
           <a:bodyPr>
-            <a:normAutofit fontScale="90000"/>
+            <a:noAutofit/>
           </a:bodyPr>
           <a:lstStyle/>
           <a:p>
             <a:r>
-              <a:rPr lang="en-US" sz="4400" b="1">
+              <a:rPr lang="en-IN" sz="4000" dirty="0">
                 <a:solidFill>
                   <a:schemeClr val="accent1"/>
                 </a:solidFill>
-                <a:latin typeface="Arial"/>
-                <a:ea typeface="+mj-lt"/>
-                <a:cs typeface="Arial"/>
               </a:rPr>
-              <a:t>System  Approach</a:t>
-            </a:r>
-            <a:endParaRPr lang="en-US" sz="4400">
-              <a:solidFill>
-                <a:schemeClr val="accent1"/>
-              </a:solidFill>
-              <a:latin typeface="Calibri Light"/>
-              <a:cs typeface="Calibri Light"/>
-            </a:endParaRPr>
-          </a:p>
-        </p:txBody>
-      </p:sp>
-      <p:sp>
-        <p:nvSpPr>
-          <p:cNvPr id="2" name="Content Placeholder 1">
+              <a:t>IBM cloud services used</a:t>
+            </a:r>
+          </a:p>
+        </p:txBody>
+      </p:sp>
+      <p:sp>
+        <p:nvSpPr>
+          <p:cNvPr id="3" name="Content Placeholder 2">
             <a:extLst>
               <a:ext uri="{FF2B5EF4-FFF2-40B4-BE49-F238E27FC236}">
-                <a16:creationId xmlns:a16="http://schemas.microsoft.com/office/drawing/2014/main" id="{C4FFAF3C-BA60-9181-132C-C36C403AAEA7}"/>
+                <a16:creationId xmlns:a16="http://schemas.microsoft.com/office/drawing/2014/main" id="{40B9234A-56AB-47BB-E0BD-725AF6684B23}"/>
               </a:ext>
             </a:extLst>
           </p:cNvPr>
@@ -5620,115 +6233,74 @@
             <p:ph idx="1"/>
           </p:nvPr>
         </p:nvSpPr>
-        <p:spPr/>
+        <p:spPr>
+          <a:xfrm>
+            <a:off x="777838" y="1906331"/>
+            <a:ext cx="8425156" cy="3045337"/>
+          </a:xfrm>
+        </p:spPr>
         <p:txBody>
           <a:bodyPr>
-            <a:normAutofit fontScale="92500" lnSpcReduction="10000"/>
+            <a:normAutofit/>
           </a:bodyPr>
           <a:lstStyle/>
           <a:p>
-            <a:r>
-              <a:rPr lang="en-US" sz="1600" dirty="0"/>
-              <a:t>System Requirements: IBM Cloud Lite with access to watsonx.ai Studio, watsonx.ai Runtime, and IBM Cloud Object Storage.</a:t>
-            </a:r>
-          </a:p>
-          <a:p>
-            <a:r>
-              <a:rPr lang="en-US" sz="1600" dirty="0"/>
-              <a:t>Libraries/Tools Used:</a:t>
-            </a:r>
-          </a:p>
-          <a:p>
-            <a:pPr lvl="1">
-              <a:buFont typeface="Wingdings" panose="05000000000000000000" pitchFamily="2" charset="2"/>
-              <a:buChar char="§"/>
-            </a:pPr>
-            <a:r>
-              <a:rPr lang="en-US" sz="1600" dirty="0"/>
-              <a:t>IBM watsonx.ai Studio for building AIDA’s conversation logic and agentic behavior.</a:t>
-            </a:r>
-          </a:p>
-          <a:p>
-            <a:pPr lvl="1">
-              <a:buFont typeface="Wingdings" panose="05000000000000000000" pitchFamily="2" charset="2"/>
-              <a:buChar char="§"/>
-            </a:pPr>
-            <a:r>
-              <a:rPr lang="en-US" sz="1600" dirty="0"/>
-              <a:t>IBM Granite model for natural language processing and interaction generation.</a:t>
-            </a:r>
-          </a:p>
-          <a:p>
-            <a:pPr lvl="1">
-              <a:buFont typeface="Wingdings" panose="05000000000000000000" pitchFamily="2" charset="2"/>
-              <a:buChar char="§"/>
-            </a:pPr>
-            <a:r>
-              <a:rPr lang="en-US" sz="1600" dirty="0"/>
-              <a:t>watsonx.ai Runtime for executing and testing real-time chatbot interactions.</a:t>
-            </a:r>
-          </a:p>
-          <a:p>
-            <a:pPr lvl="1">
-              <a:buFont typeface="Wingdings" panose="05000000000000000000" pitchFamily="2" charset="2"/>
-              <a:buChar char="§"/>
-            </a:pPr>
-            <a:r>
-              <a:rPr lang="en-US" sz="1600" dirty="0"/>
-              <a:t>IBM Cloud Object Storage to manage user session data, logs, and static learning content for path recommendations.</a:t>
-            </a:r>
-          </a:p>
-          <a:p>
-            <a:r>
-              <a:rPr lang="en-US" sz="1600" dirty="0"/>
-              <a:t>Instruction Design: </a:t>
-            </a:r>
-          </a:p>
-          <a:p>
-            <a:pPr marL="324000" lvl="1" indent="0">
-              <a:buNone/>
-            </a:pPr>
-            <a:r>
-              <a:rPr lang="en-US" sz="1600" dirty="0"/>
-              <a:t>AIDA follows a detailed instruction set that governs how it greets users, asks questions, personalizes recommendations, follows up on vague input, and adapts its tone and responses. This enables it to function autonomously with human-like mentorship qualities.</a:t>
-            </a:r>
-          </a:p>
-          <a:p>
-            <a:r>
-              <a:rPr lang="en-US" sz="1600" dirty="0"/>
-              <a:t>Logic Design: </a:t>
-            </a:r>
-          </a:p>
-          <a:p>
-            <a:pPr marL="324000" lvl="1" indent="0">
-              <a:buNone/>
-            </a:pPr>
-            <a:r>
-              <a:rPr lang="en-US" sz="1600" dirty="0"/>
-              <a:t>Core logic revolves around extracting and using user inputs like interest area, current skill level, and long-term goals. AIDA uses this data to suggest relevant learning paths and continuously adapt those paths based on feedback and updates.</a:t>
-            </a:r>
-          </a:p>
-          <a:p>
-            <a:r>
-              <a:rPr lang="en-US" sz="1600" dirty="0"/>
-              <a:t>Conversation Flow: </a:t>
-            </a:r>
-          </a:p>
-          <a:p>
-            <a:pPr marL="324000" lvl="1" indent="0">
-              <a:buNone/>
-            </a:pPr>
-            <a:r>
-              <a:rPr lang="en-US" sz="1600" dirty="0"/>
-              <a:t>Designed with agentic structure — AIDA initiates discussions, guides users step-by-step, and evolves its dialogue using contextual awareness. It combines flexible logic with predefined goals to deliver personalized and proactive support.</a:t>
-            </a:r>
+            <a:pPr marL="305435" indent="-305435"/>
+            <a:r>
+              <a:rPr lang="en-IN" sz="2000" dirty="0"/>
+              <a:t>IBM Cloud Watsonx AI Studio – Build and Configure AI agent</a:t>
+            </a:r>
+          </a:p>
+          <a:p>
+            <a:pPr marL="305435" indent="-305435"/>
+            <a:r>
+              <a:rPr lang="en-IN" sz="2000" dirty="0"/>
+              <a:t>IBM Cloud </a:t>
+            </a:r>
+            <a:r>
+              <a:rPr lang="en-IN" sz="2000" dirty="0" err="1"/>
+              <a:t>Watsonx</a:t>
+            </a:r>
+            <a:r>
+              <a:rPr lang="en-IN" sz="2000" dirty="0"/>
+              <a:t> AI runtime </a:t>
+            </a:r>
+            <a:r>
+              <a:rPr lang="en-US" sz="2000" dirty="0"/>
+              <a:t>– Deploy and test agents in real time</a:t>
+            </a:r>
+            <a:endParaRPr lang="en-IN" sz="2000" dirty="0"/>
+          </a:p>
+          <a:p>
+            <a:pPr marL="305435" indent="-305435"/>
+            <a:r>
+              <a:rPr lang="en-IN" sz="2000" dirty="0"/>
+              <a:t>IBM Cloud Agent Lab </a:t>
+            </a:r>
+            <a:r>
+              <a:rPr lang="en-US" sz="2000" dirty="0"/>
+              <a:t>– Interface to manage agent behavior and tools</a:t>
+            </a:r>
+            <a:endParaRPr lang="en-IN" sz="2000" dirty="0"/>
+          </a:p>
+          <a:p>
+            <a:pPr marL="305435" indent="-305435"/>
+            <a:r>
+              <a:rPr lang="en-IN" sz="2000" dirty="0"/>
+              <a:t>IBM Granite foundation model </a:t>
+            </a:r>
+            <a:r>
+              <a:rPr lang="en-US" sz="2000" dirty="0"/>
+              <a:t>– Powers natural and intelligent conversations</a:t>
+            </a:r>
+            <a:endParaRPr lang="en-IN" sz="2000" dirty="0"/>
           </a:p>
         </p:txBody>
       </p:sp>
     </p:spTree>
     <p:extLst>
       <p:ext uri="{BB962C8B-B14F-4D97-AF65-F5344CB8AC3E}">
-        <p14:creationId xmlns:p14="http://schemas.microsoft.com/office/powerpoint/2010/main" val="3202024527"/>
+        <p14:creationId xmlns:p14="http://schemas.microsoft.com/office/powerpoint/2010/main" val="1366800925"/>
       </p:ext>
     </p:extLst>
   </p:cSld>
@@ -5771,48 +6343,10 @@
             <p:ph type="title"/>
           </p:nvPr>
         </p:nvSpPr>
-        <p:spPr/>
-        <p:txBody>
-          <a:bodyPr>
-            <a:normAutofit fontScale="90000"/>
-          </a:bodyPr>
-          <a:lstStyle/>
-          <a:p>
-            <a:r>
-              <a:rPr lang="en-US" sz="4400" b="1">
-                <a:solidFill>
-                  <a:schemeClr val="accent1"/>
-                </a:solidFill>
-                <a:latin typeface="Arial"/>
-                <a:ea typeface="+mj-lt"/>
-                <a:cs typeface="Arial"/>
-              </a:rPr>
-              <a:t>Algorithm &amp; Deployment</a:t>
-            </a:r>
-            <a:endParaRPr lang="en-US"/>
-          </a:p>
-        </p:txBody>
-      </p:sp>
-      <p:sp>
-        <p:nvSpPr>
-          <p:cNvPr id="2" name="Content Placeholder 1">
-            <a:extLst>
-              <a:ext uri="{FF2B5EF4-FFF2-40B4-BE49-F238E27FC236}">
-                <a16:creationId xmlns:a16="http://schemas.microsoft.com/office/drawing/2014/main" id="{F7F0871F-2198-9E37-C96F-3611AA199B60}"/>
-              </a:ext>
-            </a:extLst>
-          </p:cNvPr>
-          <p:cNvSpPr>
-            <a:spLocks noGrp="1"/>
-          </p:cNvSpPr>
-          <p:nvPr>
-            <p:ph idx="1"/>
-          </p:nvPr>
-        </p:nvSpPr>
-        <p:spPr>
-          <a:xfrm>
-            <a:off x="581193" y="1371474"/>
-            <a:ext cx="11029615" cy="4673324"/>
+        <p:spPr>
+          <a:xfrm>
+            <a:off x="581191" y="771730"/>
+            <a:ext cx="11029616" cy="530296"/>
           </a:xfrm>
         </p:spPr>
         <p:txBody>
@@ -5822,88 +6356,124 @@
           <a:lstStyle/>
           <a:p>
             <a:r>
-              <a:rPr lang="en-US" sz="1600" dirty="0"/>
-              <a:t>Algorithm Selection:</a:t>
-            </a:r>
-            <a:br>
-              <a:rPr lang="en-US" sz="1600" dirty="0"/>
-            </a:br>
-            <a:r>
-              <a:rPr lang="en-US" sz="1400" dirty="0"/>
-              <a:t>The system uses the Granite-3-3B-8 large language model from IBM watsonx.ai. This model was selected for its ability to handle natural language conversations, follow instruction-based behavior, and provide contextual, real-time responses suited for educational support. It is well-suited for use cases where learners seek conversational guidance instead of static suggestions.</a:t>
-            </a:r>
-          </a:p>
-          <a:p>
-            <a:r>
-              <a:rPr lang="en-US" sz="1600" dirty="0"/>
-              <a:t>Data Input:</a:t>
-            </a:r>
-            <a:br>
-              <a:rPr lang="en-US" sz="1600" dirty="0"/>
-            </a:br>
-            <a:r>
-              <a:rPr lang="en-US" sz="1400" dirty="0"/>
-              <a:t>Users provide inputs during the chat session, such as:</a:t>
-            </a:r>
-          </a:p>
-          <a:p>
-            <a:pPr marL="594000" lvl="2" indent="0">
+              <a:rPr lang="en-US" sz="3600" dirty="0">
+                <a:solidFill>
+                  <a:schemeClr val="accent1"/>
+                </a:solidFill>
+                <a:ea typeface="+mj-lt"/>
+                <a:cs typeface="Arial"/>
+              </a:rPr>
+              <a:t>Wow factors</a:t>
+            </a:r>
+            <a:endParaRPr lang="en-US" sz="3600" dirty="0">
+              <a:solidFill>
+                <a:schemeClr val="accent1"/>
+              </a:solidFill>
+              <a:cs typeface="Calibri Light"/>
+            </a:endParaRPr>
+          </a:p>
+        </p:txBody>
+      </p:sp>
+      <p:sp>
+        <p:nvSpPr>
+          <p:cNvPr id="2" name="Content Placeholder 1">
+            <a:extLst>
+              <a:ext uri="{FF2B5EF4-FFF2-40B4-BE49-F238E27FC236}">
+                <a16:creationId xmlns:a16="http://schemas.microsoft.com/office/drawing/2014/main" id="{C4FFAF3C-BA60-9181-132C-C36C403AAEA7}"/>
+              </a:ext>
+            </a:extLst>
+          </p:cNvPr>
+          <p:cNvSpPr>
+            <a:spLocks noGrp="1"/>
+          </p:cNvSpPr>
+          <p:nvPr>
+            <p:ph idx="1"/>
+          </p:nvPr>
+        </p:nvSpPr>
+        <p:spPr>
+          <a:xfrm>
+            <a:off x="581192" y="1456443"/>
+            <a:ext cx="11029615" cy="4673324"/>
+          </a:xfrm>
+        </p:spPr>
+        <p:txBody>
+          <a:bodyPr>
+            <a:noAutofit/>
+          </a:bodyPr>
+          <a:lstStyle/>
+          <a:p>
+            <a:pPr marL="0" indent="0">
               <a:buNone/>
             </a:pPr>
             <a:r>
-              <a:rPr lang="en-US" sz="1400" dirty="0"/>
-              <a:t>Areas of interest (e.g., UI/UX, Frontend, Cybersecurity)</a:t>
-            </a:r>
-          </a:p>
-          <a:p>
-            <a:pPr marL="594000" lvl="2" indent="0">
-              <a:buNone/>
+              <a:rPr lang="en-US" sz="2000" dirty="0"/>
+              <a:t>This agent helps learners cut through overwhelming course options, stay motivated, and follow a structured, goal-aligned path. It empowers students with personalized guidance, adapting continuously based on interaction.</a:t>
+            </a:r>
+          </a:p>
+          <a:p>
+            <a:r>
+              <a:rPr lang="en-US" sz="2400" dirty="0"/>
+              <a:t>Unique Features:</a:t>
+            </a:r>
+          </a:p>
+          <a:p>
+            <a:pPr lvl="1">
+              <a:buFont typeface="Arial" panose="020B0604020202020204" pitchFamily="34" charset="0"/>
+              <a:buChar char="•"/>
             </a:pPr>
             <a:r>
-              <a:rPr lang="en-US" sz="1400" dirty="0"/>
-              <a:t>Questions like “What should I learn next?” or “I’m confused between two domains”</a:t>
-            </a:r>
-          </a:p>
-          <a:p>
-            <a:pPr marL="594000" lvl="2" indent="0">
-              <a:buNone/>
+              <a:rPr lang="en-US" sz="2000" dirty="0"/>
+              <a:t>Dynamic course recommendations based on interests and current skills</a:t>
+            </a:r>
+          </a:p>
+          <a:p>
+            <a:pPr lvl="1">
+              <a:buFont typeface="Arial" panose="020B0604020202020204" pitchFamily="34" charset="0"/>
+              <a:buChar char="•"/>
             </a:pPr>
             <a:r>
-              <a:rPr lang="en-US" sz="1400" dirty="0"/>
-              <a:t>Clarifications like “This course is too hard” or “Suggest beginner-level content”</a:t>
-            </a:r>
-            <a:br>
-              <a:rPr lang="en-US" sz="1400" dirty="0"/>
-            </a:br>
-            <a:r>
-              <a:rPr lang="en-US" sz="1400" dirty="0"/>
-              <a:t>These conversational cues are parsed and used to provide helpful responses.</a:t>
-            </a:r>
-          </a:p>
-          <a:p>
-            <a:r>
-              <a:rPr lang="en-US" sz="1600" dirty="0"/>
-              <a:t>Training Process:</a:t>
-            </a:r>
-            <a:br>
-              <a:rPr lang="en-US" sz="1600" dirty="0"/>
-            </a:br>
-            <a:r>
-              <a:rPr lang="en-US" sz="1400" dirty="0"/>
-              <a:t>The Granite model is already pretrained by IBM. No custom training is done. Instead, AIDA’s behavior is crafted using instruction-based prompt design, defining how the assistant should speak, guide, motivate, and personalize recommendations.</a:t>
-            </a:r>
-          </a:p>
-          <a:p>
-            <a:r>
-              <a:rPr lang="en-US" sz="1600" dirty="0"/>
-              <a:t>Response Generation:</a:t>
-            </a:r>
-            <a:br>
-              <a:rPr lang="en-US" sz="1600" dirty="0"/>
-            </a:br>
-            <a:r>
-              <a:rPr lang="en-US" sz="1400" dirty="0"/>
-              <a:t>AIDA does not predict outcomes. It listens to the user’s questions or problems and provides personalized learning suggestions based on the conversation. The AI adapts its guidance in real time depending on how the user responds — but only when the user communicates progress, confusion, or interest shifts.</a:t>
+              <a:rPr lang="en-US" sz="2000" dirty="0"/>
+              <a:t>Personalized learning paths generated through conversation</a:t>
+            </a:r>
+          </a:p>
+          <a:p>
+            <a:pPr lvl="1">
+              <a:buFont typeface="Arial" panose="020B0604020202020204" pitchFamily="34" charset="0"/>
+              <a:buChar char="•"/>
+            </a:pPr>
+            <a:r>
+              <a:rPr lang="en-US" sz="2000" dirty="0"/>
+              <a:t>Real-time adaptation and progress-aware suggestions</a:t>
+            </a:r>
+          </a:p>
+          <a:p>
+            <a:pPr lvl="1">
+              <a:buFont typeface="Arial" panose="020B0604020202020204" pitchFamily="34" charset="0"/>
+              <a:buChar char="•"/>
+            </a:pPr>
+            <a:r>
+              <a:rPr lang="en-US" sz="2000" dirty="0"/>
+              <a:t>Skill-based tool recommendations and portfolio-building tips</a:t>
+            </a:r>
+          </a:p>
+          <a:p>
+            <a:pPr lvl="1">
+              <a:buFont typeface="Arial" panose="020B0604020202020204" pitchFamily="34" charset="0"/>
+              <a:buChar char="•"/>
+            </a:pPr>
+            <a:r>
+              <a:rPr lang="en-US" sz="2000" dirty="0"/>
+              <a:t>Instruction-driven behavior with no coding required</a:t>
+            </a:r>
+          </a:p>
+          <a:p>
+            <a:pPr lvl="1">
+              <a:buFont typeface="Arial" panose="020B0604020202020204" pitchFamily="34" charset="0"/>
+              <a:buChar char="•"/>
+            </a:pPr>
+            <a:r>
+              <a:rPr lang="en-US" sz="2000" dirty="0"/>
+              <a:t>Motivational tone designed to guide and support learning</a:t>
             </a:r>
           </a:p>
         </p:txBody>
@@ -5911,7 +6481,7 @@
     </p:spTree>
     <p:extLst>
       <p:ext uri="{BB962C8B-B14F-4D97-AF65-F5344CB8AC3E}">
-        <p14:creationId xmlns:p14="http://schemas.microsoft.com/office/powerpoint/2010/main" val="4154508776"/>
+        <p14:creationId xmlns:p14="http://schemas.microsoft.com/office/powerpoint/2010/main" val="3202024527"/>
       </p:ext>
     </p:extLst>
   </p:cSld>
@@ -5940,10 +6510,10 @@
       </p:grpSpPr>
       <p:sp>
         <p:nvSpPr>
-          <p:cNvPr id="5" name="Title 4">
+          <p:cNvPr id="2" name="Title 1">
             <a:extLst>
               <a:ext uri="{FF2B5EF4-FFF2-40B4-BE49-F238E27FC236}">
-                <a16:creationId xmlns:a16="http://schemas.microsoft.com/office/drawing/2014/main" id="{8FBA75B4-2DD5-42EB-9397-F36BFB8BA723}"/>
+                <a16:creationId xmlns:a16="http://schemas.microsoft.com/office/drawing/2014/main" id="{5F45986D-DBC5-8220-FE6F-7F2ABC7C4CEE}"/>
               </a:ext>
             </a:extLst>
           </p:cNvPr>
@@ -5954,61 +6524,169 @@
             <p:ph type="title"/>
           </p:nvPr>
         </p:nvSpPr>
-        <p:spPr/>
+        <p:spPr>
+          <a:xfrm>
+            <a:off x="581192" y="882650"/>
+            <a:ext cx="11029616" cy="530296"/>
+          </a:xfrm>
+        </p:spPr>
         <p:txBody>
           <a:bodyPr>
-            <a:normAutofit fontScale="90000"/>
+            <a:noAutofit/>
           </a:bodyPr>
           <a:lstStyle/>
           <a:p>
             <a:r>
-              <a:rPr lang="en-US" sz="4400" b="1">
+              <a:rPr lang="en-IN" sz="3600" dirty="0">
                 <a:solidFill>
                   <a:schemeClr val="accent1"/>
                 </a:solidFill>
-                <a:latin typeface="Arial"/>
-                <a:ea typeface="+mj-lt"/>
-                <a:cs typeface="Arial"/>
               </a:rPr>
-              <a:t>Result</a:t>
-            </a:r>
-            <a:endParaRPr lang="en-US"/>
-          </a:p>
-        </p:txBody>
-      </p:sp>
-      <p:pic>
-        <p:nvPicPr>
-          <p:cNvPr id="4" name="Content Placeholder 3">
+              <a:t>End users</a:t>
+            </a:r>
+          </a:p>
+        </p:txBody>
+      </p:sp>
+      <p:sp>
+        <p:nvSpPr>
+          <p:cNvPr id="3" name="Content Placeholder 2">
             <a:extLst>
               <a:ext uri="{FF2B5EF4-FFF2-40B4-BE49-F238E27FC236}">
-                <a16:creationId xmlns:a16="http://schemas.microsoft.com/office/drawing/2014/main" id="{2911DA37-CA40-5FFB-227D-3D5AB2B9B569}"/>
+                <a16:creationId xmlns:a16="http://schemas.microsoft.com/office/drawing/2014/main" id="{AB679E23-F86A-AFA9-FE9C-7F5A518E8198}"/>
               </a:ext>
             </a:extLst>
           </p:cNvPr>
-          <p:cNvPicPr>
-            <a:picLocks noGrp="1" noChangeAspect="1"/>
-          </p:cNvPicPr>
+          <p:cNvSpPr>
+            <a:spLocks noGrp="1"/>
+          </p:cNvSpPr>
           <p:nvPr>
             <p:ph idx="1"/>
           </p:nvPr>
-        </p:nvPicPr>
-        <p:blipFill>
-          <a:blip r:embed="rId2"/>
-          <a:stretch>
-            <a:fillRect/>
-          </a:stretch>
-        </p:blipFill>
-        <p:spPr>
-          <a:xfrm>
-            <a:off x="1184369" y="1232452"/>
-            <a:ext cx="9823261" cy="4673600"/>
-          </a:xfrm>
-        </p:spPr>
-      </p:pic>
+        </p:nvSpPr>
+        <p:spPr>
+          <a:xfrm>
+            <a:off x="581192" y="1629256"/>
+            <a:ext cx="11029615" cy="4437248"/>
+          </a:xfrm>
+        </p:spPr>
+        <p:txBody>
+          <a:bodyPr>
+            <a:noAutofit/>
+          </a:bodyPr>
+          <a:lstStyle/>
+          <a:p>
+            <a:pPr marL="305435" indent="-305435"/>
+            <a:r>
+              <a:rPr lang="en-IN" sz="2400" dirty="0">
+                <a:ea typeface="+mn-lt"/>
+                <a:cs typeface="+mn-lt"/>
+              </a:rPr>
+              <a:t>High School &amp; College Students</a:t>
+            </a:r>
+          </a:p>
+          <a:p>
+            <a:pPr marL="324000" lvl="1" indent="0">
+              <a:buNone/>
+            </a:pPr>
+            <a:r>
+              <a:rPr lang="en-US" altLang="en-US" sz="2000" dirty="0">
+                <a:solidFill>
+                  <a:schemeClr val="tx1"/>
+                </a:solidFill>
+              </a:rPr>
+              <a:t>Looking for guidance on which courses and skills to pursue based on their interests.</a:t>
+            </a:r>
+          </a:p>
+          <a:p>
+            <a:pPr marL="305435" indent="-305435"/>
+            <a:r>
+              <a:rPr lang="en-US" altLang="en-US" sz="2400" dirty="0">
+                <a:solidFill>
+                  <a:schemeClr val="tx1"/>
+                </a:solidFill>
+              </a:rPr>
+              <a:t>Early-Career Professionals</a:t>
+            </a:r>
+          </a:p>
+          <a:p>
+            <a:pPr marL="324000" lvl="1" indent="0">
+              <a:buNone/>
+            </a:pPr>
+            <a:r>
+              <a:rPr lang="en-US" altLang="en-US" sz="2000" dirty="0">
+                <a:solidFill>
+                  <a:schemeClr val="tx1"/>
+                </a:solidFill>
+              </a:rPr>
+              <a:t>Exploring ways to upskill or transition into new tech domains through structured learning.</a:t>
+            </a:r>
+          </a:p>
+          <a:p>
+            <a:pPr marL="305435" indent="-305435"/>
+            <a:r>
+              <a:rPr lang="en-US" altLang="en-US" sz="2400" dirty="0">
+                <a:solidFill>
+                  <a:schemeClr val="tx1"/>
+                </a:solidFill>
+              </a:rPr>
+              <a:t>Self-Learners &amp; Career Changers</a:t>
+            </a:r>
+          </a:p>
+          <a:p>
+            <a:pPr marL="324000" lvl="1" indent="0">
+              <a:buNone/>
+            </a:pPr>
+            <a:r>
+              <a:rPr lang="en-US" altLang="en-US" sz="2000" dirty="0">
+                <a:solidFill>
+                  <a:schemeClr val="tx1"/>
+                </a:solidFill>
+              </a:rPr>
+              <a:t>In need of personalized roadmaps instead of generic course lists.</a:t>
+            </a:r>
+          </a:p>
+          <a:p>
+            <a:pPr marL="305435" indent="-305435"/>
+            <a:r>
+              <a:rPr lang="en-US" altLang="en-US" sz="2400" dirty="0">
+                <a:solidFill>
+                  <a:schemeClr val="tx1"/>
+                </a:solidFill>
+              </a:rPr>
+              <a:t>Academic Institutions &amp; EdTech Platforms</a:t>
+            </a:r>
+          </a:p>
+          <a:p>
+            <a:pPr marL="324000" lvl="1" indent="0">
+              <a:buNone/>
+            </a:pPr>
+            <a:r>
+              <a:rPr lang="en-US" altLang="en-US" sz="2000" dirty="0">
+                <a:solidFill>
+                  <a:schemeClr val="tx1"/>
+                </a:solidFill>
+              </a:rPr>
+              <a:t>Can integrate the agent to provide smart, adaptive learning support.</a:t>
+            </a:r>
+            <a:br>
+              <a:rPr lang="en-US" altLang="en-US" sz="2000" dirty="0">
+                <a:solidFill>
+                  <a:schemeClr val="tx1"/>
+                </a:solidFill>
+              </a:rPr>
+            </a:br>
+            <a:endParaRPr lang="en-US" altLang="en-US" sz="2000" dirty="0">
+              <a:solidFill>
+                <a:schemeClr val="tx1"/>
+              </a:solidFill>
+            </a:endParaRPr>
+          </a:p>
+        </p:txBody>
+      </p:sp>
     </p:spTree>
     <p:extLst>
       <p:ext uri="{BB962C8B-B14F-4D97-AF65-F5344CB8AC3E}">
-        <p14:creationId xmlns:p14="http://schemas.microsoft.com/office/powerpoint/2010/main" val="1483293388"/>
+        <p14:creationId xmlns:p14="http://schemas.microsoft.com/office/powerpoint/2010/main" val="3819043843"/>
       </p:ext>
     </p:extLst>
   </p:cSld>
@@ -6023,7 +6701,13 @@
   <p:cSld>
     <p:spTree>
       <p:nvGrpSpPr>
-        <p:cNvPr id="1" name=""/>
+        <p:cNvPr id="1" name="">
+          <a:extLst>
+            <a:ext uri="{FF2B5EF4-FFF2-40B4-BE49-F238E27FC236}">
+              <a16:creationId xmlns:a16="http://schemas.microsoft.com/office/drawing/2014/main" id="{A8E32F0A-9D83-B256-3E61-FD54AA26E1DF}"/>
+            </a:ext>
+          </a:extLst>
+        </p:cNvPr>
         <p:cNvGrpSpPr/>
         <p:nvPr/>
       </p:nvGrpSpPr>
@@ -6037,10 +6721,10 @@
       </p:grpSpPr>
       <p:sp>
         <p:nvSpPr>
-          <p:cNvPr id="5" name="Title 4">
+          <p:cNvPr id="2" name="Title 1">
             <a:extLst>
               <a:ext uri="{FF2B5EF4-FFF2-40B4-BE49-F238E27FC236}">
-                <a16:creationId xmlns:a16="http://schemas.microsoft.com/office/drawing/2014/main" id="{8FBA75B4-2DD5-42EB-9397-F36BFB8BA723}"/>
+                <a16:creationId xmlns:a16="http://schemas.microsoft.com/office/drawing/2014/main" id="{BA3410C9-747C-0C4D-FAD7-77167E836569}"/>
               </a:ext>
             </a:extLst>
           </p:cNvPr>
@@ -6053,101 +6737,54 @@
         </p:nvSpPr>
         <p:spPr/>
         <p:txBody>
-          <a:bodyPr>
-            <a:normAutofit fontScale="90000"/>
-          </a:bodyPr>
+          <a:bodyPr/>
           <a:lstStyle/>
           <a:p>
             <a:r>
-              <a:rPr lang="en-US" sz="4400" b="1">
+              <a:rPr lang="en-IN" dirty="0">
                 <a:solidFill>
                   <a:schemeClr val="accent1"/>
                 </a:solidFill>
-                <a:latin typeface="Arial"/>
-                <a:ea typeface="+mj-lt"/>
-                <a:cs typeface="Arial"/>
               </a:rPr>
-              <a:t>Conclusion</a:t>
-            </a:r>
-            <a:endParaRPr lang="en-US"/>
-          </a:p>
-        </p:txBody>
-      </p:sp>
-      <p:sp>
-        <p:nvSpPr>
-          <p:cNvPr id="2" name="Content Placeholder 1">
+              <a:t>Results</a:t>
+            </a:r>
+          </a:p>
+        </p:txBody>
+      </p:sp>
+      <p:pic>
+        <p:nvPicPr>
+          <p:cNvPr id="7" name="Picture 6">
             <a:extLst>
               <a:ext uri="{FF2B5EF4-FFF2-40B4-BE49-F238E27FC236}">
-                <a16:creationId xmlns:a16="http://schemas.microsoft.com/office/drawing/2014/main" id="{005E46AB-32C4-4B57-A2B1-50738A64BE1B}"/>
+                <a16:creationId xmlns:a16="http://schemas.microsoft.com/office/drawing/2014/main" id="{B8E800FA-2B6E-67C5-17F1-7010D837EABD}"/>
               </a:ext>
             </a:extLst>
           </p:cNvPr>
-          <p:cNvSpPr>
-            <a:spLocks noGrp="1"/>
-          </p:cNvSpPr>
-          <p:nvPr>
-            <p:ph idx="1"/>
-          </p:nvPr>
-        </p:nvSpPr>
-        <p:spPr>
-          <a:xfrm>
-            <a:off x="1055756" y="1476481"/>
-            <a:ext cx="9349886" cy="4673324"/>
-          </a:xfrm>
-        </p:spPr>
-        <p:txBody>
-          <a:bodyPr>
-            <a:normAutofit lnSpcReduction="10000"/>
-          </a:bodyPr>
-          <a:lstStyle/>
-          <a:p>
-            <a:pPr marL="305435" indent="-305435"/>
-            <a:r>
-              <a:rPr lang="en-US" sz="2800" dirty="0"/>
-              <a:t>Summary</a:t>
-            </a:r>
-          </a:p>
-          <a:p>
-            <a:pPr marL="324000" lvl="1" indent="0">
-              <a:buNone/>
-            </a:pPr>
-            <a:r>
-              <a:rPr lang="en-US" sz="2000" dirty="0" err="1"/>
-              <a:t>PathCraft</a:t>
-            </a:r>
-            <a:r>
-              <a:rPr lang="en-US" sz="2000" dirty="0"/>
-              <a:t> successfully delivers personalized learning guidance through a conversational AI system powered by IBM's Granite model. The agentic AI, AIDA, provides real-time, context-aware course suggestions based on user inputs like interest area, skill level, and career goals. The solution was effective in offering adaptive, supportive, and structured learning roadmaps through natural dialogue, simulating the behavior of a helpful mentor.</a:t>
-            </a:r>
-          </a:p>
-          <a:p>
-            <a:pPr marL="305435" indent="-305435"/>
-            <a:r>
-              <a:rPr lang="en-US" sz="2800" dirty="0"/>
-              <a:t>Challenges</a:t>
-            </a:r>
-          </a:p>
-          <a:p>
-            <a:pPr marL="324000" lvl="1" indent="0">
-              <a:buNone/>
-            </a:pPr>
-            <a:r>
-              <a:rPr lang="en-US" sz="2000" dirty="0"/>
-              <a:t>Designing prompt-based agentic behavior required thoughtful instruction engineering to ensure AIDA responded with clarity, empathy, and goal-aligned suggestions. Since the system depends on user-driven input, progress tracking is limited to what the user shares. Also, the current web preview interface limits persistent memory or long-term learning history integration.</a:t>
-            </a:r>
-          </a:p>
-          <a:p>
-            <a:pPr marL="324000" lvl="1" indent="0">
-              <a:buNone/>
-            </a:pPr>
-            <a:endParaRPr lang="en-IN" sz="2000" dirty="0"/>
-          </a:p>
-        </p:txBody>
-      </p:sp>
+          <p:cNvPicPr>
+            <a:picLocks noChangeAspect="1"/>
+          </p:cNvPicPr>
+          <p:nvPr/>
+        </p:nvPicPr>
+        <p:blipFill>
+          <a:blip r:embed="rId2"/>
+          <a:stretch>
+            <a:fillRect/>
+          </a:stretch>
+        </p:blipFill>
+        <p:spPr>
+          <a:xfrm>
+            <a:off x="2801156" y="967304"/>
+            <a:ext cx="6315578" cy="5486400"/>
+          </a:xfrm>
+          <a:prstGeom prst="rect">
+            <a:avLst/>
+          </a:prstGeom>
+        </p:spPr>
+      </p:pic>
     </p:spTree>
     <p:extLst>
       <p:ext uri="{BB962C8B-B14F-4D97-AF65-F5344CB8AC3E}">
-        <p14:creationId xmlns:p14="http://schemas.microsoft.com/office/powerpoint/2010/main" val="3183315129"/>
+        <p14:creationId xmlns:p14="http://schemas.microsoft.com/office/powerpoint/2010/main" val="4068668583"/>
       </p:ext>
     </p:extLst>
   </p:cSld>
@@ -6176,10 +6813,10 @@
       </p:grpSpPr>
       <p:sp>
         <p:nvSpPr>
-          <p:cNvPr id="3" name="Content Placeholder 2">
+          <p:cNvPr id="2" name="Title 1">
             <a:extLst>
               <a:ext uri="{FF2B5EF4-FFF2-40B4-BE49-F238E27FC236}">
-                <a16:creationId xmlns:a16="http://schemas.microsoft.com/office/drawing/2014/main" id="{A6638FD1-D00E-E75B-705C-564F06D93D7B}"/>
+                <a16:creationId xmlns:a16="http://schemas.microsoft.com/office/drawing/2014/main" id="{A4F8070C-FF0D-BBE3-3D8A-C3794CCCE8A2}"/>
               </a:ext>
             </a:extLst>
           </p:cNvPr>
@@ -6187,235 +6824,58 @@
             <a:spLocks noGrp="1"/>
           </p:cNvSpPr>
           <p:nvPr>
-            <p:ph idx="1"/>
-          </p:nvPr>
-        </p:nvSpPr>
-        <p:spPr>
-          <a:xfrm>
-            <a:off x="535670" y="1498796"/>
-            <a:ext cx="11029615" cy="4673324"/>
-          </a:xfrm>
-        </p:spPr>
-        <p:txBody>
-          <a:bodyPr>
-            <a:normAutofit lnSpcReduction="10000"/>
-          </a:bodyPr>
+            <p:ph type="title"/>
+          </p:nvPr>
+        </p:nvSpPr>
+        <p:spPr/>
+        <p:txBody>
+          <a:bodyPr/>
           <a:lstStyle/>
           <a:p>
-            <a:pPr marL="305435" lvl="0" indent="-305435" fontAlgn="base">
-              <a:lnSpc>
-                <a:spcPct val="130000"/>
-              </a:lnSpc>
-            </a:pPr>
-            <a:r>
-              <a:rPr lang="en-US" altLang="en-US" sz="1600" dirty="0"/>
-              <a:t>Persistent User Profiles:</a:t>
-            </a:r>
-            <a:br>
-              <a:rPr lang="en-US" altLang="en-US" sz="1600" dirty="0"/>
-            </a:br>
-            <a:r>
-              <a:rPr lang="en-US" altLang="en-US" sz="1600" dirty="0"/>
-              <a:t>Implement login and user account functionality to retain learning history, preferences, and past conversations, enabling long-term personalized support.</a:t>
-            </a:r>
-          </a:p>
-          <a:p>
-            <a:pPr marL="305435" lvl="0" indent="-305435" fontAlgn="base">
-              <a:lnSpc>
-                <a:spcPct val="130000"/>
-              </a:lnSpc>
-            </a:pPr>
-            <a:r>
-              <a:rPr lang="en-US" altLang="en-US" sz="1600" dirty="0"/>
-              <a:t>Academic Data Integration:</a:t>
-            </a:r>
-            <a:br>
-              <a:rPr lang="en-US" altLang="en-US" sz="1600" dirty="0"/>
-            </a:br>
-            <a:r>
-              <a:rPr lang="en-US" altLang="en-US" sz="1600" dirty="0"/>
-              <a:t>Include additional inputs like academic performance, certifications, and resume details to further enhance the relevance and accuracy of learning path recommendations.</a:t>
-            </a:r>
-          </a:p>
-          <a:p>
-            <a:pPr marL="305435" lvl="0" indent="-305435" fontAlgn="base">
-              <a:lnSpc>
-                <a:spcPct val="130000"/>
-              </a:lnSpc>
-            </a:pPr>
-            <a:r>
-              <a:rPr lang="en-US" altLang="en-US" sz="1600" dirty="0"/>
-              <a:t>Dynamic Learning Path Updates:</a:t>
-            </a:r>
-            <a:br>
-              <a:rPr lang="en-US" altLang="en-US" sz="1600" dirty="0"/>
-            </a:br>
-            <a:r>
-              <a:rPr lang="en-US" altLang="en-US" sz="1600" dirty="0"/>
-              <a:t>Integrate external APIs (e.g., Coursera, edX, job market data) to allow AIDA to adapt roadmaps based on trending skills, course availability, and market demand.</a:t>
-            </a:r>
-          </a:p>
-          <a:p>
-            <a:pPr marL="305435" lvl="0" indent="-305435" fontAlgn="base">
-              <a:lnSpc>
-                <a:spcPct val="130000"/>
-              </a:lnSpc>
-            </a:pPr>
-            <a:r>
-              <a:rPr lang="en-US" altLang="en-US" sz="1600" dirty="0"/>
-              <a:t>Project &amp; Portfolio Recommendations:</a:t>
-            </a:r>
-            <a:br>
-              <a:rPr lang="en-US" altLang="en-US" sz="1600" dirty="0"/>
-            </a:br>
-            <a:r>
-              <a:rPr lang="en-US" altLang="en-US" sz="1600" dirty="0"/>
-              <a:t>Add functionality to suggest capstone project ideas and portfolio-building strategies based on the learner’s chosen path.</a:t>
-            </a:r>
-          </a:p>
-          <a:p>
-            <a:pPr marL="305435" lvl="0" indent="-305435" fontAlgn="base">
-              <a:lnSpc>
-                <a:spcPct val="130000"/>
-              </a:lnSpc>
-            </a:pPr>
-            <a:r>
-              <a:rPr lang="en-US" altLang="en-US" sz="1600" dirty="0"/>
-              <a:t>Scalable Deployment:</a:t>
-            </a:r>
-            <a:br>
-              <a:rPr lang="en-US" altLang="en-US" sz="1600" dirty="0"/>
-            </a:br>
-            <a:r>
-              <a:rPr lang="en-US" altLang="en-US" sz="1600" dirty="0"/>
-              <a:t>Move beyond web preview and integrate AIDA into learning platforms, institutional portals, or mobile apps for broader adoption.</a:t>
-            </a:r>
-          </a:p>
-        </p:txBody>
-      </p:sp>
-      <p:sp>
-        <p:nvSpPr>
-          <p:cNvPr id="5" name="Title 4">
+            <a:r>
+              <a:rPr lang="en-IN" dirty="0">
+                <a:solidFill>
+                  <a:schemeClr val="accent1"/>
+                </a:solidFill>
+              </a:rPr>
+              <a:t>Results</a:t>
+            </a:r>
+          </a:p>
+        </p:txBody>
+      </p:sp>
+      <p:pic>
+        <p:nvPicPr>
+          <p:cNvPr id="8" name="Content Placeholder 7">
             <a:extLst>
               <a:ext uri="{FF2B5EF4-FFF2-40B4-BE49-F238E27FC236}">
-                <a16:creationId xmlns:a16="http://schemas.microsoft.com/office/drawing/2014/main" id="{3F968F13-9AC4-7120-7ACD-9F752C767D5D}"/>
+                <a16:creationId xmlns:a16="http://schemas.microsoft.com/office/drawing/2014/main" id="{83A9E922-2C65-48D6-DB7F-51242438E46F}"/>
               </a:ext>
             </a:extLst>
           </p:cNvPr>
-          <p:cNvSpPr txBox="1">
-            <a:spLocks/>
-          </p:cNvSpPr>
-          <p:nvPr/>
-        </p:nvSpPr>
-        <p:spPr>
-          <a:xfrm>
-            <a:off x="535670" y="844659"/>
-            <a:ext cx="11029616" cy="530296"/>
-          </a:xfrm>
-          <a:prstGeom prst="rect">
-            <a:avLst/>
-          </a:prstGeom>
-        </p:spPr>
-        <p:txBody>
-          <a:bodyPr vert="horz" lIns="91440" tIns="45720" rIns="91440" bIns="45720" rtlCol="0" anchor="b">
-            <a:normAutofit fontScale="75000" lnSpcReduction="20000"/>
-          </a:bodyPr>
-          <a:lstStyle>
-            <a:lvl1pPr algn="l" defTabSz="457200" rtl="0" eaLnBrk="1" latinLnBrk="0" hangingPunct="1">
-              <a:lnSpc>
-                <a:spcPct val="100000"/>
-              </a:lnSpc>
-              <a:spcBef>
-                <a:spcPct val="0"/>
-              </a:spcBef>
-              <a:buNone/>
-              <a:defRPr sz="2800" b="0" kern="1200" cap="all">
-                <a:solidFill>
-                  <a:schemeClr val="tx1">
-                    <a:lumMod val="75000"/>
-                    <a:lumOff val="25000"/>
-                  </a:schemeClr>
-                </a:solidFill>
-                <a:latin typeface="+mj-lt"/>
-                <a:ea typeface="+mj-ea"/>
-                <a:cs typeface="+mj-cs"/>
-              </a:defRPr>
-            </a:lvl1pPr>
-            <a:lvl2pPr eaLnBrk="1" hangingPunct="1">
-              <a:defRPr>
-                <a:solidFill>
-                  <a:schemeClr val="tx2"/>
-                </a:solidFill>
-              </a:defRPr>
-            </a:lvl2pPr>
-            <a:lvl3pPr eaLnBrk="1" hangingPunct="1">
-              <a:defRPr>
-                <a:solidFill>
-                  <a:schemeClr val="tx2"/>
-                </a:solidFill>
-              </a:defRPr>
-            </a:lvl3pPr>
-            <a:lvl4pPr eaLnBrk="1" hangingPunct="1">
-              <a:defRPr>
-                <a:solidFill>
-                  <a:schemeClr val="tx2"/>
-                </a:solidFill>
-              </a:defRPr>
-            </a:lvl4pPr>
-            <a:lvl5pPr eaLnBrk="1" hangingPunct="1">
-              <a:defRPr>
-                <a:solidFill>
-                  <a:schemeClr val="tx2"/>
-                </a:solidFill>
-              </a:defRPr>
-            </a:lvl5pPr>
-            <a:lvl6pPr eaLnBrk="1" hangingPunct="1">
-              <a:defRPr>
-                <a:solidFill>
-                  <a:schemeClr val="tx2"/>
-                </a:solidFill>
-              </a:defRPr>
-            </a:lvl6pPr>
-            <a:lvl7pPr eaLnBrk="1" hangingPunct="1">
-              <a:defRPr>
-                <a:solidFill>
-                  <a:schemeClr val="tx2"/>
-                </a:solidFill>
-              </a:defRPr>
-            </a:lvl7pPr>
-            <a:lvl8pPr eaLnBrk="1" hangingPunct="1">
-              <a:defRPr>
-                <a:solidFill>
-                  <a:schemeClr val="tx2"/>
-                </a:solidFill>
-              </a:defRPr>
-            </a:lvl8pPr>
-            <a:lvl9pPr eaLnBrk="1" hangingPunct="1">
-              <a:defRPr>
-                <a:solidFill>
-                  <a:schemeClr val="tx2"/>
-                </a:solidFill>
-              </a:defRPr>
-            </a:lvl9pPr>
-          </a:lstStyle>
-          <a:p>
-            <a:r>
-              <a:rPr lang="en-US" sz="4400" b="1" dirty="0">
-                <a:solidFill>
-                  <a:schemeClr val="accent1"/>
-                </a:solidFill>
-                <a:latin typeface="Arial"/>
-                <a:cs typeface="Arial"/>
-              </a:rPr>
-              <a:t>Future scope</a:t>
-            </a:r>
-          </a:p>
-        </p:txBody>
-      </p:sp>
+          <p:cNvPicPr>
+            <a:picLocks noGrp="1" noChangeAspect="1"/>
+          </p:cNvPicPr>
+          <p:nvPr>
+            <p:ph idx="1"/>
+          </p:nvPr>
+        </p:nvPicPr>
+        <p:blipFill>
+          <a:blip r:embed="rId2"/>
+          <a:stretch>
+            <a:fillRect/>
+          </a:stretch>
+        </p:blipFill>
+        <p:spPr>
+          <a:xfrm>
+            <a:off x="3036350" y="855135"/>
+            <a:ext cx="6119299" cy="5300709"/>
+          </a:xfrm>
+        </p:spPr>
+      </p:pic>
     </p:spTree>
     <p:extLst>
       <p:ext uri="{BB962C8B-B14F-4D97-AF65-F5344CB8AC3E}">
-        <p14:creationId xmlns:p14="http://schemas.microsoft.com/office/powerpoint/2010/main" val="614882681"/>
+        <p14:creationId xmlns:p14="http://schemas.microsoft.com/office/powerpoint/2010/main" val="2083715239"/>
       </p:ext>
     </p:extLst>
   </p:cSld>
@@ -6990,51 +7450,31 @@
 </file>
 
 <file path=customXml/item1.xml><?xml version="1.0" encoding="utf-8"?>
-<p:properties xmlns:p="http://schemas.microsoft.com/office/2006/metadata/properties" xmlns:xsi="http://www.w3.org/2001/XMLSchema-instance" xmlns:pc="http://schemas.microsoft.com/office/infopath/2007/PartnerControls">
-  <documentManagement>
-    <MediaServiceKeyPoints xmlns="9162bd5b-4ed9-4da3-b376-05204580ba3f" xsi:nil="true"/>
-    <_activity xmlns="9162bd5b-4ed9-4da3-b376-05204580ba3f" xsi:nil="true"/>
-  </documentManagement>
-</p:properties>
-</file>
-
-<file path=customXml/item2.xml><?xml version="1.0" encoding="utf-8"?>
-<?mso-contentType ?>
-<FormTemplates xmlns="http://schemas.microsoft.com/sharepoint/v3/contenttype/forms">
-  <Display>DocumentLibraryForm</Display>
-  <Edit>DocumentLibraryForm</Edit>
-  <New>DocumentLibraryForm</New>
-</FormTemplates>
-</file>
-
-<file path=customXml/item3.xml><?xml version="1.0" encoding="utf-8"?>
-<ct:contentTypeSchema xmlns:ct="http://schemas.microsoft.com/office/2006/metadata/contentType" xmlns:ma="http://schemas.microsoft.com/office/2006/metadata/properties/metaAttributes" ct:_="" ma:_="" ma:contentTypeName="Document" ma:contentTypeID="0x0101000F1872188ABCFC48BECA6C87E8AC3285" ma:contentTypeVersion="17" ma:contentTypeDescription="Create a new document." ma:contentTypeScope="" ma:versionID="55a158675e089c6a85ab0f83b89e1a15">
-  <xsd:schema xmlns:xsd="http://www.w3.org/2001/XMLSchema" xmlns:xs="http://www.w3.org/2001/XMLSchema" xmlns:p="http://schemas.microsoft.com/office/2006/metadata/properties" xmlns:ns3="9162bd5b-4ed9-4da3-b376-05204580ba3f" xmlns:ns4="c0fa2617-96bd-425d-8578-e93563fe37c5" targetNamespace="http://schemas.microsoft.com/office/2006/metadata/properties" ma:root="true" ma:fieldsID="b35f082308864fa161c4a0a9eca35eff" ns3:_="" ns4:_="">
-    <xsd:import namespace="9162bd5b-4ed9-4da3-b376-05204580ba3f"/>
-    <xsd:import namespace="c0fa2617-96bd-425d-8578-e93563fe37c5"/>
+<ct:contentTypeSchema xmlns:ct="http://schemas.microsoft.com/office/2006/metadata/contentType" xmlns:ma="http://schemas.microsoft.com/office/2006/metadata/properties/metaAttributes" ct:_="" ma:_="" ma:contentTypeName="Document" ma:contentTypeID="0x0101007F0268AC5E70984D8FE60B7154176407" ma:contentTypeVersion="15" ma:contentTypeDescription="Create a new document." ma:contentTypeScope="" ma:versionID="104e359103f0f57b1cf9676756e5b944">
+  <xsd:schema xmlns:xsd="http://www.w3.org/2001/XMLSchema" xmlns:xs="http://www.w3.org/2001/XMLSchema" xmlns:p="http://schemas.microsoft.com/office/2006/metadata/properties" xmlns:ns3="b30265f8-c5e2-4918-b4a1-b977299ca3e2" xmlns:ns4="fadb41d3-f9cb-40fb-903c-8cacaba95bb5" targetNamespace="http://schemas.microsoft.com/office/2006/metadata/properties" ma:root="true" ma:fieldsID="5615b8f8aa772998bad551f24a33de0e" ns3:_="" ns4:_="">
+    <xsd:import namespace="b30265f8-c5e2-4918-b4a1-b977299ca3e2"/>
+    <xsd:import namespace="fadb41d3-f9cb-40fb-903c-8cacaba95bb5"/>
     <xsd:element name="properties">
       <xsd:complexType>
         <xsd:sequence>
           <xsd:element name="documentManagement">
             <xsd:complexType>
               <xsd:all>
-                <xsd:element ref="ns3:MediaServiceMetadata" minOccurs="0"/>
-                <xsd:element ref="ns3:MediaServiceFastMetadata" minOccurs="0"/>
+                <xsd:element ref="ns3:_activity" minOccurs="0"/>
                 <xsd:element ref="ns4:SharedWithUsers" minOccurs="0"/>
                 <xsd:element ref="ns4:SharedWithDetails" minOccurs="0"/>
                 <xsd:element ref="ns4:SharingHintHash" minOccurs="0"/>
-                <xsd:element ref="ns3:MediaServiceAutoTags" minOccurs="0"/>
+                <xsd:element ref="ns3:MediaServiceMetadata" minOccurs="0"/>
+                <xsd:element ref="ns3:MediaServiceFastMetadata" minOccurs="0"/>
+                <xsd:element ref="ns3:MediaServiceSearchProperties" minOccurs="0"/>
+                <xsd:element ref="ns3:MediaServiceDateTaken" minOccurs="0"/>
+                <xsd:element ref="ns3:MediaServiceObjectDetectorVersions" minOccurs="0"/>
+                <xsd:element ref="ns3:MediaServiceSystemTags" minOccurs="0"/>
                 <xsd:element ref="ns3:MediaServiceOCR" minOccurs="0"/>
                 <xsd:element ref="ns3:MediaServiceGenerationTime" minOccurs="0"/>
                 <xsd:element ref="ns3:MediaServiceEventHashCode" minOccurs="0"/>
-                <xsd:element ref="ns3:MediaServiceAutoKeyPoints" minOccurs="0"/>
-                <xsd:element ref="ns3:MediaServiceKeyPoints" minOccurs="0"/>
-                <xsd:element ref="ns3:MediaServiceDateTaken" minOccurs="0"/>
                 <xsd:element ref="ns3:MediaLengthInSeconds" minOccurs="0"/>
                 <xsd:element ref="ns3:MediaServiceLocation" minOccurs="0"/>
-                <xsd:element ref="ns3:_activity" minOccurs="0"/>
-                <xsd:element ref="ns3:MediaServiceObjectDetectorVersions" minOccurs="0"/>
-                <xsd:element ref="ns3:MediaServiceSystemTags" minOccurs="0"/>
               </xsd:all>
             </xsd:complexType>
           </xsd:element>
@@ -7042,88 +7482,76 @@
       </xsd:complexType>
     </xsd:element>
   </xsd:schema>
-  <xsd:schema xmlns:xsd="http://www.w3.org/2001/XMLSchema" xmlns:xs="http://www.w3.org/2001/XMLSchema" xmlns:dms="http://schemas.microsoft.com/office/2006/documentManagement/types" xmlns:pc="http://schemas.microsoft.com/office/infopath/2007/PartnerControls" targetNamespace="9162bd5b-4ed9-4da3-b376-05204580ba3f" elementFormDefault="qualified">
+  <xsd:schema xmlns:xsd="http://www.w3.org/2001/XMLSchema" xmlns:xs="http://www.w3.org/2001/XMLSchema" xmlns:dms="http://schemas.microsoft.com/office/2006/documentManagement/types" xmlns:pc="http://schemas.microsoft.com/office/infopath/2007/PartnerControls" targetNamespace="b30265f8-c5e2-4918-b4a1-b977299ca3e2" elementFormDefault="qualified">
     <xsd:import namespace="http://schemas.microsoft.com/office/2006/documentManagement/types"/>
     <xsd:import namespace="http://schemas.microsoft.com/office/infopath/2007/PartnerControls"/>
-    <xsd:element name="MediaServiceMetadata" ma:index="8" nillable="true" ma:displayName="MediaServiceMetadata" ma:hidden="true" ma:internalName="MediaServiceMetadata" ma:readOnly="true">
+    <xsd:element name="_activity" ma:index="8" nillable="true" ma:displayName="_activity" ma:hidden="true" ma:internalName="_activity">
       <xsd:simpleType>
         <xsd:restriction base="dms:Note"/>
       </xsd:simpleType>
     </xsd:element>
-    <xsd:element name="MediaServiceFastMetadata" ma:index="9" nillable="true" ma:displayName="MediaServiceFastMetadata" ma:hidden="true" ma:internalName="MediaServiceFastMetadata" ma:readOnly="true">
+    <xsd:element name="MediaServiceMetadata" ma:index="12" nillable="true" ma:displayName="MediaServiceMetadata" ma:hidden="true" ma:internalName="MediaServiceMetadata" ma:readOnly="true">
       <xsd:simpleType>
         <xsd:restriction base="dms:Note"/>
       </xsd:simpleType>
     </xsd:element>
-    <xsd:element name="MediaServiceAutoTags" ma:index="13" nillable="true" ma:displayName="Tags" ma:internalName="MediaServiceAutoTags" ma:readOnly="true">
+    <xsd:element name="MediaServiceFastMetadata" ma:index="13" nillable="true" ma:displayName="MediaServiceFastMetadata" ma:hidden="true" ma:internalName="MediaServiceFastMetadata" ma:readOnly="true">
+      <xsd:simpleType>
+        <xsd:restriction base="dms:Note"/>
+      </xsd:simpleType>
+    </xsd:element>
+    <xsd:element name="MediaServiceSearchProperties" ma:index="14" nillable="true" ma:displayName="MediaServiceSearchProperties" ma:hidden="true" ma:internalName="MediaServiceSearchProperties" ma:readOnly="true">
+      <xsd:simpleType>
+        <xsd:restriction base="dms:Note"/>
+      </xsd:simpleType>
+    </xsd:element>
+    <xsd:element name="MediaServiceDateTaken" ma:index="15" nillable="true" ma:displayName="MediaServiceDateTaken" ma:hidden="true" ma:indexed="true" ma:internalName="MediaServiceDateTaken" ma:readOnly="true">
       <xsd:simpleType>
         <xsd:restriction base="dms:Text"/>
       </xsd:simpleType>
     </xsd:element>
-    <xsd:element name="MediaServiceOCR" ma:index="14" nillable="true" ma:displayName="Extracted Text" ma:internalName="MediaServiceOCR" ma:readOnly="true">
+    <xsd:element name="MediaServiceObjectDetectorVersions" ma:index="16" nillable="true" ma:displayName="MediaServiceObjectDetectorVersions" ma:hidden="true" ma:indexed="true" ma:internalName="MediaServiceObjectDetectorVersions" ma:readOnly="true">
+      <xsd:simpleType>
+        <xsd:restriction base="dms:Text"/>
+      </xsd:simpleType>
+    </xsd:element>
+    <xsd:element name="MediaServiceSystemTags" ma:index="17" nillable="true" ma:displayName="MediaServiceSystemTags" ma:hidden="true" ma:internalName="MediaServiceSystemTags" ma:readOnly="true">
+      <xsd:simpleType>
+        <xsd:restriction base="dms:Note"/>
+      </xsd:simpleType>
+    </xsd:element>
+    <xsd:element name="MediaServiceOCR" ma:index="18" nillable="true" ma:displayName="Extracted Text" ma:internalName="MediaServiceOCR" ma:readOnly="true">
       <xsd:simpleType>
         <xsd:restriction base="dms:Note">
           <xsd:maxLength value="255"/>
         </xsd:restriction>
       </xsd:simpleType>
     </xsd:element>
-    <xsd:element name="MediaServiceGenerationTime" ma:index="15" nillable="true" ma:displayName="MediaServiceGenerationTime" ma:hidden="true" ma:internalName="MediaServiceGenerationTime" ma:readOnly="true">
+    <xsd:element name="MediaServiceGenerationTime" ma:index="19" nillable="true" ma:displayName="MediaServiceGenerationTime" ma:hidden="true" ma:internalName="MediaServiceGenerationTime" ma:readOnly="true">
       <xsd:simpleType>
         <xsd:restriction base="dms:Text"/>
       </xsd:simpleType>
     </xsd:element>
-    <xsd:element name="MediaServiceEventHashCode" ma:index="16" nillable="true" ma:displayName="MediaServiceEventHashCode" ma:hidden="true" ma:internalName="MediaServiceEventHashCode" ma:readOnly="true">
+    <xsd:element name="MediaServiceEventHashCode" ma:index="20" nillable="true" ma:displayName="MediaServiceEventHashCode" ma:hidden="true" ma:internalName="MediaServiceEventHashCode" ma:readOnly="true">
       <xsd:simpleType>
         <xsd:restriction base="dms:Text"/>
       </xsd:simpleType>
     </xsd:element>
-    <xsd:element name="MediaServiceAutoKeyPoints" ma:index="17" nillable="true" ma:displayName="MediaServiceAutoKeyPoints" ma:hidden="true" ma:internalName="MediaServiceAutoKeyPoints" ma:readOnly="true">
+    <xsd:element name="MediaLengthInSeconds" ma:index="21" nillable="true" ma:displayName="MediaLengthInSeconds" ma:hidden="true" ma:internalName="MediaLengthInSeconds" ma:readOnly="true">
       <xsd:simpleType>
-        <xsd:restriction base="dms:Note"/>
+        <xsd:restriction base="dms:Unknown"/>
       </xsd:simpleType>
     </xsd:element>
-    <xsd:element name="MediaServiceKeyPoints" ma:index="18" nillable="true" ma:displayName="KeyPoints" ma:internalName="MediaServiceKeyPoints" ma:readOnly="true">
-      <xsd:simpleType>
-        <xsd:restriction base="dms:Note">
-          <xsd:maxLength value="255"/>
-        </xsd:restriction>
-      </xsd:simpleType>
-    </xsd:element>
-    <xsd:element name="MediaServiceDateTaken" ma:index="19" nillable="true" ma:displayName="MediaServiceDateTaken" ma:hidden="true" ma:internalName="MediaServiceDateTaken" ma:readOnly="true">
+    <xsd:element name="MediaServiceLocation" ma:index="22" nillable="true" ma:displayName="Location" ma:indexed="true" ma:internalName="MediaServiceLocation" ma:readOnly="true">
       <xsd:simpleType>
         <xsd:restriction base="dms:Text"/>
       </xsd:simpleType>
     </xsd:element>
-    <xsd:element name="MediaLengthInSeconds" ma:index="20" nillable="true" ma:displayName="Length (seconds)" ma:internalName="MediaLengthInSeconds" ma:readOnly="true">
-      <xsd:simpleType>
-        <xsd:restriction base="dms:Unknown"/>
-      </xsd:simpleType>
-    </xsd:element>
-    <xsd:element name="MediaServiceLocation" ma:index="21" nillable="true" ma:displayName="Location" ma:internalName="MediaServiceLocation" ma:readOnly="true">
-      <xsd:simpleType>
-        <xsd:restriction base="dms:Text"/>
-      </xsd:simpleType>
-    </xsd:element>
-    <xsd:element name="_activity" ma:index="22" nillable="true" ma:displayName="_activity" ma:hidden="true" ma:internalName="_activity">
-      <xsd:simpleType>
-        <xsd:restriction base="dms:Note"/>
-      </xsd:simpleType>
-    </xsd:element>
-    <xsd:element name="MediaServiceObjectDetectorVersions" ma:index="23" nillable="true" ma:displayName="MediaServiceObjectDetectorVersions" ma:description="" ma:hidden="true" ma:indexed="true" ma:internalName="MediaServiceObjectDetectorVersions" ma:readOnly="true">
-      <xsd:simpleType>
-        <xsd:restriction base="dms:Text"/>
-      </xsd:simpleType>
-    </xsd:element>
-    <xsd:element name="MediaServiceSystemTags" ma:index="24" nillable="true" ma:displayName="MediaServiceSystemTags" ma:hidden="true" ma:internalName="MediaServiceSystemTags" ma:readOnly="true">
-      <xsd:simpleType>
-        <xsd:restriction base="dms:Note"/>
-      </xsd:simpleType>
-    </xsd:element>
   </xsd:schema>
-  <xsd:schema xmlns:xsd="http://www.w3.org/2001/XMLSchema" xmlns:xs="http://www.w3.org/2001/XMLSchema" xmlns:dms="http://schemas.microsoft.com/office/2006/documentManagement/types" xmlns:pc="http://schemas.microsoft.com/office/infopath/2007/PartnerControls" targetNamespace="c0fa2617-96bd-425d-8578-e93563fe37c5" elementFormDefault="qualified">
+  <xsd:schema xmlns:xsd="http://www.w3.org/2001/XMLSchema" xmlns:xs="http://www.w3.org/2001/XMLSchema" xmlns:dms="http://schemas.microsoft.com/office/2006/documentManagement/types" xmlns:pc="http://schemas.microsoft.com/office/infopath/2007/PartnerControls" targetNamespace="fadb41d3-f9cb-40fb-903c-8cacaba95bb5" elementFormDefault="qualified">
     <xsd:import namespace="http://schemas.microsoft.com/office/2006/documentManagement/types"/>
     <xsd:import namespace="http://schemas.microsoft.com/office/infopath/2007/PartnerControls"/>
-    <xsd:element name="SharedWithUsers" ma:index="10" nillable="true" ma:displayName="Shared With" ma:internalName="SharedWithUsers" ma:readOnly="true">
+    <xsd:element name="SharedWithUsers" ma:index="9" nillable="true" ma:displayName="Shared With" ma:internalName="SharedWithUsers" ma:readOnly="true">
       <xsd:complexType>
         <xsd:complexContent>
           <xsd:extension base="dms:UserMulti">
@@ -7142,14 +7570,14 @@
         </xsd:complexContent>
       </xsd:complexType>
     </xsd:element>
-    <xsd:element name="SharedWithDetails" ma:index="11" nillable="true" ma:displayName="Shared With Details" ma:internalName="SharedWithDetails" ma:readOnly="true">
+    <xsd:element name="SharedWithDetails" ma:index="10" nillable="true" ma:displayName="Shared With Details" ma:internalName="SharedWithDetails" ma:readOnly="true">
       <xsd:simpleType>
         <xsd:restriction base="dms:Note">
           <xsd:maxLength value="255"/>
         </xsd:restriction>
       </xsd:simpleType>
     </xsd:element>
-    <xsd:element name="SharingHintHash" ma:index="12" nillable="true" ma:displayName="Sharing Hint Hash" ma:hidden="true" ma:internalName="SharingHintHash" ma:readOnly="true">
+    <xsd:element name="SharingHintHash" ma:index="11" nillable="true" ma:displayName="Sharing Hint Hash" ma:hidden="true" ma:internalName="SharingHintHash" ma:readOnly="true">
       <xsd:simpleType>
         <xsd:restriction base="dms:Text"/>
       </xsd:simpleType>
@@ -7254,46 +7682,63 @@
 </ct:contentTypeSchema>
 </file>
 
+<file path=customXml/item2.xml><?xml version="1.0" encoding="utf-8"?>
+<p:properties xmlns:p="http://schemas.microsoft.com/office/2006/metadata/properties" xmlns:xsi="http://www.w3.org/2001/XMLSchema-instance" xmlns:pc="http://schemas.microsoft.com/office/infopath/2007/PartnerControls">
+  <documentManagement>
+    <_activity xmlns="b30265f8-c5e2-4918-b4a1-b977299ca3e2" xsi:nil="true"/>
+  </documentManagement>
+</p:properties>
+</file>
+
+<file path=customXml/item3.xml><?xml version="1.0" encoding="utf-8"?>
+<?mso-contentType ?>
+<FormTemplates xmlns="http://schemas.microsoft.com/sharepoint/v3/contenttype/forms">
+  <Display>DocumentLibraryForm</Display>
+  <Edit>DocumentLibraryForm</Edit>
+  <New>DocumentLibraryForm</New>
+</FormTemplates>
+</file>
+
 <file path=customXml/itemProps1.xml><?xml version="1.0" encoding="utf-8"?>
-<ds:datastoreItem xmlns:ds="http://schemas.openxmlformats.org/officeDocument/2006/customXml" ds:itemID="{8D289AE2-D2AE-49D1-AFAC-3A79F6794255}">
+<ds:datastoreItem xmlns:ds="http://schemas.openxmlformats.org/officeDocument/2006/customXml" ds:itemID="{9DD71778-17EE-4151-88AE-C8F4E8043BD9}">
   <ds:schemaRefs>
-    <ds:schemaRef ds:uri="9162bd5b-4ed9-4da3-b376-05204580ba3f"/>
-    <ds:schemaRef ds:uri="c0fa2617-96bd-425d-8578-e93563fe37c5"/>
-    <ds:schemaRef ds:uri="http://purl.org/dc/dcmitype/"/>
+    <ds:schemaRef ds:uri="http://schemas.microsoft.com/office/2006/metadata/contentType"/>
+    <ds:schemaRef ds:uri="http://schemas.microsoft.com/office/2006/metadata/properties/metaAttributes"/>
+    <ds:schemaRef ds:uri="http://www.w3.org/2001/XMLSchema"/>
+    <ds:schemaRef ds:uri="http://schemas.microsoft.com/office/2006/metadata/properties"/>
+    <ds:schemaRef ds:uri="b30265f8-c5e2-4918-b4a1-b977299ca3e2"/>
+    <ds:schemaRef ds:uri="fadb41d3-f9cb-40fb-903c-8cacaba95bb5"/>
+    <ds:schemaRef ds:uri="http://schemas.microsoft.com/office/2006/documentManagement/types"/>
+    <ds:schemaRef ds:uri="http://schemas.microsoft.com/office/infopath/2007/PartnerControls"/>
+    <ds:schemaRef ds:uri="http://schemas.openxmlformats.org/package/2006/metadata/core-properties"/>
     <ds:schemaRef ds:uri="http://purl.org/dc/elements/1.1/"/>
     <ds:schemaRef ds:uri="http://purl.org/dc/terms/"/>
-    <ds:schemaRef ds:uri="http://schemas.microsoft.com/office/2006/documentManagement/types"/>
-    <ds:schemaRef ds:uri="http://schemas.microsoft.com/office/2006/metadata/properties"/>
-    <ds:schemaRef ds:uri="http://schemas.microsoft.com/office/infopath/2007/PartnerControls"/>
-    <ds:schemaRef ds:uri="http://schemas.openxmlformats.org/package/2006/metadata/core-properties"/>
-    <ds:schemaRef ds:uri="http://www.w3.org/XML/1998/namespace"/>
+    <ds:schemaRef ds:uri="http://schemas.microsoft.com/internal/obd"/>
   </ds:schemaRefs>
 </ds:datastoreItem>
 </file>
 
 <file path=customXml/itemProps2.xml><?xml version="1.0" encoding="utf-8"?>
+<ds:datastoreItem xmlns:ds="http://schemas.openxmlformats.org/officeDocument/2006/customXml" ds:itemID="{8D289AE2-D2AE-49D1-AFAC-3A79F6794255}">
+  <ds:schemaRefs>
+    <ds:schemaRef ds:uri="http://www.w3.org/XML/1998/namespace"/>
+    <ds:schemaRef ds:uri="http://purl.org/dc/dcmitype/"/>
+    <ds:schemaRef ds:uri="http://purl.org/dc/terms/"/>
+    <ds:schemaRef ds:uri="fadb41d3-f9cb-40fb-903c-8cacaba95bb5"/>
+    <ds:schemaRef ds:uri="http://purl.org/dc/elements/1.1/"/>
+    <ds:schemaRef ds:uri="http://schemas.microsoft.com/office/2006/documentManagement/types"/>
+    <ds:schemaRef ds:uri="http://schemas.microsoft.com/office/infopath/2007/PartnerControls"/>
+    <ds:schemaRef ds:uri="http://schemas.openxmlformats.org/package/2006/metadata/core-properties"/>
+    <ds:schemaRef ds:uri="b30265f8-c5e2-4918-b4a1-b977299ca3e2"/>
+    <ds:schemaRef ds:uri="http://schemas.microsoft.com/office/2006/metadata/properties"/>
+  </ds:schemaRefs>
+</ds:datastoreItem>
+</file>
+
+<file path=customXml/itemProps3.xml><?xml version="1.0" encoding="utf-8"?>
 <ds:datastoreItem xmlns:ds="http://schemas.openxmlformats.org/officeDocument/2006/customXml" ds:itemID="{927BD4C1-B6B1-4715-ABF9-E660A51A4EA0}">
   <ds:schemaRefs>
     <ds:schemaRef ds:uri="http://schemas.microsoft.com/sharepoint/v3/contenttype/forms"/>
   </ds:schemaRefs>
 </ds:datastoreItem>
-</file>
-
-<file path=customXml/itemProps3.xml><?xml version="1.0" encoding="utf-8"?>
-<ds:datastoreItem xmlns:ds="http://schemas.openxmlformats.org/officeDocument/2006/customXml" ds:itemID="{6E816721-11E4-4989-8472-AB5A7EC20404}">
-  <ds:schemaRefs>
-    <ds:schemaRef ds:uri="9162bd5b-4ed9-4da3-b376-05204580ba3f"/>
-    <ds:schemaRef ds:uri="c0fa2617-96bd-425d-8578-e93563fe37c5"/>
-    <ds:schemaRef ds:uri="http://purl.org/dc/elements/1.1/"/>
-    <ds:schemaRef ds:uri="http://purl.org/dc/terms/"/>
-    <ds:schemaRef ds:uri="http://schemas.microsoft.com/internal/obd"/>
-    <ds:schemaRef ds:uri="http://schemas.microsoft.com/office/2006/documentManagement/types"/>
-    <ds:schemaRef ds:uri="http://schemas.microsoft.com/office/2006/metadata/contentType"/>
-    <ds:schemaRef ds:uri="http://schemas.microsoft.com/office/2006/metadata/properties"/>
-    <ds:schemaRef ds:uri="http://schemas.microsoft.com/office/2006/metadata/properties/metaAttributes"/>
-    <ds:schemaRef ds:uri="http://schemas.microsoft.com/office/infopath/2007/PartnerControls"/>
-    <ds:schemaRef ds:uri="http://schemas.openxmlformats.org/package/2006/metadata/core-properties"/>
-    <ds:schemaRef ds:uri="http://www.w3.org/2001/XMLSchema"/>
-  </ds:schemaRefs>
-</ds:datastoreItem>
 </file>
</xml_diff>

<commit_message>
PPT and PDF updated
</commit_message>
<xml_diff>
--- a/ParimalAhire-PathCraft-AgenticAI.pptx
+++ b/ParimalAhire-PathCraft-AgenticAI.pptx
@@ -20,11 +20,11 @@
     <p:sldId id="2146847067" r:id="rId14"/>
     <p:sldId id="2146847068" r:id="rId15"/>
     <p:sldId id="2146847062" r:id="rId16"/>
-    <p:sldId id="2146847055" r:id="rId17"/>
-    <p:sldId id="2146847059" r:id="rId18"/>
-    <p:sldId id="2146847069" r:id="rId19"/>
-    <p:sldId id="2146847070" r:id="rId20"/>
-    <p:sldId id="2146847061" r:id="rId21"/>
+    <p:sldId id="2146847061" r:id="rId17"/>
+    <p:sldId id="2146847055" r:id="rId18"/>
+    <p:sldId id="2146847059" r:id="rId19"/>
+    <p:sldId id="2146847069" r:id="rId20"/>
+    <p:sldId id="2146847070" r:id="rId21"/>
     <p:sldId id="259" r:id="rId22"/>
   </p:sldIdLst>
   <p:sldSz cx="12192000" cy="6858000"/>
@@ -132,14 +132,25 @@
 </p:presentation>
 </file>
 
-<file path=ppt/revisionInfo.xml><?xml version="1.0" encoding="utf-8"?>
-<p1510:revInfo xmlns:a="http://schemas.openxmlformats.org/drawingml/2006/main" xmlns:r="http://schemas.openxmlformats.org/officeDocument/2006/relationships" xmlns:p1510="http://schemas.microsoft.com/office/powerpoint/2015/10/main">
-  <p1510:revLst>
-    <p1510:client id="{392522C5-0B34-8239-4EE4-793E8B6C05A9}" v="255" dt="2025-07-01T09:33:34.532"/>
-    <p1510:client id="{D7F1B23C-5E68-AC61-D210-0912C84FE76E}" v="44" dt="2025-07-01T09:37:32.263"/>
-    <p1510:client id="{D894958A-9A7A-283B-0ADF-D9632CD88E74}" v="14" dt="2025-07-01T10:57:40.261"/>
-  </p1510:revLst>
-</p1510:revInfo>
+<file path=ppt/changesInfos/changesInfo1.xml><?xml version="1.0" encoding="utf-8"?>
+<pc:chgInfo xmlns:a="http://schemas.openxmlformats.org/drawingml/2006/main" xmlns:r="http://schemas.openxmlformats.org/officeDocument/2006/relationships" xmlns:ac="http://schemas.microsoft.com/office/drawing/2013/main/command" xmlns:pc="http://schemas.microsoft.com/office/powerpoint/2013/main/command">
+  <pc:docChgLst>
+    <pc:chgData name="Parimal Ahire" userId="b6679361eeed1ee0" providerId="LiveId" clId="{E213F6F6-0761-4C23-B832-2067E48F72EE}"/>
+    <pc:docChg chg="modSld sldOrd">
+      <pc:chgData name="Parimal Ahire" userId="b6679361eeed1ee0" providerId="LiveId" clId="{E213F6F6-0761-4C23-B832-2067E48F72EE}" dt="2025-08-03T05:37:38.216" v="1"/>
+      <pc:docMkLst>
+        <pc:docMk/>
+      </pc:docMkLst>
+      <pc:sldChg chg="ord">
+        <pc:chgData name="Parimal Ahire" userId="b6679361eeed1ee0" providerId="LiveId" clId="{E213F6F6-0761-4C23-B832-2067E48F72EE}" dt="2025-08-03T05:37:38.216" v="1"/>
+        <pc:sldMkLst>
+          <pc:docMk/>
+          <pc:sldMk cId="2230664768" sldId="2146847061"/>
+        </pc:sldMkLst>
+      </pc:sldChg>
+    </pc:docChg>
+  </pc:docChgLst>
+</pc:chgInfo>
 </file>
 
 <file path=ppt/notesMasters/notesMaster1.xml><?xml version="1.0" encoding="utf-8"?>
@@ -224,7 +235,7 @@
           <a:p>
             <a:fld id="{46256A78-79A6-408F-8148-4F87BB81602D}" type="datetimeFigureOut">
               <a:rPr lang="en-IN" smtClean="0"/>
-              <a:t>02-08-2025</a:t>
+              <a:t>03-08-2025</a:t>
             </a:fld>
             <a:endParaRPr lang="en-IN"/>
           </a:p>
@@ -812,7 +823,7 @@
           <a:p>
             <a:fld id="{ED291B17-9318-49DB-B28B-6E5994AE9581}" type="datetime1">
               <a:rPr lang="en-US" smtClean="0"/>
-              <a:t>8/2/2025</a:t>
+              <a:t>8/3/2025</a:t>
             </a:fld>
             <a:endParaRPr lang="en-US"/>
           </a:p>
@@ -1021,7 +1032,7 @@
           <a:p>
             <a:fld id="{2CED4963-E985-44C4-B8C4-FDD613B7C2F8}" type="datetime1">
               <a:rPr lang="en-US" smtClean="0"/>
-              <a:t>8/2/2025</a:t>
+              <a:t>8/3/2025</a:t>
             </a:fld>
             <a:endParaRPr lang="en-US"/>
           </a:p>
@@ -1389,7 +1400,7 @@
           <a:p>
             <a:fld id="{ED291B17-9318-49DB-B28B-6E5994AE9581}" type="datetime1">
               <a:rPr lang="en-US" smtClean="0"/>
-              <a:t>8/2/2025</a:t>
+              <a:t>8/3/2025</a:t>
             </a:fld>
             <a:endParaRPr lang="en-US"/>
           </a:p>
@@ -1593,7 +1604,7 @@
           <a:p>
             <a:fld id="{78DD82B9-B8EE-4375-B6FF-88FA6ABB15D9}" type="datetime1">
               <a:rPr lang="en-US" smtClean="0"/>
-              <a:t>8/2/2025</a:t>
+              <a:t>8/3/2025</a:t>
             </a:fld>
             <a:endParaRPr lang="en-US"/>
           </a:p>
@@ -1850,7 +1861,7 @@
           <a:p>
             <a:fld id="{B2497495-0637-405E-AE64-5CC7506D51F5}" type="datetime1">
               <a:rPr lang="en-US" smtClean="0"/>
-              <a:t>8/2/2025</a:t>
+              <a:t>8/3/2025</a:t>
             </a:fld>
             <a:endParaRPr lang="en-US"/>
           </a:p>
@@ -2108,7 +2119,7 @@
           <a:p>
             <a:fld id="{7BFFD690-9426-415D-8B65-26881E07B2D4}" type="datetime1">
               <a:rPr lang="en-US" smtClean="0"/>
-              <a:t>8/2/2025</a:t>
+              <a:t>8/3/2025</a:t>
             </a:fld>
             <a:endParaRPr lang="en-US"/>
           </a:p>
@@ -2535,7 +2546,7 @@
           <a:p>
             <a:fld id="{04C4989A-474C-40DE-95B9-011C28B71673}" type="datetime1">
               <a:rPr lang="en-US" smtClean="0"/>
-              <a:t>8/2/2025</a:t>
+              <a:t>8/3/2025</a:t>
             </a:fld>
             <a:endParaRPr lang="en-US"/>
           </a:p>
@@ -2665,7 +2676,7 @@
           <a:p>
             <a:fld id="{5DB4ED54-5B5E-4A04-93D3-5772E3CE3818}" type="datetime1">
               <a:rPr lang="en-US" smtClean="0"/>
-              <a:t>8/2/2025</a:t>
+              <a:t>8/3/2025</a:t>
             </a:fld>
             <a:endParaRPr lang="en-US"/>
           </a:p>
@@ -2768,7 +2779,7 @@
           <a:p>
             <a:fld id="{4EDE50D6-574B-40AF-946F-D52A04ADE379}" type="datetime1">
               <a:rPr lang="en-US" smtClean="0"/>
-              <a:t>8/2/2025</a:t>
+              <a:t>8/3/2025</a:t>
             </a:fld>
             <a:endParaRPr lang="en-US"/>
           </a:p>
@@ -3151,7 +3162,7 @@
           <a:p>
             <a:fld id="{D82884F1-FFEA-405F-9602-3DCA865EDA4E}" type="datetime1">
               <a:rPr lang="en-US" smtClean="0"/>
-              <a:t>8/2/2025</a:t>
+              <a:t>8/3/2025</a:t>
             </a:fld>
             <a:endParaRPr lang="en-US"/>
           </a:p>
@@ -3445,7 +3456,7 @@
           <a:p>
             <a:fld id="{7E18DB4A-8810-4A10-AD5C-D5E2C667F5B3}" type="datetime1">
               <a:rPr lang="en-US" smtClean="0"/>
-              <a:t>8/2/2025</a:t>
+              <a:t>8/3/2025</a:t>
             </a:fld>
             <a:endParaRPr lang="en-US"/>
           </a:p>
@@ -3666,7 +3677,7 @@
           <a:p>
             <a:fld id="{ED291B17-9318-49DB-B28B-6E5994AE9581}" type="datetime1">
               <a:rPr lang="en-US" smtClean="0"/>
-              <a:t>8/2/2025</a:t>
+              <a:t>8/3/2025</a:t>
             </a:fld>
             <a:endParaRPr lang="en-US"/>
           </a:p>
@@ -4960,10 +4971,10 @@
       </p:grpSpPr>
       <p:sp>
         <p:nvSpPr>
-          <p:cNvPr id="3" name="Content Placeholder 2">
+          <p:cNvPr id="2" name="Title 1">
             <a:extLst>
               <a:ext uri="{FF2B5EF4-FFF2-40B4-BE49-F238E27FC236}">
-                <a16:creationId xmlns:a16="http://schemas.microsoft.com/office/drawing/2014/main" id="{A6638FD1-D00E-E75B-705C-564F06D93D7B}"/>
+                <a16:creationId xmlns:a16="http://schemas.microsoft.com/office/drawing/2014/main" id="{48E9F08C-D61F-627D-C4E5-397E3E84FC45}"/>
               </a:ext>
             </a:extLst>
           </p:cNvPr>
@@ -4971,216 +4982,64 @@
             <a:spLocks noGrp="1"/>
           </p:cNvSpPr>
           <p:nvPr>
-            <p:ph idx="1"/>
-          </p:nvPr>
-        </p:nvSpPr>
-        <p:spPr>
-          <a:xfrm>
-            <a:off x="535670" y="1374955"/>
-            <a:ext cx="11029615" cy="4673324"/>
-          </a:xfrm>
-        </p:spPr>
-        <p:txBody>
-          <a:bodyPr>
-            <a:normAutofit fontScale="92500" lnSpcReduction="10000"/>
-          </a:bodyPr>
+            <p:ph type="title"/>
+          </p:nvPr>
+        </p:nvSpPr>
+        <p:spPr/>
+        <p:txBody>
+          <a:bodyPr/>
           <a:lstStyle/>
           <a:p>
-            <a:pPr marL="305435" lvl="0" indent="-305435" fontAlgn="base">
-              <a:lnSpc>
-                <a:spcPct val="130000"/>
-              </a:lnSpc>
-            </a:pPr>
-            <a:r>
-              <a:rPr lang="en-US" altLang="en-US" sz="2000" dirty="0"/>
-              <a:t>Persistent User Profiles:</a:t>
-            </a:r>
-            <a:br>
-              <a:rPr lang="en-US" altLang="en-US" sz="2000" dirty="0"/>
-            </a:br>
-            <a:r>
-              <a:rPr lang="en-US" altLang="en-US" sz="2000" dirty="0"/>
-              <a:t>Implement login and user account functionality to retain learning history, preferences, and past conversations, enabling long-term personalized support.</a:t>
-            </a:r>
-          </a:p>
-          <a:p>
-            <a:pPr marL="305435" lvl="0" indent="-305435" fontAlgn="base">
-              <a:lnSpc>
-                <a:spcPct val="130000"/>
-              </a:lnSpc>
-            </a:pPr>
-            <a:r>
-              <a:rPr lang="en-US" altLang="en-US" sz="2000" dirty="0"/>
-              <a:t>Academic Data Integration:</a:t>
-            </a:r>
-            <a:br>
-              <a:rPr lang="en-US" altLang="en-US" sz="2000" dirty="0"/>
-            </a:br>
-            <a:r>
-              <a:rPr lang="en-US" altLang="en-US" sz="2000" dirty="0"/>
-              <a:t>Include additional inputs like academic performance, certifications, and resume details to further enhance the relevance and accuracy of learning path recommendations.</a:t>
-            </a:r>
-          </a:p>
-          <a:p>
-            <a:pPr marL="305435" lvl="0" indent="-305435" fontAlgn="base">
-              <a:lnSpc>
-                <a:spcPct val="130000"/>
-              </a:lnSpc>
-            </a:pPr>
-            <a:r>
-              <a:rPr lang="en-US" altLang="en-US" sz="2000" dirty="0"/>
-              <a:t>Dynamic Learning Path Updates:</a:t>
-            </a:r>
-            <a:br>
-              <a:rPr lang="en-US" altLang="en-US" sz="2000" dirty="0"/>
-            </a:br>
-            <a:r>
-              <a:rPr lang="en-US" altLang="en-US" sz="2000" dirty="0"/>
-              <a:t>Integrate external APIs (e.g., Coursera, edX, job market data) to allow AIDA to adapt roadmaps based on trending skills, course availability, and market demand.</a:t>
-            </a:r>
-          </a:p>
-          <a:p>
-            <a:pPr marL="305435" lvl="0" indent="-305435" fontAlgn="base">
-              <a:lnSpc>
-                <a:spcPct val="130000"/>
-              </a:lnSpc>
-            </a:pPr>
-            <a:r>
-              <a:rPr lang="en-US" altLang="en-US" sz="2000" dirty="0"/>
-              <a:t>Scalable Deployment:</a:t>
-            </a:r>
-            <a:br>
-              <a:rPr lang="en-US" altLang="en-US" sz="2000" dirty="0"/>
-            </a:br>
-            <a:r>
-              <a:rPr lang="en-US" altLang="en-US" sz="2000" dirty="0"/>
-              <a:t>Move beyond web preview and integrate AIDA into learning platforms, institutional portals, or mobile apps for broader adoption.</a:t>
-            </a:r>
-          </a:p>
-        </p:txBody>
-      </p:sp>
-      <p:sp>
-        <p:nvSpPr>
-          <p:cNvPr id="5" name="Title 4">
-            <a:extLst>
-              <a:ext uri="{FF2B5EF4-FFF2-40B4-BE49-F238E27FC236}">
-                <a16:creationId xmlns:a16="http://schemas.microsoft.com/office/drawing/2014/main" id="{3F968F13-9AC4-7120-7ACD-9F752C767D5D}"/>
-              </a:ext>
-            </a:extLst>
-          </p:cNvPr>
-          <p:cNvSpPr txBox="1">
-            <a:spLocks/>
-          </p:cNvSpPr>
+            <a:r>
+              <a:rPr lang="en-IN" dirty="0">
+                <a:solidFill>
+                  <a:schemeClr val="accent1"/>
+                </a:solidFill>
+              </a:rPr>
+              <a:t>GitHub Link</a:t>
+            </a:r>
+          </a:p>
+        </p:txBody>
+      </p:sp>
+      <p:sp>
+        <p:nvSpPr>
+          <p:cNvPr id="4" name="Rectangle 3"/>
+          <p:cNvSpPr/>
           <p:nvPr/>
         </p:nvSpPr>
         <p:spPr>
           <a:xfrm>
-            <a:off x="535670" y="844659"/>
-            <a:ext cx="11029616" cy="530296"/>
+            <a:off x="2147443" y="2530452"/>
+            <a:ext cx="6642595" cy="369332"/>
           </a:xfrm>
           <a:prstGeom prst="rect">
             <a:avLst/>
           </a:prstGeom>
         </p:spPr>
         <p:txBody>
-          <a:bodyPr vert="horz" lIns="91440" tIns="45720" rIns="91440" bIns="45720" rtlCol="0" anchor="b">
-            <a:noAutofit/>
+          <a:bodyPr wrap="square">
+            <a:spAutoFit/>
           </a:bodyPr>
-          <a:lstStyle>
-            <a:lvl1pPr algn="l" defTabSz="457200" rtl="0" eaLnBrk="1" latinLnBrk="0" hangingPunct="1">
-              <a:lnSpc>
-                <a:spcPct val="100000"/>
-              </a:lnSpc>
-              <a:spcBef>
-                <a:spcPct val="0"/>
-              </a:spcBef>
-              <a:buNone/>
-              <a:defRPr sz="2800" b="0" kern="1200" cap="all">
-                <a:solidFill>
-                  <a:schemeClr val="tx1">
-                    <a:lumMod val="75000"/>
-                    <a:lumOff val="25000"/>
-                  </a:schemeClr>
-                </a:solidFill>
-                <a:latin typeface="+mj-lt"/>
-                <a:ea typeface="+mj-ea"/>
-                <a:cs typeface="+mj-cs"/>
-              </a:defRPr>
-            </a:lvl1pPr>
-            <a:lvl2pPr eaLnBrk="1" hangingPunct="1">
-              <a:defRPr>
-                <a:solidFill>
-                  <a:schemeClr val="tx2"/>
-                </a:solidFill>
-              </a:defRPr>
-            </a:lvl2pPr>
-            <a:lvl3pPr eaLnBrk="1" hangingPunct="1">
-              <a:defRPr>
-                <a:solidFill>
-                  <a:schemeClr val="tx2"/>
-                </a:solidFill>
-              </a:defRPr>
-            </a:lvl3pPr>
-            <a:lvl4pPr eaLnBrk="1" hangingPunct="1">
-              <a:defRPr>
-                <a:solidFill>
-                  <a:schemeClr val="tx2"/>
-                </a:solidFill>
-              </a:defRPr>
-            </a:lvl4pPr>
-            <a:lvl5pPr eaLnBrk="1" hangingPunct="1">
-              <a:defRPr>
-                <a:solidFill>
-                  <a:schemeClr val="tx2"/>
-                </a:solidFill>
-              </a:defRPr>
-            </a:lvl5pPr>
-            <a:lvl6pPr eaLnBrk="1" hangingPunct="1">
-              <a:defRPr>
-                <a:solidFill>
-                  <a:schemeClr val="tx2"/>
-                </a:solidFill>
-              </a:defRPr>
-            </a:lvl6pPr>
-            <a:lvl7pPr eaLnBrk="1" hangingPunct="1">
-              <a:defRPr>
-                <a:solidFill>
-                  <a:schemeClr val="tx2"/>
-                </a:solidFill>
-              </a:defRPr>
-            </a:lvl7pPr>
-            <a:lvl8pPr eaLnBrk="1" hangingPunct="1">
-              <a:defRPr>
-                <a:solidFill>
-                  <a:schemeClr val="tx2"/>
-                </a:solidFill>
-              </a:defRPr>
-            </a:lvl8pPr>
-            <a:lvl9pPr eaLnBrk="1" hangingPunct="1">
-              <a:defRPr>
-                <a:solidFill>
-                  <a:schemeClr val="tx2"/>
-                </a:solidFill>
-              </a:defRPr>
-            </a:lvl9pPr>
-          </a:lstStyle>
-          <a:p>
-            <a:r>
-              <a:rPr lang="en-US" sz="3600" dirty="0">
-                <a:solidFill>
-                  <a:schemeClr val="accent1"/>
-                </a:solidFill>
-                <a:cs typeface="Arial"/>
+          <a:lstStyle/>
+          <a:p>
+            <a:r>
+              <a:rPr lang="en-IN" dirty="0"/>
+              <a:t>GitHub link : </a:t>
+            </a:r>
+            <a:r>
+              <a:rPr lang="en-IN" dirty="0">
+                <a:hlinkClick r:id="rId2"/>
               </a:rPr>
-              <a:t>Future scope</a:t>
-            </a:r>
+              <a:t>https://github.com/ParimalAhire/PathCraft-AIDA</a:t>
+            </a:r>
+            <a:endParaRPr lang="en-IN" dirty="0"/>
           </a:p>
         </p:txBody>
       </p:sp>
     </p:spTree>
     <p:extLst>
       <p:ext uri="{BB962C8B-B14F-4D97-AF65-F5344CB8AC3E}">
-        <p14:creationId xmlns:p14="http://schemas.microsoft.com/office/powerpoint/2010/main" val="614882681"/>
+        <p14:creationId xmlns:p14="http://schemas.microsoft.com/office/powerpoint/2010/main" val="2230664768"/>
       </p:ext>
     </p:extLst>
   </p:cSld>
@@ -5209,6 +5068,255 @@
       </p:grpSpPr>
       <p:sp>
         <p:nvSpPr>
+          <p:cNvPr id="3" name="Content Placeholder 2">
+            <a:extLst>
+              <a:ext uri="{FF2B5EF4-FFF2-40B4-BE49-F238E27FC236}">
+                <a16:creationId xmlns:a16="http://schemas.microsoft.com/office/drawing/2014/main" id="{A6638FD1-D00E-E75B-705C-564F06D93D7B}"/>
+              </a:ext>
+            </a:extLst>
+          </p:cNvPr>
+          <p:cNvSpPr>
+            <a:spLocks noGrp="1"/>
+          </p:cNvSpPr>
+          <p:nvPr>
+            <p:ph idx="1"/>
+          </p:nvPr>
+        </p:nvSpPr>
+        <p:spPr>
+          <a:xfrm>
+            <a:off x="535670" y="1374955"/>
+            <a:ext cx="11029615" cy="4673324"/>
+          </a:xfrm>
+        </p:spPr>
+        <p:txBody>
+          <a:bodyPr>
+            <a:normAutofit fontScale="92500" lnSpcReduction="10000"/>
+          </a:bodyPr>
+          <a:lstStyle/>
+          <a:p>
+            <a:pPr marL="305435" lvl="0" indent="-305435" fontAlgn="base">
+              <a:lnSpc>
+                <a:spcPct val="130000"/>
+              </a:lnSpc>
+            </a:pPr>
+            <a:r>
+              <a:rPr lang="en-US" altLang="en-US" sz="2000" dirty="0"/>
+              <a:t>Persistent User Profiles:</a:t>
+            </a:r>
+            <a:br>
+              <a:rPr lang="en-US" altLang="en-US" sz="2000" dirty="0"/>
+            </a:br>
+            <a:r>
+              <a:rPr lang="en-US" altLang="en-US" sz="2000" dirty="0"/>
+              <a:t>Implement login and user account functionality to retain learning history, preferences, and past conversations, enabling long-term personalized support.</a:t>
+            </a:r>
+          </a:p>
+          <a:p>
+            <a:pPr marL="305435" lvl="0" indent="-305435" fontAlgn="base">
+              <a:lnSpc>
+                <a:spcPct val="130000"/>
+              </a:lnSpc>
+            </a:pPr>
+            <a:r>
+              <a:rPr lang="en-US" altLang="en-US" sz="2000" dirty="0"/>
+              <a:t>Academic Data Integration:</a:t>
+            </a:r>
+            <a:br>
+              <a:rPr lang="en-US" altLang="en-US" sz="2000" dirty="0"/>
+            </a:br>
+            <a:r>
+              <a:rPr lang="en-US" altLang="en-US" sz="2000" dirty="0"/>
+              <a:t>Include additional inputs like academic performance, certifications, and resume details to further enhance the relevance and accuracy of learning path recommendations.</a:t>
+            </a:r>
+          </a:p>
+          <a:p>
+            <a:pPr marL="305435" lvl="0" indent="-305435" fontAlgn="base">
+              <a:lnSpc>
+                <a:spcPct val="130000"/>
+              </a:lnSpc>
+            </a:pPr>
+            <a:r>
+              <a:rPr lang="en-US" altLang="en-US" sz="2000" dirty="0"/>
+              <a:t>Dynamic Learning Path Updates:</a:t>
+            </a:r>
+            <a:br>
+              <a:rPr lang="en-US" altLang="en-US" sz="2000" dirty="0"/>
+            </a:br>
+            <a:r>
+              <a:rPr lang="en-US" altLang="en-US" sz="2000" dirty="0"/>
+              <a:t>Integrate external APIs (e.g., Coursera, edX, job market data) to allow AIDA to adapt roadmaps based on trending skills, course availability, and market demand.</a:t>
+            </a:r>
+          </a:p>
+          <a:p>
+            <a:pPr marL="305435" lvl="0" indent="-305435" fontAlgn="base">
+              <a:lnSpc>
+                <a:spcPct val="130000"/>
+              </a:lnSpc>
+            </a:pPr>
+            <a:r>
+              <a:rPr lang="en-US" altLang="en-US" sz="2000" dirty="0"/>
+              <a:t>Scalable Deployment:</a:t>
+            </a:r>
+            <a:br>
+              <a:rPr lang="en-US" altLang="en-US" sz="2000" dirty="0"/>
+            </a:br>
+            <a:r>
+              <a:rPr lang="en-US" altLang="en-US" sz="2000" dirty="0"/>
+              <a:t>Move beyond web preview and integrate AIDA into learning platforms, institutional portals, or mobile apps for broader adoption.</a:t>
+            </a:r>
+          </a:p>
+        </p:txBody>
+      </p:sp>
+      <p:sp>
+        <p:nvSpPr>
+          <p:cNvPr id="5" name="Title 4">
+            <a:extLst>
+              <a:ext uri="{FF2B5EF4-FFF2-40B4-BE49-F238E27FC236}">
+                <a16:creationId xmlns:a16="http://schemas.microsoft.com/office/drawing/2014/main" id="{3F968F13-9AC4-7120-7ACD-9F752C767D5D}"/>
+              </a:ext>
+            </a:extLst>
+          </p:cNvPr>
+          <p:cNvSpPr txBox="1">
+            <a:spLocks/>
+          </p:cNvSpPr>
+          <p:nvPr/>
+        </p:nvSpPr>
+        <p:spPr>
+          <a:xfrm>
+            <a:off x="535670" y="844659"/>
+            <a:ext cx="11029616" cy="530296"/>
+          </a:xfrm>
+          <a:prstGeom prst="rect">
+            <a:avLst/>
+          </a:prstGeom>
+        </p:spPr>
+        <p:txBody>
+          <a:bodyPr vert="horz" lIns="91440" tIns="45720" rIns="91440" bIns="45720" rtlCol="0" anchor="b">
+            <a:noAutofit/>
+          </a:bodyPr>
+          <a:lstStyle>
+            <a:lvl1pPr algn="l" defTabSz="457200" rtl="0" eaLnBrk="1" latinLnBrk="0" hangingPunct="1">
+              <a:lnSpc>
+                <a:spcPct val="100000"/>
+              </a:lnSpc>
+              <a:spcBef>
+                <a:spcPct val="0"/>
+              </a:spcBef>
+              <a:buNone/>
+              <a:defRPr sz="2800" b="0" kern="1200" cap="all">
+                <a:solidFill>
+                  <a:schemeClr val="tx1">
+                    <a:lumMod val="75000"/>
+                    <a:lumOff val="25000"/>
+                  </a:schemeClr>
+                </a:solidFill>
+                <a:latin typeface="+mj-lt"/>
+                <a:ea typeface="+mj-ea"/>
+                <a:cs typeface="+mj-cs"/>
+              </a:defRPr>
+            </a:lvl1pPr>
+            <a:lvl2pPr eaLnBrk="1" hangingPunct="1">
+              <a:defRPr>
+                <a:solidFill>
+                  <a:schemeClr val="tx2"/>
+                </a:solidFill>
+              </a:defRPr>
+            </a:lvl2pPr>
+            <a:lvl3pPr eaLnBrk="1" hangingPunct="1">
+              <a:defRPr>
+                <a:solidFill>
+                  <a:schemeClr val="tx2"/>
+                </a:solidFill>
+              </a:defRPr>
+            </a:lvl3pPr>
+            <a:lvl4pPr eaLnBrk="1" hangingPunct="1">
+              <a:defRPr>
+                <a:solidFill>
+                  <a:schemeClr val="tx2"/>
+                </a:solidFill>
+              </a:defRPr>
+            </a:lvl4pPr>
+            <a:lvl5pPr eaLnBrk="1" hangingPunct="1">
+              <a:defRPr>
+                <a:solidFill>
+                  <a:schemeClr val="tx2"/>
+                </a:solidFill>
+              </a:defRPr>
+            </a:lvl5pPr>
+            <a:lvl6pPr eaLnBrk="1" hangingPunct="1">
+              <a:defRPr>
+                <a:solidFill>
+                  <a:schemeClr val="tx2"/>
+                </a:solidFill>
+              </a:defRPr>
+            </a:lvl6pPr>
+            <a:lvl7pPr eaLnBrk="1" hangingPunct="1">
+              <a:defRPr>
+                <a:solidFill>
+                  <a:schemeClr val="tx2"/>
+                </a:solidFill>
+              </a:defRPr>
+            </a:lvl7pPr>
+            <a:lvl8pPr eaLnBrk="1" hangingPunct="1">
+              <a:defRPr>
+                <a:solidFill>
+                  <a:schemeClr val="tx2"/>
+                </a:solidFill>
+              </a:defRPr>
+            </a:lvl8pPr>
+            <a:lvl9pPr eaLnBrk="1" hangingPunct="1">
+              <a:defRPr>
+                <a:solidFill>
+                  <a:schemeClr val="tx2"/>
+                </a:solidFill>
+              </a:defRPr>
+            </a:lvl9pPr>
+          </a:lstStyle>
+          <a:p>
+            <a:r>
+              <a:rPr lang="en-US" sz="3600" dirty="0">
+                <a:solidFill>
+                  <a:schemeClr val="accent1"/>
+                </a:solidFill>
+                <a:cs typeface="Arial"/>
+              </a:rPr>
+              <a:t>Future scope</a:t>
+            </a:r>
+          </a:p>
+        </p:txBody>
+      </p:sp>
+    </p:spTree>
+    <p:extLst>
+      <p:ext uri="{BB962C8B-B14F-4D97-AF65-F5344CB8AC3E}">
+        <p14:creationId xmlns:p14="http://schemas.microsoft.com/office/powerpoint/2010/main" val="614882681"/>
+      </p:ext>
+    </p:extLst>
+  </p:cSld>
+  <p:clrMapOvr>
+    <a:masterClrMapping/>
+  </p:clrMapOvr>
+</p:sld>
+</file>
+
+<file path=ppt/slides/slide15.xml><?xml version="1.0" encoding="utf-8"?>
+<p:sld xmlns:a="http://schemas.openxmlformats.org/drawingml/2006/main" xmlns:r="http://schemas.openxmlformats.org/officeDocument/2006/relationships" xmlns:p="http://schemas.openxmlformats.org/presentationml/2006/main">
+  <p:cSld>
+    <p:spTree>
+      <p:nvGrpSpPr>
+        <p:cNvPr id="1" name=""/>
+        <p:cNvGrpSpPr/>
+        <p:nvPr/>
+      </p:nvGrpSpPr>
+      <p:grpSpPr>
+        <a:xfrm>
+          <a:off x="0" y="0"/>
+          <a:ext cx="0" cy="0"/>
+          <a:chOff x="0" y="0"/>
+          <a:chExt cx="0" cy="0"/>
+        </a:xfrm>
+      </p:grpSpPr>
+      <p:sp>
+        <p:nvSpPr>
           <p:cNvPr id="2" name="Title 1">
             <a:extLst>
               <a:ext uri="{FF2B5EF4-FFF2-40B4-BE49-F238E27FC236}">
@@ -5284,7 +5392,7 @@
 </p:sld>
 </file>
 
-<file path=ppt/slides/slide15.xml><?xml version="1.0" encoding="utf-8"?>
+<file path=ppt/slides/slide16.xml><?xml version="1.0" encoding="utf-8"?>
 <p:sld xmlns:a="http://schemas.openxmlformats.org/drawingml/2006/main" xmlns:r="http://schemas.openxmlformats.org/officeDocument/2006/relationships" xmlns:p="http://schemas.openxmlformats.org/presentationml/2006/main">
   <p:cSld>
     <p:spTree>
@@ -5381,7 +5489,7 @@
 </p:sld>
 </file>
 
-<file path=ppt/slides/slide16.xml><?xml version="1.0" encoding="utf-8"?>
+<file path=ppt/slides/slide17.xml><?xml version="1.0" encoding="utf-8"?>
 <p:sld xmlns:a="http://schemas.openxmlformats.org/drawingml/2006/main" xmlns:r="http://schemas.openxmlformats.org/officeDocument/2006/relationships" xmlns:p="http://schemas.openxmlformats.org/presentationml/2006/main">
   <p:cSld>
     <p:spTree>
@@ -5469,103 +5577,6 @@
     <p:extLst>
       <p:ext uri="{BB962C8B-B14F-4D97-AF65-F5344CB8AC3E}">
         <p14:creationId xmlns:p14="http://schemas.microsoft.com/office/powerpoint/2010/main" val="1098887119"/>
-      </p:ext>
-    </p:extLst>
-  </p:cSld>
-  <p:clrMapOvr>
-    <a:masterClrMapping/>
-  </p:clrMapOvr>
-</p:sld>
-</file>
-
-<file path=ppt/slides/slide17.xml><?xml version="1.0" encoding="utf-8"?>
-<p:sld xmlns:a="http://schemas.openxmlformats.org/drawingml/2006/main" xmlns:r="http://schemas.openxmlformats.org/officeDocument/2006/relationships" xmlns:p="http://schemas.openxmlformats.org/presentationml/2006/main">
-  <p:cSld>
-    <p:spTree>
-      <p:nvGrpSpPr>
-        <p:cNvPr id="1" name=""/>
-        <p:cNvGrpSpPr/>
-        <p:nvPr/>
-      </p:nvGrpSpPr>
-      <p:grpSpPr>
-        <a:xfrm>
-          <a:off x="0" y="0"/>
-          <a:ext cx="0" cy="0"/>
-          <a:chOff x="0" y="0"/>
-          <a:chExt cx="0" cy="0"/>
-        </a:xfrm>
-      </p:grpSpPr>
-      <p:sp>
-        <p:nvSpPr>
-          <p:cNvPr id="2" name="Title 1">
-            <a:extLst>
-              <a:ext uri="{FF2B5EF4-FFF2-40B4-BE49-F238E27FC236}">
-                <a16:creationId xmlns:a16="http://schemas.microsoft.com/office/drawing/2014/main" id="{48E9F08C-D61F-627D-C4E5-397E3E84FC45}"/>
-              </a:ext>
-            </a:extLst>
-          </p:cNvPr>
-          <p:cNvSpPr>
-            <a:spLocks noGrp="1"/>
-          </p:cNvSpPr>
-          <p:nvPr>
-            <p:ph type="title"/>
-          </p:nvPr>
-        </p:nvSpPr>
-        <p:spPr/>
-        <p:txBody>
-          <a:bodyPr/>
-          <a:lstStyle/>
-          <a:p>
-            <a:r>
-              <a:rPr lang="en-IN" dirty="0">
-                <a:solidFill>
-                  <a:schemeClr val="accent1"/>
-                </a:solidFill>
-              </a:rPr>
-              <a:t>GitHub Link</a:t>
-            </a:r>
-          </a:p>
-        </p:txBody>
-      </p:sp>
-      <p:sp>
-        <p:nvSpPr>
-          <p:cNvPr id="4" name="Rectangle 3"/>
-          <p:cNvSpPr/>
-          <p:nvPr/>
-        </p:nvSpPr>
-        <p:spPr>
-          <a:xfrm>
-            <a:off x="2147443" y="2530452"/>
-            <a:ext cx="6642595" cy="369332"/>
-          </a:xfrm>
-          <a:prstGeom prst="rect">
-            <a:avLst/>
-          </a:prstGeom>
-        </p:spPr>
-        <p:txBody>
-          <a:bodyPr wrap="square">
-            <a:spAutoFit/>
-          </a:bodyPr>
-          <a:lstStyle/>
-          <a:p>
-            <a:r>
-              <a:rPr lang="en-IN" dirty="0"/>
-              <a:t>GitHub link : </a:t>
-            </a:r>
-            <a:r>
-              <a:rPr lang="en-IN" dirty="0">
-                <a:hlinkClick r:id="rId2"/>
-              </a:rPr>
-              <a:t>https://github.com/ParimalAhire/PathCraft-AIDA</a:t>
-            </a:r>
-            <a:endParaRPr lang="en-IN" dirty="0"/>
-          </a:p>
-        </p:txBody>
-      </p:sp>
-    </p:spTree>
-    <p:extLst>
-      <p:ext uri="{BB962C8B-B14F-4D97-AF65-F5344CB8AC3E}">
-        <p14:creationId xmlns:p14="http://schemas.microsoft.com/office/powerpoint/2010/main" val="2230664768"/>
       </p:ext>
     </p:extLst>
   </p:cSld>
@@ -7683,20 +7694,20 @@
 </file>
 
 <file path=customXml/item2.xml><?xml version="1.0" encoding="utf-8"?>
-<p:properties xmlns:p="http://schemas.microsoft.com/office/2006/metadata/properties" xmlns:xsi="http://www.w3.org/2001/XMLSchema-instance" xmlns:pc="http://schemas.microsoft.com/office/infopath/2007/PartnerControls">
-  <documentManagement>
-    <_activity xmlns="b30265f8-c5e2-4918-b4a1-b977299ca3e2" xsi:nil="true"/>
-  </documentManagement>
-</p:properties>
-</file>
-
-<file path=customXml/item3.xml><?xml version="1.0" encoding="utf-8"?>
 <?mso-contentType ?>
 <FormTemplates xmlns="http://schemas.microsoft.com/sharepoint/v3/contenttype/forms">
   <Display>DocumentLibraryForm</Display>
   <Edit>DocumentLibraryForm</Edit>
   <New>DocumentLibraryForm</New>
 </FormTemplates>
+</file>
+
+<file path=customXml/item3.xml><?xml version="1.0" encoding="utf-8"?>
+<p:properties xmlns:p="http://schemas.microsoft.com/office/2006/metadata/properties" xmlns:xsi="http://www.w3.org/2001/XMLSchema-instance" xmlns:pc="http://schemas.microsoft.com/office/infopath/2007/PartnerControls">
+  <documentManagement>
+    <_activity xmlns="b30265f8-c5e2-4918-b4a1-b977299ca3e2" xsi:nil="true"/>
+  </documentManagement>
+</p:properties>
 </file>
 
 <file path=customXml/itemProps1.xml><?xml version="1.0" encoding="utf-8"?>
@@ -7719,6 +7730,14 @@
 </file>
 
 <file path=customXml/itemProps2.xml><?xml version="1.0" encoding="utf-8"?>
+<ds:datastoreItem xmlns:ds="http://schemas.openxmlformats.org/officeDocument/2006/customXml" ds:itemID="{927BD4C1-B6B1-4715-ABF9-E660A51A4EA0}">
+  <ds:schemaRefs>
+    <ds:schemaRef ds:uri="http://schemas.microsoft.com/sharepoint/v3/contenttype/forms"/>
+  </ds:schemaRefs>
+</ds:datastoreItem>
+</file>
+
+<file path=customXml/itemProps3.xml><?xml version="1.0" encoding="utf-8"?>
 <ds:datastoreItem xmlns:ds="http://schemas.openxmlformats.org/officeDocument/2006/customXml" ds:itemID="{8D289AE2-D2AE-49D1-AFAC-3A79F6794255}">
   <ds:schemaRefs>
     <ds:schemaRef ds:uri="http://www.w3.org/XML/1998/namespace"/>
@@ -7733,12 +7752,4 @@
     <ds:schemaRef ds:uri="http://schemas.microsoft.com/office/2006/metadata/properties"/>
   </ds:schemaRefs>
 </ds:datastoreItem>
-</file>
-
-<file path=customXml/itemProps3.xml><?xml version="1.0" encoding="utf-8"?>
-<ds:datastoreItem xmlns:ds="http://schemas.openxmlformats.org/officeDocument/2006/customXml" ds:itemID="{927BD4C1-B6B1-4715-ABF9-E660A51A4EA0}">
-  <ds:schemaRefs>
-    <ds:schemaRef ds:uri="http://schemas.microsoft.com/sharepoint/v3/contenttype/forms"/>
-  </ds:schemaRefs>
-</ds:datastoreItem>
 </file>
</xml_diff>